<commit_message>
Complete presentation and todo example app
</commit_message>
<xml_diff>
--- a/React JS.pptx
+++ b/React JS.pptx
@@ -13,6 +13,11 @@
     <p:sldId id="261" r:id="rId7"/>
     <p:sldId id="262" r:id="rId8"/>
     <p:sldId id="263" r:id="rId9"/>
+    <p:sldId id="264" r:id="rId10"/>
+    <p:sldId id="265" r:id="rId11"/>
+    <p:sldId id="266" r:id="rId12"/>
+    <p:sldId id="267" r:id="rId13"/>
+    <p:sldId id="268" r:id="rId14"/>
   </p:sldIdLst>
   <p:sldSz cx="12192000" cy="6858000"/>
   <p:notesSz cx="6858000" cy="9144000"/>
@@ -308,7 +313,7 @@
             <a:fld id="{B61BEF0D-F0BB-DE4B-95CE-6DB70DBA9567}" type="datetimeFigureOut">
               <a:rPr lang="en-US" dirty="0"/>
               <a:pPr/>
-              <a:t>1/29/2018</a:t>
+              <a:t>2/8/2018</a:t>
             </a:fld>
             <a:endParaRPr lang="en-US" dirty="0"/>
           </a:p>
@@ -643,7 +648,7 @@
             <a:fld id="{B61BEF0D-F0BB-DE4B-95CE-6DB70DBA9567}" type="datetimeFigureOut">
               <a:rPr lang="en-US" dirty="0"/>
               <a:pPr/>
-              <a:t>1/29/2018</a:t>
+              <a:t>2/8/2018</a:t>
             </a:fld>
             <a:endParaRPr lang="en-US" dirty="0"/>
           </a:p>
@@ -1041,7 +1046,7 @@
             <a:fld id="{B61BEF0D-F0BB-DE4B-95CE-6DB70DBA9567}" type="datetimeFigureOut">
               <a:rPr lang="en-US" dirty="0"/>
               <a:pPr/>
-              <a:t>1/29/2018</a:t>
+              <a:t>2/8/2018</a:t>
             </a:fld>
             <a:endParaRPr lang="en-US" dirty="0"/>
           </a:p>
@@ -1374,7 +1379,7 @@
             <a:fld id="{B61BEF0D-F0BB-DE4B-95CE-6DB70DBA9567}" type="datetimeFigureOut">
               <a:rPr lang="en-US" dirty="0"/>
               <a:pPr/>
-              <a:t>1/29/2018</a:t>
+              <a:t>2/8/2018</a:t>
             </a:fld>
             <a:endParaRPr lang="en-US" dirty="0"/>
           </a:p>
@@ -1691,7 +1696,7 @@
             <a:fld id="{B61BEF0D-F0BB-DE4B-95CE-6DB70DBA9567}" type="datetimeFigureOut">
               <a:rPr lang="en-US" dirty="0"/>
               <a:pPr/>
-              <a:t>1/29/2018</a:t>
+              <a:t>2/8/2018</a:t>
             </a:fld>
             <a:endParaRPr lang="en-US" dirty="0"/>
           </a:p>
@@ -2084,7 +2089,7 @@
             <a:fld id="{B61BEF0D-F0BB-DE4B-95CE-6DB70DBA9567}" type="datetimeFigureOut">
               <a:rPr lang="en-US" dirty="0"/>
               <a:pPr/>
-              <a:t>1/29/2018</a:t>
+              <a:t>2/8/2018</a:t>
             </a:fld>
             <a:endParaRPr lang="en-US" dirty="0"/>
           </a:p>
@@ -2338,7 +2343,7 @@
             <a:fld id="{B61BEF0D-F0BB-DE4B-95CE-6DB70DBA9567}" type="datetimeFigureOut">
               <a:rPr lang="en-US" dirty="0"/>
               <a:pPr/>
-              <a:t>1/29/2018</a:t>
+              <a:t>2/8/2018</a:t>
             </a:fld>
             <a:endParaRPr lang="en-US" dirty="0"/>
           </a:p>
@@ -2597,7 +2602,7 @@
             <a:fld id="{B61BEF0D-F0BB-DE4B-95CE-6DB70DBA9567}" type="datetimeFigureOut">
               <a:rPr lang="en-US" dirty="0"/>
               <a:pPr/>
-              <a:t>1/29/2018</a:t>
+              <a:t>2/8/2018</a:t>
             </a:fld>
             <a:endParaRPr lang="en-US" dirty="0"/>
           </a:p>
@@ -2856,7 +2861,7 @@
             <a:fld id="{B61BEF0D-F0BB-DE4B-95CE-6DB70DBA9567}" type="datetimeFigureOut">
               <a:rPr lang="en-US" dirty="0"/>
               <a:pPr/>
-              <a:t>1/29/2018</a:t>
+              <a:t>2/8/2018</a:t>
             </a:fld>
             <a:endParaRPr lang="en-US" dirty="0"/>
           </a:p>
@@ -3182,7 +3187,7 @@
             <a:fld id="{B61BEF0D-F0BB-DE4B-95CE-6DB70DBA9567}" type="datetimeFigureOut">
               <a:rPr lang="en-US" dirty="0"/>
               <a:pPr/>
-              <a:t>1/29/2018</a:t>
+              <a:t>2/8/2018</a:t>
             </a:fld>
             <a:endParaRPr lang="en-US" dirty="0"/>
           </a:p>
@@ -3502,7 +3507,7 @@
             <a:fld id="{B61BEF0D-F0BB-DE4B-95CE-6DB70DBA9567}" type="datetimeFigureOut">
               <a:rPr lang="en-US" dirty="0"/>
               <a:pPr/>
-              <a:t>1/29/2018</a:t>
+              <a:t>2/8/2018</a:t>
             </a:fld>
             <a:endParaRPr lang="en-US" dirty="0"/>
           </a:p>
@@ -3956,7 +3961,7 @@
             <a:fld id="{B61BEF0D-F0BB-DE4B-95CE-6DB70DBA9567}" type="datetimeFigureOut">
               <a:rPr lang="en-US" dirty="0"/>
               <a:pPr/>
-              <a:t>1/29/2018</a:t>
+              <a:t>2/8/2018</a:t>
             </a:fld>
             <a:endParaRPr lang="en-US" dirty="0"/>
           </a:p>
@@ -4158,7 +4163,7 @@
             <a:fld id="{B61BEF0D-F0BB-DE4B-95CE-6DB70DBA9567}" type="datetimeFigureOut">
               <a:rPr lang="en-US" dirty="0"/>
               <a:pPr/>
-              <a:t>1/29/2018</a:t>
+              <a:t>2/8/2018</a:t>
             </a:fld>
             <a:endParaRPr lang="en-US" dirty="0"/>
           </a:p>
@@ -4332,7 +4337,7 @@
             <a:fld id="{B61BEF0D-F0BB-DE4B-95CE-6DB70DBA9567}" type="datetimeFigureOut">
               <a:rPr lang="en-US" dirty="0"/>
               <a:pPr/>
-              <a:t>1/29/2018</a:t>
+              <a:t>2/8/2018</a:t>
             </a:fld>
             <a:endParaRPr lang="en-US" dirty="0"/>
           </a:p>
@@ -4662,7 +4667,7 @@
             <a:fld id="{B61BEF0D-F0BB-DE4B-95CE-6DB70DBA9567}" type="datetimeFigureOut">
               <a:rPr lang="en-US" dirty="0"/>
               <a:pPr/>
-              <a:t>1/29/2018</a:t>
+              <a:t>2/8/2018</a:t>
             </a:fld>
             <a:endParaRPr lang="en-US" dirty="0"/>
           </a:p>
@@ -5004,7 +5009,7 @@
             <a:fld id="{B61BEF0D-F0BB-DE4B-95CE-6DB70DBA9567}" type="datetimeFigureOut">
               <a:rPr lang="en-US" dirty="0"/>
               <a:pPr/>
-              <a:t>1/29/2018</a:t>
+              <a:t>2/8/2018</a:t>
             </a:fld>
             <a:endParaRPr lang="en-US" dirty="0"/>
           </a:p>
@@ -7118,7 +7123,7 @@
             <a:fld id="{B61BEF0D-F0BB-DE4B-95CE-6DB70DBA9567}" type="datetimeFigureOut">
               <a:rPr lang="en-US" dirty="0"/>
               <a:pPr/>
-              <a:t>1/29/2018</a:t>
+              <a:t>2/8/2018</a:t>
             </a:fld>
             <a:endParaRPr lang="en-US" dirty="0"/>
           </a:p>
@@ -7691,6 +7696,3271 @@
 </p:sld>
 </file>
 
+<file path=ppt/slides/slide10.xml><?xml version="1.0" encoding="utf-8"?>
+<p:sld xmlns:a="http://schemas.openxmlformats.org/drawingml/2006/main" xmlns:r="http://schemas.openxmlformats.org/officeDocument/2006/relationships" xmlns:p="http://schemas.openxmlformats.org/presentationml/2006/main">
+  <p:cSld>
+    <p:spTree>
+      <p:nvGrpSpPr>
+        <p:cNvPr id="1" name=""/>
+        <p:cNvGrpSpPr/>
+        <p:nvPr/>
+      </p:nvGrpSpPr>
+      <p:grpSpPr>
+        <a:xfrm>
+          <a:off x="0" y="0"/>
+          <a:ext cx="0" cy="0"/>
+          <a:chOff x="0" y="0"/>
+          <a:chExt cx="0" cy="0"/>
+        </a:xfrm>
+      </p:grpSpPr>
+      <p:sp>
+        <p:nvSpPr>
+          <p:cNvPr id="2" name="Title 1"/>
+          <p:cNvSpPr>
+            <a:spLocks noGrp="1"/>
+          </p:cNvSpPr>
+          <p:nvPr>
+            <p:ph type="title"/>
+          </p:nvPr>
+        </p:nvSpPr>
+        <p:spPr/>
+        <p:txBody>
+          <a:bodyPr/>
+          <a:lstStyle/>
+          <a:p>
+            <a:r>
+              <a:rPr lang="en-US" dirty="0" smtClean="0"/>
+              <a:t>JSX</a:t>
+            </a:r>
+            <a:endParaRPr lang="en-US" dirty="0"/>
+          </a:p>
+        </p:txBody>
+      </p:sp>
+      <p:sp>
+        <p:nvSpPr>
+          <p:cNvPr id="3" name="Content Placeholder 2"/>
+          <p:cNvSpPr>
+            <a:spLocks noGrp="1"/>
+          </p:cNvSpPr>
+          <p:nvPr>
+            <p:ph idx="1"/>
+          </p:nvPr>
+        </p:nvSpPr>
+        <p:spPr>
+          <a:xfrm>
+            <a:off x="2589212" y="2133600"/>
+            <a:ext cx="8915400" cy="1305059"/>
+          </a:xfrm>
+        </p:spPr>
+        <p:txBody>
+          <a:bodyPr/>
+          <a:lstStyle/>
+          <a:p>
+            <a:r>
+              <a:rPr lang="en-US" b="1" dirty="0"/>
+              <a:t>JSX</a:t>
+            </a:r>
+            <a:r>
+              <a:rPr lang="en-US" dirty="0"/>
+              <a:t> is a preprocessor step that adds XML syntax to JavaScript. You can definitely use </a:t>
+            </a:r>
+            <a:r>
+              <a:rPr lang="en-US" b="1" dirty="0"/>
+              <a:t>React</a:t>
+            </a:r>
+            <a:r>
+              <a:rPr lang="en-US" dirty="0"/>
+              <a:t> without </a:t>
+            </a:r>
+            <a:r>
+              <a:rPr lang="en-US" b="1" dirty="0"/>
+              <a:t>JSX</a:t>
+            </a:r>
+            <a:r>
+              <a:rPr lang="en-US" dirty="0"/>
+              <a:t> but </a:t>
+            </a:r>
+            <a:r>
+              <a:rPr lang="en-US" b="1" dirty="0"/>
+              <a:t>JSX</a:t>
+            </a:r>
+            <a:r>
+              <a:rPr lang="en-US" dirty="0"/>
+              <a:t> makes </a:t>
+            </a:r>
+            <a:r>
+              <a:rPr lang="en-US" b="1" dirty="0"/>
+              <a:t>React</a:t>
+            </a:r>
+            <a:r>
+              <a:rPr lang="en-US" dirty="0"/>
+              <a:t> a lot more elegant. Just like XML,</a:t>
+            </a:r>
+            <a:r>
+              <a:rPr lang="en-US" b="1" dirty="0"/>
+              <a:t>JSX</a:t>
+            </a:r>
+            <a:r>
+              <a:rPr lang="en-US" dirty="0"/>
+              <a:t> tags have a tag name, attributes, and children. If an attribute value is enclosed in quotes, the value is a string.</a:t>
+            </a:r>
+            <a:endParaRPr lang="en-US" dirty="0"/>
+          </a:p>
+        </p:txBody>
+      </p:sp>
+    </p:spTree>
+    <p:extLst>
+      <p:ext uri="{BB962C8B-B14F-4D97-AF65-F5344CB8AC3E}">
+        <p14:creationId xmlns:p14="http://schemas.microsoft.com/office/powerpoint/2010/main" val="3047362032"/>
+      </p:ext>
+    </p:extLst>
+  </p:cSld>
+  <p:clrMapOvr>
+    <a:masterClrMapping/>
+  </p:clrMapOvr>
+</p:sld>
+</file>
+
+<file path=ppt/slides/slide11.xml><?xml version="1.0" encoding="utf-8"?>
+<p:sld xmlns:a="http://schemas.openxmlformats.org/drawingml/2006/main" xmlns:r="http://schemas.openxmlformats.org/officeDocument/2006/relationships" xmlns:p="http://schemas.openxmlformats.org/presentationml/2006/main">
+  <p:cSld>
+    <p:spTree>
+      <p:nvGrpSpPr>
+        <p:cNvPr id="1" name=""/>
+        <p:cNvGrpSpPr/>
+        <p:nvPr/>
+      </p:nvGrpSpPr>
+      <p:grpSpPr>
+        <a:xfrm>
+          <a:off x="0" y="0"/>
+          <a:ext cx="0" cy="0"/>
+          <a:chOff x="0" y="0"/>
+          <a:chExt cx="0" cy="0"/>
+        </a:xfrm>
+      </p:grpSpPr>
+      <p:sp>
+        <p:nvSpPr>
+          <p:cNvPr id="4" name="Rectangle 1"/>
+          <p:cNvSpPr>
+            <a:spLocks noChangeArrowheads="1"/>
+          </p:cNvSpPr>
+          <p:nvPr/>
+        </p:nvSpPr>
+        <p:spPr bwMode="auto">
+          <a:xfrm>
+            <a:off x="1828800" y="1217984"/>
+            <a:ext cx="9852338" cy="4414443"/>
+          </a:xfrm>
+          <a:prstGeom prst="rect">
+            <a:avLst/>
+          </a:prstGeom>
+          <a:solidFill>
+            <a:srgbClr val="F5F2F0"/>
+          </a:solidFill>
+          <a:ln>
+            <a:noFill/>
+          </a:ln>
+          <a:effectLst/>
+          <a:extLst>
+            <a:ext uri="{91240B29-F687-4F45-9708-019B960494DF}">
+              <a14:hiddenLine xmlns:a14="http://schemas.microsoft.com/office/drawing/2010/main" w="9525">
+                <a:solidFill>
+                  <a:schemeClr val="tx1"/>
+                </a:solidFill>
+                <a:miter lim="800000"/>
+                <a:headEnd/>
+                <a:tailEnd/>
+              </a14:hiddenLine>
+            </a:ext>
+            <a:ext uri="{AF507438-7753-43E0-B8FC-AC1667EBCBE1}">
+              <a14:hiddenEffects xmlns:a14="http://schemas.microsoft.com/office/drawing/2010/main">
+                <a:effectLst>
+                  <a:outerShdw dist="35921" dir="2700000" algn="ctr" rotWithShape="0">
+                    <a:schemeClr val="bg2"/>
+                  </a:outerShdw>
+                </a:effectLst>
+              </a14:hiddenEffects>
+            </a:ext>
+          </a:extLst>
+        </p:spPr>
+        <p:txBody>
+          <a:bodyPr vert="horz" wrap="square" lIns="0" tIns="357075" rIns="0" bIns="357075" numCol="1" anchor="ctr" anchorCtr="0" compatLnSpc="1">
+            <a:prstTxWarp prst="textNoShape">
+              <a:avLst/>
+            </a:prstTxWarp>
+            <a:spAutoFit/>
+          </a:bodyPr>
+          <a:lstStyle/>
+          <a:p>
+            <a:pPr marL="0" marR="0" lvl="0" indent="0" algn="l" defTabSz="914400" rtl="0" eaLnBrk="0" fontAlgn="base" latinLnBrk="0" hangingPunct="0">
+              <a:lnSpc>
+                <a:spcPct val="100000"/>
+              </a:lnSpc>
+              <a:spcBef>
+                <a:spcPct val="0"/>
+              </a:spcBef>
+              <a:spcAft>
+                <a:spcPct val="0"/>
+              </a:spcAft>
+              <a:buClrTx/>
+              <a:buSzTx/>
+              <a:buFontTx/>
+              <a:buNone/>
+              <a:tabLst/>
+            </a:pPr>
+            <a:r>
+              <a:rPr kumimoji="0" lang="en-US" altLang="en-US" sz="2000" b="0" i="0" u="none" strike="noStrike" cap="none" normalizeH="0" baseline="0" dirty="0" smtClean="0">
+                <a:ln>
+                  <a:noFill/>
+                </a:ln>
+                <a:solidFill>
+                  <a:srgbClr val="999999"/>
+                </a:solidFill>
+                <a:effectLst/>
+                <a:latin typeface="Consolas" panose="020B0609020204030204" pitchFamily="49" charset="0"/>
+                <a:cs typeface="Consolas" panose="020B0609020204030204" pitchFamily="49" charset="0"/>
+              </a:rPr>
+              <a:t>//</a:t>
+            </a:r>
+            <a:r>
+              <a:rPr kumimoji="0" lang="en-US" altLang="en-US" sz="2000" b="0" i="0" u="none" strike="noStrike" cap="none" normalizeH="0" baseline="0" dirty="0" err="1" smtClean="0">
+                <a:ln>
+                  <a:noFill/>
+                </a:ln>
+                <a:solidFill>
+                  <a:srgbClr val="999999"/>
+                </a:solidFill>
+                <a:effectLst/>
+                <a:latin typeface="Consolas" panose="020B0609020204030204" pitchFamily="49" charset="0"/>
+                <a:cs typeface="Consolas" panose="020B0609020204030204" pitchFamily="49" charset="0"/>
+              </a:rPr>
+              <a:t>Wihtout</a:t>
+            </a:r>
+            <a:r>
+              <a:rPr kumimoji="0" lang="en-US" altLang="en-US" sz="2000" b="0" i="0" u="none" strike="noStrike" cap="none" normalizeH="0" baseline="0" dirty="0" smtClean="0">
+                <a:ln>
+                  <a:noFill/>
+                </a:ln>
+                <a:solidFill>
+                  <a:srgbClr val="999999"/>
+                </a:solidFill>
+                <a:effectLst/>
+                <a:latin typeface="Consolas" panose="020B0609020204030204" pitchFamily="49" charset="0"/>
+                <a:cs typeface="Consolas" panose="020B0609020204030204" pitchFamily="49" charset="0"/>
+              </a:rPr>
+              <a:t> JSX</a:t>
+            </a:r>
+          </a:p>
+          <a:p>
+            <a:pPr marL="0" marR="0" lvl="0" indent="0" algn="l" defTabSz="914400" rtl="0" eaLnBrk="0" fontAlgn="base" latinLnBrk="0" hangingPunct="0">
+              <a:lnSpc>
+                <a:spcPct val="100000"/>
+              </a:lnSpc>
+              <a:spcBef>
+                <a:spcPct val="0"/>
+              </a:spcBef>
+              <a:spcAft>
+                <a:spcPct val="0"/>
+              </a:spcAft>
+              <a:buClrTx/>
+              <a:buSzTx/>
+              <a:buFontTx/>
+              <a:buNone/>
+              <a:tabLst/>
+            </a:pPr>
+            <a:r>
+              <a:rPr kumimoji="0" lang="en-US" altLang="en-US" sz="2000" b="0" i="0" u="none" strike="noStrike" cap="none" normalizeH="0" baseline="0" dirty="0" smtClean="0">
+                <a:ln>
+                  <a:noFill/>
+                </a:ln>
+                <a:solidFill>
+                  <a:srgbClr val="999999"/>
+                </a:solidFill>
+                <a:effectLst/>
+                <a:latin typeface="Consolas" panose="020B0609020204030204" pitchFamily="49" charset="0"/>
+                <a:cs typeface="Consolas" panose="020B0609020204030204" pitchFamily="49" charset="0"/>
+              </a:rPr>
+              <a:t>&lt;</a:t>
+            </a:r>
+            <a:r>
+              <a:rPr kumimoji="0" lang="en-US" altLang="en-US" sz="2000" b="0" i="0" u="none" strike="noStrike" cap="none" normalizeH="0" baseline="0" dirty="0" smtClean="0">
+                <a:ln>
+                  <a:noFill/>
+                </a:ln>
+                <a:solidFill>
+                  <a:srgbClr val="990055"/>
+                </a:solidFill>
+                <a:effectLst/>
+                <a:latin typeface="Consolas" panose="020B0609020204030204" pitchFamily="49" charset="0"/>
+                <a:cs typeface="Consolas" panose="020B0609020204030204" pitchFamily="49" charset="0"/>
+              </a:rPr>
+              <a:t>div </a:t>
+            </a:r>
+            <a:r>
+              <a:rPr kumimoji="0" lang="en-US" altLang="en-US" sz="2000" b="0" i="0" u="none" strike="noStrike" cap="none" normalizeH="0" baseline="0" dirty="0" err="1" smtClean="0">
+                <a:ln>
+                  <a:noFill/>
+                </a:ln>
+                <a:solidFill>
+                  <a:srgbClr val="669900"/>
+                </a:solidFill>
+                <a:effectLst/>
+                <a:latin typeface="Consolas" panose="020B0609020204030204" pitchFamily="49" charset="0"/>
+                <a:cs typeface="Consolas" panose="020B0609020204030204" pitchFamily="49" charset="0"/>
+              </a:rPr>
+              <a:t>className</a:t>
+            </a:r>
+            <a:r>
+              <a:rPr kumimoji="0" lang="en-US" altLang="en-US" sz="2000" b="0" i="0" u="none" strike="noStrike" cap="none" normalizeH="0" baseline="0" dirty="0" smtClean="0">
+                <a:ln>
+                  <a:noFill/>
+                </a:ln>
+                <a:solidFill>
+                  <a:srgbClr val="999999"/>
+                </a:solidFill>
+                <a:effectLst/>
+                <a:latin typeface="Consolas" panose="020B0609020204030204" pitchFamily="49" charset="0"/>
+                <a:cs typeface="Consolas" panose="020B0609020204030204" pitchFamily="49" charset="0"/>
+              </a:rPr>
+              <a:t>="</a:t>
+            </a:r>
+            <a:r>
+              <a:rPr kumimoji="0" lang="en-US" altLang="en-US" sz="2000" b="0" i="0" u="none" strike="noStrike" cap="none" normalizeH="0" baseline="0" dirty="0" smtClean="0">
+                <a:ln>
+                  <a:noFill/>
+                </a:ln>
+                <a:solidFill>
+                  <a:srgbClr val="0077AA"/>
+                </a:solidFill>
+                <a:effectLst/>
+                <a:latin typeface="Consolas" panose="020B0609020204030204" pitchFamily="49" charset="0"/>
+                <a:cs typeface="Consolas" panose="020B0609020204030204" pitchFamily="49" charset="0"/>
+              </a:rPr>
+              <a:t>red</a:t>
+            </a:r>
+            <a:r>
+              <a:rPr kumimoji="0" lang="en-US" altLang="en-US" sz="2000" b="0" i="0" u="none" strike="noStrike" cap="none" normalizeH="0" baseline="0" dirty="0" smtClean="0">
+                <a:ln>
+                  <a:noFill/>
+                </a:ln>
+                <a:solidFill>
+                  <a:srgbClr val="999999"/>
+                </a:solidFill>
+                <a:effectLst/>
+                <a:latin typeface="Consolas" panose="020B0609020204030204" pitchFamily="49" charset="0"/>
+                <a:cs typeface="Consolas" panose="020B0609020204030204" pitchFamily="49" charset="0"/>
+              </a:rPr>
+              <a:t>"&gt;</a:t>
+            </a:r>
+            <a:r>
+              <a:rPr kumimoji="0" lang="en-US" altLang="en-US" sz="2000" b="0" i="0" u="none" strike="noStrike" cap="none" normalizeH="0" baseline="0" dirty="0" smtClean="0">
+                <a:ln>
+                  <a:noFill/>
+                </a:ln>
+                <a:solidFill>
+                  <a:srgbClr val="000000"/>
+                </a:solidFill>
+                <a:effectLst/>
+                <a:latin typeface="Consolas" panose="020B0609020204030204" pitchFamily="49" charset="0"/>
+                <a:cs typeface="Consolas" panose="020B0609020204030204" pitchFamily="49" charset="0"/>
+              </a:rPr>
+              <a:t>Children Text</a:t>
+            </a:r>
+            <a:r>
+              <a:rPr kumimoji="0" lang="en-US" altLang="en-US" sz="2000" b="0" i="0" u="none" strike="noStrike" cap="none" normalizeH="0" baseline="0" dirty="0" smtClean="0">
+                <a:ln>
+                  <a:noFill/>
+                </a:ln>
+                <a:solidFill>
+                  <a:srgbClr val="999999"/>
+                </a:solidFill>
+                <a:effectLst/>
+                <a:latin typeface="Consolas" panose="020B0609020204030204" pitchFamily="49" charset="0"/>
+                <a:cs typeface="Consolas" panose="020B0609020204030204" pitchFamily="49" charset="0"/>
+              </a:rPr>
+              <a:t>&lt;/</a:t>
+            </a:r>
+            <a:r>
+              <a:rPr kumimoji="0" lang="en-US" altLang="en-US" sz="2000" b="0" i="0" u="none" strike="noStrike" cap="none" normalizeH="0" baseline="0" dirty="0" smtClean="0">
+                <a:ln>
+                  <a:noFill/>
+                </a:ln>
+                <a:solidFill>
+                  <a:srgbClr val="990055"/>
+                </a:solidFill>
+                <a:effectLst/>
+                <a:latin typeface="Consolas" panose="020B0609020204030204" pitchFamily="49" charset="0"/>
+                <a:cs typeface="Consolas" panose="020B0609020204030204" pitchFamily="49" charset="0"/>
+              </a:rPr>
+              <a:t>div</a:t>
+            </a:r>
+            <a:r>
+              <a:rPr kumimoji="0" lang="en-US" altLang="en-US" sz="2000" b="0" i="0" u="none" strike="noStrike" cap="none" normalizeH="0" baseline="0" dirty="0" smtClean="0">
+                <a:ln>
+                  <a:noFill/>
+                </a:ln>
+                <a:solidFill>
+                  <a:srgbClr val="999999"/>
+                </a:solidFill>
+                <a:effectLst/>
+                <a:latin typeface="Consolas" panose="020B0609020204030204" pitchFamily="49" charset="0"/>
+                <a:cs typeface="Consolas" panose="020B0609020204030204" pitchFamily="49" charset="0"/>
+              </a:rPr>
+              <a:t>&gt;;</a:t>
+            </a:r>
+          </a:p>
+          <a:p>
+            <a:pPr marL="0" marR="0" lvl="0" indent="0" algn="l" defTabSz="914400" rtl="0" eaLnBrk="0" fontAlgn="base" latinLnBrk="0" hangingPunct="0">
+              <a:lnSpc>
+                <a:spcPct val="100000"/>
+              </a:lnSpc>
+              <a:spcBef>
+                <a:spcPct val="0"/>
+              </a:spcBef>
+              <a:spcAft>
+                <a:spcPct val="0"/>
+              </a:spcAft>
+              <a:buClrTx/>
+              <a:buSzTx/>
+              <a:buFontTx/>
+              <a:buNone/>
+              <a:tabLst/>
+            </a:pPr>
+            <a:endParaRPr kumimoji="0" lang="en-US" altLang="en-US" sz="2000" b="0" i="0" u="none" strike="noStrike" cap="none" normalizeH="0" baseline="0" dirty="0" smtClean="0">
+              <a:ln>
+                <a:noFill/>
+              </a:ln>
+              <a:solidFill>
+                <a:srgbClr val="999999"/>
+              </a:solidFill>
+              <a:effectLst/>
+              <a:latin typeface="Consolas" panose="020B0609020204030204" pitchFamily="49" charset="0"/>
+              <a:cs typeface="Consolas" panose="020B0609020204030204" pitchFamily="49" charset="0"/>
+            </a:endParaRPr>
+          </a:p>
+          <a:p>
+            <a:pPr marL="0" marR="0" lvl="0" indent="0" algn="l" defTabSz="914400" rtl="0" eaLnBrk="0" fontAlgn="base" latinLnBrk="0" hangingPunct="0">
+              <a:lnSpc>
+                <a:spcPct val="100000"/>
+              </a:lnSpc>
+              <a:spcBef>
+                <a:spcPct val="0"/>
+              </a:spcBef>
+              <a:spcAft>
+                <a:spcPct val="0"/>
+              </a:spcAft>
+              <a:buClrTx/>
+              <a:buSzTx/>
+              <a:buFontTx/>
+              <a:buNone/>
+              <a:tabLst/>
+            </a:pPr>
+            <a:r>
+              <a:rPr kumimoji="0" lang="en-US" altLang="en-US" sz="2000" b="0" i="0" u="none" strike="noStrike" cap="none" normalizeH="0" baseline="0" dirty="0" smtClean="0">
+                <a:ln>
+                  <a:noFill/>
+                </a:ln>
+                <a:solidFill>
+                  <a:srgbClr val="999999"/>
+                </a:solidFill>
+                <a:effectLst/>
+                <a:latin typeface="Consolas" panose="020B0609020204030204" pitchFamily="49" charset="0"/>
+                <a:cs typeface="Consolas" panose="020B0609020204030204" pitchFamily="49" charset="0"/>
+              </a:rPr>
+              <a:t>&lt;</a:t>
+            </a:r>
+            <a:r>
+              <a:rPr kumimoji="0" lang="en-US" altLang="en-US" sz="2000" b="0" i="0" u="none" strike="noStrike" cap="none" normalizeH="0" baseline="0" dirty="0" err="1" smtClean="0">
+                <a:ln>
+                  <a:noFill/>
+                </a:ln>
+                <a:solidFill>
+                  <a:srgbClr val="990055"/>
+                </a:solidFill>
+                <a:effectLst/>
+                <a:latin typeface="Consolas" panose="020B0609020204030204" pitchFamily="49" charset="0"/>
+                <a:cs typeface="Consolas" panose="020B0609020204030204" pitchFamily="49" charset="0"/>
+              </a:rPr>
+              <a:t>MyCounter</a:t>
+            </a:r>
+            <a:r>
+              <a:rPr kumimoji="0" lang="en-US" altLang="en-US" sz="2000" b="0" i="0" u="none" strike="noStrike" cap="none" normalizeH="0" baseline="0" dirty="0" smtClean="0">
+                <a:ln>
+                  <a:noFill/>
+                </a:ln>
+                <a:solidFill>
+                  <a:srgbClr val="990055"/>
+                </a:solidFill>
+                <a:effectLst/>
+                <a:latin typeface="Consolas" panose="020B0609020204030204" pitchFamily="49" charset="0"/>
+                <a:cs typeface="Consolas" panose="020B0609020204030204" pitchFamily="49" charset="0"/>
+              </a:rPr>
+              <a:t> </a:t>
+            </a:r>
+            <a:r>
+              <a:rPr kumimoji="0" lang="en-US" altLang="en-US" sz="2000" b="0" i="0" u="none" strike="noStrike" cap="none" normalizeH="0" baseline="0" dirty="0" smtClean="0">
+                <a:ln>
+                  <a:noFill/>
+                </a:ln>
+                <a:solidFill>
+                  <a:srgbClr val="669900"/>
+                </a:solidFill>
+                <a:effectLst/>
+                <a:latin typeface="Consolas" panose="020B0609020204030204" pitchFamily="49" charset="0"/>
+                <a:cs typeface="Consolas" panose="020B0609020204030204" pitchFamily="49" charset="0"/>
+              </a:rPr>
+              <a:t>count</a:t>
+            </a:r>
+            <a:r>
+              <a:rPr kumimoji="0" lang="en-US" altLang="en-US" sz="2000" b="0" i="0" u="none" strike="noStrike" cap="none" normalizeH="0" baseline="0" dirty="0" smtClean="0">
+                <a:ln>
+                  <a:noFill/>
+                </a:ln>
+                <a:solidFill>
+                  <a:srgbClr val="999999"/>
+                </a:solidFill>
+                <a:effectLst/>
+                <a:latin typeface="Consolas" panose="020B0609020204030204" pitchFamily="49" charset="0"/>
+                <a:cs typeface="Consolas" panose="020B0609020204030204" pitchFamily="49" charset="0"/>
+              </a:rPr>
+              <a:t>={</a:t>
+            </a:r>
+            <a:r>
+              <a:rPr kumimoji="0" lang="en-US" altLang="en-US" sz="2000" b="0" i="0" u="none" strike="noStrike" cap="none" normalizeH="0" baseline="0" dirty="0" smtClean="0">
+                <a:ln>
+                  <a:noFill/>
+                </a:ln>
+                <a:solidFill>
+                  <a:srgbClr val="990055"/>
+                </a:solidFill>
+                <a:effectLst/>
+                <a:latin typeface="Consolas" panose="020B0609020204030204" pitchFamily="49" charset="0"/>
+                <a:cs typeface="Consolas" panose="020B0609020204030204" pitchFamily="49" charset="0"/>
+              </a:rPr>
+              <a:t>3 + 5</a:t>
+            </a:r>
+            <a:r>
+              <a:rPr kumimoji="0" lang="en-US" altLang="en-US" sz="2000" b="0" i="0" u="none" strike="noStrike" cap="none" normalizeH="0" baseline="0" dirty="0" smtClean="0">
+                <a:ln>
+                  <a:noFill/>
+                </a:ln>
+                <a:solidFill>
+                  <a:srgbClr val="999999"/>
+                </a:solidFill>
+                <a:effectLst/>
+                <a:latin typeface="Consolas" panose="020B0609020204030204" pitchFamily="49" charset="0"/>
+                <a:cs typeface="Consolas" panose="020B0609020204030204" pitchFamily="49" charset="0"/>
+              </a:rPr>
+              <a:t>}</a:t>
+            </a:r>
+            <a:r>
+              <a:rPr kumimoji="0" lang="en-US" altLang="en-US" sz="2000" b="0" i="0" u="none" strike="noStrike" cap="none" normalizeH="0" baseline="0" dirty="0" smtClean="0">
+                <a:ln>
+                  <a:noFill/>
+                </a:ln>
+                <a:solidFill>
+                  <a:srgbClr val="990055"/>
+                </a:solidFill>
+                <a:effectLst/>
+                <a:latin typeface="Consolas" panose="020B0609020204030204" pitchFamily="49" charset="0"/>
+                <a:cs typeface="Consolas" panose="020B0609020204030204" pitchFamily="49" charset="0"/>
+              </a:rPr>
+              <a:t> </a:t>
+            </a:r>
+            <a:r>
+              <a:rPr kumimoji="0" lang="en-US" altLang="en-US" sz="2000" b="0" i="0" u="none" strike="noStrike" cap="none" normalizeH="0" baseline="0" dirty="0" smtClean="0">
+                <a:ln>
+                  <a:noFill/>
+                </a:ln>
+                <a:solidFill>
+                  <a:srgbClr val="999999"/>
+                </a:solidFill>
+                <a:effectLst/>
+                <a:latin typeface="Consolas" panose="020B0609020204030204" pitchFamily="49" charset="0"/>
+                <a:cs typeface="Consolas" panose="020B0609020204030204" pitchFamily="49" charset="0"/>
+              </a:rPr>
+              <a:t>/&gt;;</a:t>
+            </a:r>
+            <a:r>
+              <a:rPr kumimoji="0" lang="en-US" altLang="en-US" sz="2000" b="0" i="0" u="none" strike="noStrike" cap="none" normalizeH="0" baseline="0" dirty="0" smtClean="0">
+                <a:ln>
+                  <a:noFill/>
+                </a:ln>
+                <a:solidFill>
+                  <a:srgbClr val="000000"/>
+                </a:solidFill>
+                <a:effectLst/>
+                <a:latin typeface="Consolas" panose="020B0609020204030204" pitchFamily="49" charset="0"/>
+                <a:cs typeface="Consolas" panose="020B0609020204030204" pitchFamily="49" charset="0"/>
+              </a:rPr>
+              <a:t> </a:t>
+            </a:r>
+          </a:p>
+          <a:p>
+            <a:pPr marL="0" marR="0" lvl="0" indent="0" algn="l" defTabSz="914400" rtl="0" eaLnBrk="0" fontAlgn="base" latinLnBrk="0" hangingPunct="0">
+              <a:lnSpc>
+                <a:spcPct val="100000"/>
+              </a:lnSpc>
+              <a:spcBef>
+                <a:spcPct val="0"/>
+              </a:spcBef>
+              <a:spcAft>
+                <a:spcPct val="0"/>
+              </a:spcAft>
+              <a:buClrTx/>
+              <a:buSzTx/>
+              <a:buFontTx/>
+              <a:buNone/>
+              <a:tabLst/>
+            </a:pPr>
+            <a:endParaRPr kumimoji="0" lang="en-US" altLang="en-US" sz="2000" b="0" i="0" u="none" strike="noStrike" cap="none" normalizeH="0" baseline="0" dirty="0" smtClean="0">
+              <a:ln>
+                <a:noFill/>
+              </a:ln>
+              <a:solidFill>
+                <a:srgbClr val="000000"/>
+              </a:solidFill>
+              <a:effectLst/>
+              <a:latin typeface="Consolas" panose="020B0609020204030204" pitchFamily="49" charset="0"/>
+              <a:cs typeface="Consolas" panose="020B0609020204030204" pitchFamily="49" charset="0"/>
+            </a:endParaRPr>
+          </a:p>
+          <a:p>
+            <a:pPr marL="0" marR="0" lvl="0" indent="0" algn="l" defTabSz="914400" rtl="0" eaLnBrk="0" fontAlgn="base" latinLnBrk="0" hangingPunct="0">
+              <a:lnSpc>
+                <a:spcPct val="100000"/>
+              </a:lnSpc>
+              <a:spcBef>
+                <a:spcPct val="0"/>
+              </a:spcBef>
+              <a:spcAft>
+                <a:spcPct val="0"/>
+              </a:spcAft>
+              <a:buClrTx/>
+              <a:buSzTx/>
+              <a:buFontTx/>
+              <a:buNone/>
+              <a:tabLst/>
+            </a:pPr>
+            <a:r>
+              <a:rPr kumimoji="0" lang="en-US" altLang="en-US" sz="2000" b="0" i="0" u="none" strike="noStrike" cap="none" normalizeH="0" baseline="0" dirty="0" smtClean="0">
+                <a:ln>
+                  <a:noFill/>
+                </a:ln>
+                <a:solidFill>
+                  <a:srgbClr val="708090"/>
+                </a:solidFill>
+                <a:effectLst/>
+                <a:latin typeface="Consolas" panose="020B0609020204030204" pitchFamily="49" charset="0"/>
+                <a:cs typeface="Consolas" panose="020B0609020204030204" pitchFamily="49" charset="0"/>
+              </a:rPr>
+              <a:t>// Here, we set the "scores" attribute below to a JavaScript object.</a:t>
+            </a:r>
+            <a:r>
+              <a:rPr kumimoji="0" lang="en-US" altLang="en-US" sz="2000" b="0" i="0" u="none" strike="noStrike" cap="none" normalizeH="0" baseline="0" dirty="0" smtClean="0">
+                <a:ln>
+                  <a:noFill/>
+                </a:ln>
+                <a:solidFill>
+                  <a:srgbClr val="000000"/>
+                </a:solidFill>
+                <a:effectLst/>
+                <a:latin typeface="Consolas" panose="020B0609020204030204" pitchFamily="49" charset="0"/>
+                <a:cs typeface="Consolas" panose="020B0609020204030204" pitchFamily="49" charset="0"/>
+              </a:rPr>
+              <a:t> </a:t>
+            </a:r>
+          </a:p>
+          <a:p>
+            <a:pPr marL="0" marR="0" lvl="0" indent="0" algn="l" defTabSz="914400" rtl="0" eaLnBrk="0" fontAlgn="base" latinLnBrk="0" hangingPunct="0">
+              <a:lnSpc>
+                <a:spcPct val="100000"/>
+              </a:lnSpc>
+              <a:spcBef>
+                <a:spcPct val="0"/>
+              </a:spcBef>
+              <a:spcAft>
+                <a:spcPct val="0"/>
+              </a:spcAft>
+              <a:buClrTx/>
+              <a:buSzTx/>
+              <a:buFontTx/>
+              <a:buNone/>
+              <a:tabLst/>
+            </a:pPr>
+            <a:r>
+              <a:rPr kumimoji="0" lang="en-US" altLang="en-US" sz="2000" b="0" i="0" u="none" strike="noStrike" cap="none" normalizeH="0" baseline="0" dirty="0" err="1" smtClean="0">
+                <a:ln>
+                  <a:noFill/>
+                </a:ln>
+                <a:solidFill>
+                  <a:srgbClr val="0077AA"/>
+                </a:solidFill>
+                <a:effectLst/>
+                <a:latin typeface="Consolas" panose="020B0609020204030204" pitchFamily="49" charset="0"/>
+                <a:cs typeface="Consolas" panose="020B0609020204030204" pitchFamily="49" charset="0"/>
+              </a:rPr>
+              <a:t>var</a:t>
+            </a:r>
+            <a:r>
+              <a:rPr kumimoji="0" lang="en-US" altLang="en-US" sz="2000" b="0" i="0" u="none" strike="noStrike" cap="none" normalizeH="0" baseline="0" dirty="0" smtClean="0">
+                <a:ln>
+                  <a:noFill/>
+                </a:ln>
+                <a:solidFill>
+                  <a:srgbClr val="000000"/>
+                </a:solidFill>
+                <a:effectLst/>
+                <a:latin typeface="Consolas" panose="020B0609020204030204" pitchFamily="49" charset="0"/>
+                <a:cs typeface="Consolas" panose="020B0609020204030204" pitchFamily="49" charset="0"/>
+              </a:rPr>
+              <a:t> </a:t>
+            </a:r>
+            <a:r>
+              <a:rPr kumimoji="0" lang="en-US" altLang="en-US" sz="2000" b="0" i="0" u="none" strike="noStrike" cap="none" normalizeH="0" baseline="0" dirty="0" err="1" smtClean="0">
+                <a:ln>
+                  <a:noFill/>
+                </a:ln>
+                <a:solidFill>
+                  <a:srgbClr val="000000"/>
+                </a:solidFill>
+                <a:effectLst/>
+                <a:latin typeface="Consolas" panose="020B0609020204030204" pitchFamily="49" charset="0"/>
+                <a:cs typeface="Consolas" panose="020B0609020204030204" pitchFamily="49" charset="0"/>
+              </a:rPr>
+              <a:t>gameScores</a:t>
+            </a:r>
+            <a:r>
+              <a:rPr kumimoji="0" lang="en-US" altLang="en-US" sz="2000" b="0" i="0" u="none" strike="noStrike" cap="none" normalizeH="0" baseline="0" dirty="0" smtClean="0">
+                <a:ln>
+                  <a:noFill/>
+                </a:ln>
+                <a:solidFill>
+                  <a:srgbClr val="000000"/>
+                </a:solidFill>
+                <a:effectLst/>
+                <a:latin typeface="Consolas" panose="020B0609020204030204" pitchFamily="49" charset="0"/>
+                <a:cs typeface="Consolas" panose="020B0609020204030204" pitchFamily="49" charset="0"/>
+              </a:rPr>
+              <a:t> </a:t>
+            </a:r>
+            <a:r>
+              <a:rPr kumimoji="0" lang="en-US" altLang="en-US" sz="2000" b="0" i="0" u="none" strike="noStrike" cap="none" normalizeH="0" baseline="0" dirty="0" smtClean="0">
+                <a:ln>
+                  <a:noFill/>
+                </a:ln>
+                <a:solidFill>
+                  <a:srgbClr val="A67F59"/>
+                </a:solidFill>
+                <a:effectLst/>
+                <a:latin typeface="Consolas" panose="020B0609020204030204" pitchFamily="49" charset="0"/>
+                <a:cs typeface="Consolas" panose="020B0609020204030204" pitchFamily="49" charset="0"/>
+              </a:rPr>
+              <a:t>=</a:t>
+            </a:r>
+            <a:r>
+              <a:rPr kumimoji="0" lang="en-US" altLang="en-US" sz="2000" b="0" i="0" u="none" strike="noStrike" cap="none" normalizeH="0" baseline="0" dirty="0" smtClean="0">
+                <a:ln>
+                  <a:noFill/>
+                </a:ln>
+                <a:solidFill>
+                  <a:srgbClr val="000000"/>
+                </a:solidFill>
+                <a:effectLst/>
+                <a:latin typeface="Consolas" panose="020B0609020204030204" pitchFamily="49" charset="0"/>
+                <a:cs typeface="Consolas" panose="020B0609020204030204" pitchFamily="49" charset="0"/>
+              </a:rPr>
+              <a:t> </a:t>
+            </a:r>
+            <a:r>
+              <a:rPr kumimoji="0" lang="en-US" altLang="en-US" sz="2000" b="0" i="0" u="none" strike="noStrike" cap="none" normalizeH="0" baseline="0" dirty="0" smtClean="0">
+                <a:ln>
+                  <a:noFill/>
+                </a:ln>
+                <a:solidFill>
+                  <a:srgbClr val="999999"/>
+                </a:solidFill>
+                <a:effectLst/>
+                <a:latin typeface="Consolas" panose="020B0609020204030204" pitchFamily="49" charset="0"/>
+                <a:cs typeface="Consolas" panose="020B0609020204030204" pitchFamily="49" charset="0"/>
+              </a:rPr>
+              <a:t>{</a:t>
+            </a:r>
+            <a:r>
+              <a:rPr kumimoji="0" lang="en-US" altLang="en-US" sz="2000" b="0" i="0" u="none" strike="noStrike" cap="none" normalizeH="0" baseline="0" dirty="0" smtClean="0">
+                <a:ln>
+                  <a:noFill/>
+                </a:ln>
+                <a:solidFill>
+                  <a:srgbClr val="000000"/>
+                </a:solidFill>
+                <a:effectLst/>
+                <a:latin typeface="Consolas" panose="020B0609020204030204" pitchFamily="49" charset="0"/>
+                <a:cs typeface="Consolas" panose="020B0609020204030204" pitchFamily="49" charset="0"/>
+              </a:rPr>
+              <a:t> player1</a:t>
+            </a:r>
+            <a:r>
+              <a:rPr kumimoji="0" lang="en-US" altLang="en-US" sz="2000" b="0" i="0" u="none" strike="noStrike" cap="none" normalizeH="0" baseline="0" dirty="0" smtClean="0">
+                <a:ln>
+                  <a:noFill/>
+                </a:ln>
+                <a:solidFill>
+                  <a:srgbClr val="999999"/>
+                </a:solidFill>
+                <a:effectLst/>
+                <a:latin typeface="Consolas" panose="020B0609020204030204" pitchFamily="49" charset="0"/>
+                <a:cs typeface="Consolas" panose="020B0609020204030204" pitchFamily="49" charset="0"/>
+              </a:rPr>
+              <a:t>:</a:t>
+            </a:r>
+            <a:r>
+              <a:rPr kumimoji="0" lang="en-US" altLang="en-US" sz="2000" b="0" i="0" u="none" strike="noStrike" cap="none" normalizeH="0" baseline="0" dirty="0" smtClean="0">
+                <a:ln>
+                  <a:noFill/>
+                </a:ln>
+                <a:solidFill>
+                  <a:srgbClr val="000000"/>
+                </a:solidFill>
+                <a:effectLst/>
+                <a:latin typeface="Consolas" panose="020B0609020204030204" pitchFamily="49" charset="0"/>
+                <a:cs typeface="Consolas" panose="020B0609020204030204" pitchFamily="49" charset="0"/>
+              </a:rPr>
+              <a:t> </a:t>
+            </a:r>
+            <a:r>
+              <a:rPr kumimoji="0" lang="en-US" altLang="en-US" sz="2000" b="0" i="0" u="none" strike="noStrike" cap="none" normalizeH="0" baseline="0" dirty="0" smtClean="0">
+                <a:ln>
+                  <a:noFill/>
+                </a:ln>
+                <a:solidFill>
+                  <a:srgbClr val="990055"/>
+                </a:solidFill>
+                <a:effectLst/>
+                <a:latin typeface="Consolas" panose="020B0609020204030204" pitchFamily="49" charset="0"/>
+                <a:cs typeface="Consolas" panose="020B0609020204030204" pitchFamily="49" charset="0"/>
+              </a:rPr>
+              <a:t>2</a:t>
+            </a:r>
+            <a:r>
+              <a:rPr kumimoji="0" lang="en-US" altLang="en-US" sz="2000" b="0" i="0" u="none" strike="noStrike" cap="none" normalizeH="0" baseline="0" dirty="0" smtClean="0">
+                <a:ln>
+                  <a:noFill/>
+                </a:ln>
+                <a:solidFill>
+                  <a:srgbClr val="999999"/>
+                </a:solidFill>
+                <a:effectLst/>
+                <a:latin typeface="Consolas" panose="020B0609020204030204" pitchFamily="49" charset="0"/>
+                <a:cs typeface="Consolas" panose="020B0609020204030204" pitchFamily="49" charset="0"/>
+              </a:rPr>
+              <a:t>,</a:t>
+            </a:r>
+            <a:r>
+              <a:rPr kumimoji="0" lang="en-US" altLang="en-US" sz="2000" b="0" i="0" u="none" strike="noStrike" cap="none" normalizeH="0" baseline="0" dirty="0" smtClean="0">
+                <a:ln>
+                  <a:noFill/>
+                </a:ln>
+                <a:solidFill>
+                  <a:srgbClr val="000000"/>
+                </a:solidFill>
+                <a:effectLst/>
+                <a:latin typeface="Consolas" panose="020B0609020204030204" pitchFamily="49" charset="0"/>
+                <a:cs typeface="Consolas" panose="020B0609020204030204" pitchFamily="49" charset="0"/>
+              </a:rPr>
+              <a:t> player2</a:t>
+            </a:r>
+            <a:r>
+              <a:rPr kumimoji="0" lang="en-US" altLang="en-US" sz="2000" b="0" i="0" u="none" strike="noStrike" cap="none" normalizeH="0" baseline="0" dirty="0" smtClean="0">
+                <a:ln>
+                  <a:noFill/>
+                </a:ln>
+                <a:solidFill>
+                  <a:srgbClr val="999999"/>
+                </a:solidFill>
+                <a:effectLst/>
+                <a:latin typeface="Consolas" panose="020B0609020204030204" pitchFamily="49" charset="0"/>
+                <a:cs typeface="Consolas" panose="020B0609020204030204" pitchFamily="49" charset="0"/>
+              </a:rPr>
+              <a:t>:</a:t>
+            </a:r>
+            <a:r>
+              <a:rPr kumimoji="0" lang="en-US" altLang="en-US" sz="2000" b="0" i="0" u="none" strike="noStrike" cap="none" normalizeH="0" baseline="0" dirty="0" smtClean="0">
+                <a:ln>
+                  <a:noFill/>
+                </a:ln>
+                <a:solidFill>
+                  <a:srgbClr val="000000"/>
+                </a:solidFill>
+                <a:effectLst/>
+                <a:latin typeface="Consolas" panose="020B0609020204030204" pitchFamily="49" charset="0"/>
+                <a:cs typeface="Consolas" panose="020B0609020204030204" pitchFamily="49" charset="0"/>
+              </a:rPr>
+              <a:t> </a:t>
+            </a:r>
+            <a:r>
+              <a:rPr kumimoji="0" lang="en-US" altLang="en-US" sz="2000" b="0" i="0" u="none" strike="noStrike" cap="none" normalizeH="0" baseline="0" dirty="0" smtClean="0">
+                <a:ln>
+                  <a:noFill/>
+                </a:ln>
+                <a:solidFill>
+                  <a:srgbClr val="990055"/>
+                </a:solidFill>
+                <a:effectLst/>
+                <a:latin typeface="Consolas" panose="020B0609020204030204" pitchFamily="49" charset="0"/>
+                <a:cs typeface="Consolas" panose="020B0609020204030204" pitchFamily="49" charset="0"/>
+              </a:rPr>
+              <a:t>5</a:t>
+            </a:r>
+            <a:r>
+              <a:rPr kumimoji="0" lang="en-US" altLang="en-US" sz="2000" b="0" i="0" u="none" strike="noStrike" cap="none" normalizeH="0" baseline="0" dirty="0" smtClean="0">
+                <a:ln>
+                  <a:noFill/>
+                </a:ln>
+                <a:solidFill>
+                  <a:srgbClr val="000000"/>
+                </a:solidFill>
+                <a:effectLst/>
+                <a:latin typeface="Consolas" panose="020B0609020204030204" pitchFamily="49" charset="0"/>
+                <a:cs typeface="Consolas" panose="020B0609020204030204" pitchFamily="49" charset="0"/>
+              </a:rPr>
+              <a:t> </a:t>
+            </a:r>
+            <a:r>
+              <a:rPr kumimoji="0" lang="en-US" altLang="en-US" sz="2000" b="0" i="0" u="none" strike="noStrike" cap="none" normalizeH="0" baseline="0" dirty="0" smtClean="0">
+                <a:ln>
+                  <a:noFill/>
+                </a:ln>
+                <a:solidFill>
+                  <a:srgbClr val="999999"/>
+                </a:solidFill>
+                <a:effectLst/>
+                <a:latin typeface="Consolas" panose="020B0609020204030204" pitchFamily="49" charset="0"/>
+                <a:cs typeface="Consolas" panose="020B0609020204030204" pitchFamily="49" charset="0"/>
+              </a:rPr>
+              <a:t>};</a:t>
+            </a:r>
+            <a:r>
+              <a:rPr kumimoji="0" lang="en-US" altLang="en-US" sz="2000" b="0" i="0" u="none" strike="noStrike" cap="none" normalizeH="0" baseline="0" dirty="0" smtClean="0">
+                <a:ln>
+                  <a:noFill/>
+                </a:ln>
+                <a:solidFill>
+                  <a:srgbClr val="000000"/>
+                </a:solidFill>
+                <a:effectLst/>
+                <a:latin typeface="Consolas" panose="020B0609020204030204" pitchFamily="49" charset="0"/>
+                <a:cs typeface="Consolas" panose="020B0609020204030204" pitchFamily="49" charset="0"/>
+              </a:rPr>
+              <a:t> </a:t>
+            </a:r>
+          </a:p>
+          <a:p>
+            <a:pPr marL="0" marR="0" lvl="0" indent="0" algn="l" defTabSz="914400" rtl="0" eaLnBrk="0" fontAlgn="base" latinLnBrk="0" hangingPunct="0">
+              <a:lnSpc>
+                <a:spcPct val="100000"/>
+              </a:lnSpc>
+              <a:spcBef>
+                <a:spcPct val="0"/>
+              </a:spcBef>
+              <a:spcAft>
+                <a:spcPct val="0"/>
+              </a:spcAft>
+              <a:buClrTx/>
+              <a:buSzTx/>
+              <a:buFontTx/>
+              <a:buNone/>
+              <a:tabLst/>
+            </a:pPr>
+            <a:endParaRPr kumimoji="0" lang="en-US" altLang="en-US" sz="2000" b="0" i="0" u="none" strike="noStrike" cap="none" normalizeH="0" baseline="0" dirty="0" smtClean="0">
+              <a:ln>
+                <a:noFill/>
+              </a:ln>
+              <a:solidFill>
+                <a:srgbClr val="000000"/>
+              </a:solidFill>
+              <a:effectLst/>
+              <a:latin typeface="Consolas" panose="020B0609020204030204" pitchFamily="49" charset="0"/>
+              <a:cs typeface="Consolas" panose="020B0609020204030204" pitchFamily="49" charset="0"/>
+            </a:endParaRPr>
+          </a:p>
+          <a:p>
+            <a:pPr marL="0" marR="0" lvl="0" indent="0" algn="l" defTabSz="914400" rtl="0" eaLnBrk="0" fontAlgn="base" latinLnBrk="0" hangingPunct="0">
+              <a:lnSpc>
+                <a:spcPct val="100000"/>
+              </a:lnSpc>
+              <a:spcBef>
+                <a:spcPct val="0"/>
+              </a:spcBef>
+              <a:spcAft>
+                <a:spcPct val="0"/>
+              </a:spcAft>
+              <a:buClrTx/>
+              <a:buSzTx/>
+              <a:buFontTx/>
+              <a:buNone/>
+              <a:tabLst/>
+            </a:pPr>
+            <a:r>
+              <a:rPr kumimoji="0" lang="en-US" altLang="en-US" sz="2000" b="0" i="0" u="none" strike="noStrike" cap="none" normalizeH="0" baseline="0" dirty="0" smtClean="0">
+                <a:ln>
+                  <a:noFill/>
+                </a:ln>
+                <a:solidFill>
+                  <a:srgbClr val="999999"/>
+                </a:solidFill>
+                <a:effectLst/>
+                <a:latin typeface="Consolas" panose="020B0609020204030204" pitchFamily="49" charset="0"/>
+                <a:cs typeface="Consolas" panose="020B0609020204030204" pitchFamily="49" charset="0"/>
+              </a:rPr>
+              <a:t>&lt;</a:t>
+            </a:r>
+            <a:r>
+              <a:rPr kumimoji="0" lang="en-US" altLang="en-US" sz="2000" b="0" i="0" u="none" strike="noStrike" cap="none" normalizeH="0" baseline="0" dirty="0" err="1" smtClean="0">
+                <a:ln>
+                  <a:noFill/>
+                </a:ln>
+                <a:solidFill>
+                  <a:srgbClr val="990055"/>
+                </a:solidFill>
+                <a:effectLst/>
+                <a:latin typeface="Consolas" panose="020B0609020204030204" pitchFamily="49" charset="0"/>
+                <a:cs typeface="Consolas" panose="020B0609020204030204" pitchFamily="49" charset="0"/>
+              </a:rPr>
+              <a:t>DashboardUnit</a:t>
+            </a:r>
+            <a:r>
+              <a:rPr kumimoji="0" lang="en-US" altLang="en-US" sz="2000" b="0" i="0" u="none" strike="noStrike" cap="none" normalizeH="0" baseline="0" dirty="0" smtClean="0">
+                <a:ln>
+                  <a:noFill/>
+                </a:ln>
+                <a:solidFill>
+                  <a:srgbClr val="990055"/>
+                </a:solidFill>
+                <a:effectLst/>
+                <a:latin typeface="Consolas" panose="020B0609020204030204" pitchFamily="49" charset="0"/>
+                <a:cs typeface="Consolas" panose="020B0609020204030204" pitchFamily="49" charset="0"/>
+              </a:rPr>
+              <a:t> </a:t>
+            </a:r>
+            <a:r>
+              <a:rPr kumimoji="0" lang="en-US" altLang="en-US" sz="2000" b="0" i="0" u="none" strike="noStrike" cap="none" normalizeH="0" baseline="0" dirty="0" smtClean="0">
+                <a:ln>
+                  <a:noFill/>
+                </a:ln>
+                <a:solidFill>
+                  <a:srgbClr val="669900"/>
+                </a:solidFill>
+                <a:effectLst/>
+                <a:latin typeface="Consolas" panose="020B0609020204030204" pitchFamily="49" charset="0"/>
+                <a:cs typeface="Consolas" panose="020B0609020204030204" pitchFamily="49" charset="0"/>
+              </a:rPr>
+              <a:t>data-index</a:t>
+            </a:r>
+            <a:r>
+              <a:rPr kumimoji="0" lang="en-US" altLang="en-US" sz="2000" b="0" i="0" u="none" strike="noStrike" cap="none" normalizeH="0" baseline="0" dirty="0" smtClean="0">
+                <a:ln>
+                  <a:noFill/>
+                </a:ln>
+                <a:solidFill>
+                  <a:srgbClr val="999999"/>
+                </a:solidFill>
+                <a:effectLst/>
+                <a:latin typeface="Consolas" panose="020B0609020204030204" pitchFamily="49" charset="0"/>
+                <a:cs typeface="Consolas" panose="020B0609020204030204" pitchFamily="49" charset="0"/>
+              </a:rPr>
+              <a:t>="</a:t>
+            </a:r>
+            <a:r>
+              <a:rPr kumimoji="0" lang="en-US" altLang="en-US" sz="2000" b="0" i="0" u="none" strike="noStrike" cap="none" normalizeH="0" baseline="0" dirty="0" smtClean="0">
+                <a:ln>
+                  <a:noFill/>
+                </a:ln>
+                <a:solidFill>
+                  <a:srgbClr val="0077AA"/>
+                </a:solidFill>
+                <a:effectLst/>
+                <a:latin typeface="Consolas" panose="020B0609020204030204" pitchFamily="49" charset="0"/>
+                <a:cs typeface="Consolas" panose="020B0609020204030204" pitchFamily="49" charset="0"/>
+              </a:rPr>
+              <a:t>2</a:t>
+            </a:r>
+            <a:r>
+              <a:rPr kumimoji="0" lang="en-US" altLang="en-US" sz="2000" b="0" i="0" u="none" strike="noStrike" cap="none" normalizeH="0" baseline="0" dirty="0" smtClean="0">
+                <a:ln>
+                  <a:noFill/>
+                </a:ln>
+                <a:solidFill>
+                  <a:srgbClr val="999999"/>
+                </a:solidFill>
+                <a:effectLst/>
+                <a:latin typeface="Consolas" panose="020B0609020204030204" pitchFamily="49" charset="0"/>
+                <a:cs typeface="Consolas" panose="020B0609020204030204" pitchFamily="49" charset="0"/>
+              </a:rPr>
+              <a:t>"&gt;</a:t>
+            </a:r>
+            <a:r>
+              <a:rPr kumimoji="0" lang="en-US" altLang="en-US" sz="2000" b="0" i="0" u="none" strike="noStrike" cap="none" normalizeH="0" baseline="0" dirty="0" smtClean="0">
+                <a:ln>
+                  <a:noFill/>
+                </a:ln>
+                <a:solidFill>
+                  <a:srgbClr val="000000"/>
+                </a:solidFill>
+                <a:effectLst/>
+                <a:latin typeface="Consolas" panose="020B0609020204030204" pitchFamily="49" charset="0"/>
+                <a:cs typeface="Consolas" panose="020B0609020204030204" pitchFamily="49" charset="0"/>
+              </a:rPr>
+              <a:t> </a:t>
+            </a:r>
+          </a:p>
+          <a:p>
+            <a:pPr marL="0" marR="0" lvl="0" indent="0" algn="l" defTabSz="914400" rtl="0" eaLnBrk="0" fontAlgn="base" latinLnBrk="0" hangingPunct="0">
+              <a:lnSpc>
+                <a:spcPct val="100000"/>
+              </a:lnSpc>
+              <a:spcBef>
+                <a:spcPct val="0"/>
+              </a:spcBef>
+              <a:spcAft>
+                <a:spcPct val="0"/>
+              </a:spcAft>
+              <a:buClrTx/>
+              <a:buSzTx/>
+              <a:buFontTx/>
+              <a:buNone/>
+              <a:tabLst/>
+            </a:pPr>
+            <a:r>
+              <a:rPr lang="en-US" altLang="en-US" sz="2000" dirty="0">
+                <a:solidFill>
+                  <a:srgbClr val="000000"/>
+                </a:solidFill>
+                <a:latin typeface="Consolas" panose="020B0609020204030204" pitchFamily="49" charset="0"/>
+                <a:cs typeface="Consolas" panose="020B0609020204030204" pitchFamily="49" charset="0"/>
+              </a:rPr>
+              <a:t>	</a:t>
+            </a:r>
+            <a:r>
+              <a:rPr kumimoji="0" lang="en-US" altLang="en-US" sz="2000" b="0" i="0" u="none" strike="noStrike" cap="none" normalizeH="0" baseline="0" dirty="0" smtClean="0">
+                <a:ln>
+                  <a:noFill/>
+                </a:ln>
+                <a:solidFill>
+                  <a:srgbClr val="999999"/>
+                </a:solidFill>
+                <a:effectLst/>
+                <a:latin typeface="Consolas" panose="020B0609020204030204" pitchFamily="49" charset="0"/>
+                <a:cs typeface="Consolas" panose="020B0609020204030204" pitchFamily="49" charset="0"/>
+              </a:rPr>
+              <a:t>&lt;</a:t>
+            </a:r>
+            <a:r>
+              <a:rPr kumimoji="0" lang="en-US" altLang="en-US" sz="2000" b="0" i="0" u="none" strike="noStrike" cap="none" normalizeH="0" baseline="0" dirty="0" smtClean="0">
+                <a:ln>
+                  <a:noFill/>
+                </a:ln>
+                <a:solidFill>
+                  <a:srgbClr val="990055"/>
+                </a:solidFill>
+                <a:effectLst/>
+                <a:latin typeface="Consolas" panose="020B0609020204030204" pitchFamily="49" charset="0"/>
+                <a:cs typeface="Consolas" panose="020B0609020204030204" pitchFamily="49" charset="0"/>
+              </a:rPr>
+              <a:t>h1</a:t>
+            </a:r>
+            <a:r>
+              <a:rPr kumimoji="0" lang="en-US" altLang="en-US" sz="2000" b="0" i="0" u="none" strike="noStrike" cap="none" normalizeH="0" baseline="0" dirty="0" smtClean="0">
+                <a:ln>
+                  <a:noFill/>
+                </a:ln>
+                <a:solidFill>
+                  <a:srgbClr val="999999"/>
+                </a:solidFill>
+                <a:effectLst/>
+                <a:latin typeface="Consolas" panose="020B0609020204030204" pitchFamily="49" charset="0"/>
+                <a:cs typeface="Consolas" panose="020B0609020204030204" pitchFamily="49" charset="0"/>
+              </a:rPr>
+              <a:t>&gt;</a:t>
+            </a:r>
+            <a:r>
+              <a:rPr kumimoji="0" lang="en-US" altLang="en-US" sz="2000" b="0" i="0" u="none" strike="noStrike" cap="none" normalizeH="0" baseline="0" dirty="0" smtClean="0">
+                <a:ln>
+                  <a:noFill/>
+                </a:ln>
+                <a:solidFill>
+                  <a:srgbClr val="000000"/>
+                </a:solidFill>
+                <a:effectLst/>
+                <a:latin typeface="Consolas" panose="020B0609020204030204" pitchFamily="49" charset="0"/>
+                <a:cs typeface="Consolas" panose="020B0609020204030204" pitchFamily="49" charset="0"/>
+              </a:rPr>
+              <a:t>Scores</a:t>
+            </a:r>
+            <a:r>
+              <a:rPr kumimoji="0" lang="en-US" altLang="en-US" sz="2000" b="0" i="0" u="none" strike="noStrike" cap="none" normalizeH="0" baseline="0" dirty="0" smtClean="0">
+                <a:ln>
+                  <a:noFill/>
+                </a:ln>
+                <a:solidFill>
+                  <a:srgbClr val="999999"/>
+                </a:solidFill>
+                <a:effectLst/>
+                <a:latin typeface="Consolas" panose="020B0609020204030204" pitchFamily="49" charset="0"/>
+                <a:cs typeface="Consolas" panose="020B0609020204030204" pitchFamily="49" charset="0"/>
+              </a:rPr>
+              <a:t>&lt;/</a:t>
+            </a:r>
+            <a:r>
+              <a:rPr kumimoji="0" lang="en-US" altLang="en-US" sz="2000" b="0" i="0" u="none" strike="noStrike" cap="none" normalizeH="0" baseline="0" dirty="0" smtClean="0">
+                <a:ln>
+                  <a:noFill/>
+                </a:ln>
+                <a:solidFill>
+                  <a:srgbClr val="990055"/>
+                </a:solidFill>
+                <a:effectLst/>
+                <a:latin typeface="Consolas" panose="020B0609020204030204" pitchFamily="49" charset="0"/>
+                <a:cs typeface="Consolas" panose="020B0609020204030204" pitchFamily="49" charset="0"/>
+              </a:rPr>
+              <a:t>h1</a:t>
+            </a:r>
+            <a:r>
+              <a:rPr kumimoji="0" lang="en-US" altLang="en-US" sz="2000" b="0" i="0" u="none" strike="noStrike" cap="none" normalizeH="0" baseline="0" dirty="0" smtClean="0">
+                <a:ln>
+                  <a:noFill/>
+                </a:ln>
+                <a:solidFill>
+                  <a:srgbClr val="999999"/>
+                </a:solidFill>
+                <a:effectLst/>
+                <a:latin typeface="Consolas" panose="020B0609020204030204" pitchFamily="49" charset="0"/>
+                <a:cs typeface="Consolas" panose="020B0609020204030204" pitchFamily="49" charset="0"/>
+              </a:rPr>
+              <a:t>&gt;</a:t>
+            </a:r>
+            <a:r>
+              <a:rPr kumimoji="0" lang="en-US" altLang="en-US" sz="2000" b="0" i="0" u="none" strike="noStrike" cap="none" normalizeH="0" baseline="0" dirty="0" smtClean="0">
+                <a:ln>
+                  <a:noFill/>
+                </a:ln>
+                <a:solidFill>
+                  <a:srgbClr val="000000"/>
+                </a:solidFill>
+                <a:effectLst/>
+                <a:latin typeface="Consolas" panose="020B0609020204030204" pitchFamily="49" charset="0"/>
+                <a:cs typeface="Consolas" panose="020B0609020204030204" pitchFamily="49" charset="0"/>
+              </a:rPr>
+              <a:t> </a:t>
+            </a:r>
+          </a:p>
+          <a:p>
+            <a:pPr marL="0" marR="0" lvl="0" indent="0" algn="l" defTabSz="914400" rtl="0" eaLnBrk="0" fontAlgn="base" latinLnBrk="0" hangingPunct="0">
+              <a:lnSpc>
+                <a:spcPct val="100000"/>
+              </a:lnSpc>
+              <a:spcBef>
+                <a:spcPct val="0"/>
+              </a:spcBef>
+              <a:spcAft>
+                <a:spcPct val="0"/>
+              </a:spcAft>
+              <a:buClrTx/>
+              <a:buSzTx/>
+              <a:buFontTx/>
+              <a:buNone/>
+              <a:tabLst/>
+            </a:pPr>
+            <a:r>
+              <a:rPr lang="en-US" altLang="en-US" sz="2000" dirty="0">
+                <a:solidFill>
+                  <a:srgbClr val="000000"/>
+                </a:solidFill>
+                <a:latin typeface="Consolas" panose="020B0609020204030204" pitchFamily="49" charset="0"/>
+                <a:cs typeface="Consolas" panose="020B0609020204030204" pitchFamily="49" charset="0"/>
+              </a:rPr>
+              <a:t>	</a:t>
+            </a:r>
+            <a:r>
+              <a:rPr kumimoji="0" lang="en-US" altLang="en-US" sz="2000" b="0" i="0" u="none" strike="noStrike" cap="none" normalizeH="0" baseline="0" dirty="0" smtClean="0">
+                <a:ln>
+                  <a:noFill/>
+                </a:ln>
+                <a:solidFill>
+                  <a:srgbClr val="999999"/>
+                </a:solidFill>
+                <a:effectLst/>
+                <a:latin typeface="Consolas" panose="020B0609020204030204" pitchFamily="49" charset="0"/>
+                <a:cs typeface="Consolas" panose="020B0609020204030204" pitchFamily="49" charset="0"/>
+              </a:rPr>
+              <a:t>&lt;</a:t>
+            </a:r>
+            <a:r>
+              <a:rPr kumimoji="0" lang="en-US" altLang="en-US" sz="2000" b="0" i="0" u="none" strike="noStrike" cap="none" normalizeH="0" baseline="0" dirty="0" smtClean="0">
+                <a:ln>
+                  <a:noFill/>
+                </a:ln>
+                <a:solidFill>
+                  <a:srgbClr val="990055"/>
+                </a:solidFill>
+                <a:effectLst/>
+                <a:latin typeface="Consolas" panose="020B0609020204030204" pitchFamily="49" charset="0"/>
+                <a:cs typeface="Consolas" panose="020B0609020204030204" pitchFamily="49" charset="0"/>
+              </a:rPr>
+              <a:t>Scoreboard </a:t>
+            </a:r>
+            <a:r>
+              <a:rPr kumimoji="0" lang="en-US" altLang="en-US" sz="2000" b="0" i="0" u="none" strike="noStrike" cap="none" normalizeH="0" baseline="0" dirty="0" err="1" smtClean="0">
+                <a:ln>
+                  <a:noFill/>
+                </a:ln>
+                <a:solidFill>
+                  <a:srgbClr val="669900"/>
+                </a:solidFill>
+                <a:effectLst/>
+                <a:latin typeface="Consolas" panose="020B0609020204030204" pitchFamily="49" charset="0"/>
+                <a:cs typeface="Consolas" panose="020B0609020204030204" pitchFamily="49" charset="0"/>
+              </a:rPr>
+              <a:t>className</a:t>
+            </a:r>
+            <a:r>
+              <a:rPr kumimoji="0" lang="en-US" altLang="en-US" sz="2000" b="0" i="0" u="none" strike="noStrike" cap="none" normalizeH="0" baseline="0" dirty="0" smtClean="0">
+                <a:ln>
+                  <a:noFill/>
+                </a:ln>
+                <a:solidFill>
+                  <a:srgbClr val="999999"/>
+                </a:solidFill>
+                <a:effectLst/>
+                <a:latin typeface="Consolas" panose="020B0609020204030204" pitchFamily="49" charset="0"/>
+                <a:cs typeface="Consolas" panose="020B0609020204030204" pitchFamily="49" charset="0"/>
+              </a:rPr>
+              <a:t>="</a:t>
+            </a:r>
+            <a:r>
+              <a:rPr kumimoji="0" lang="en-US" altLang="en-US" sz="2000" b="0" i="0" u="none" strike="noStrike" cap="none" normalizeH="0" baseline="0" dirty="0" smtClean="0">
+                <a:ln>
+                  <a:noFill/>
+                </a:ln>
+                <a:solidFill>
+                  <a:srgbClr val="0077AA"/>
+                </a:solidFill>
+                <a:effectLst/>
+                <a:latin typeface="Consolas" panose="020B0609020204030204" pitchFamily="49" charset="0"/>
+                <a:cs typeface="Consolas" panose="020B0609020204030204" pitchFamily="49" charset="0"/>
+              </a:rPr>
+              <a:t>results</a:t>
+            </a:r>
+            <a:r>
+              <a:rPr kumimoji="0" lang="en-US" altLang="en-US" sz="2000" b="0" i="0" u="none" strike="noStrike" cap="none" normalizeH="0" baseline="0" dirty="0" smtClean="0">
+                <a:ln>
+                  <a:noFill/>
+                </a:ln>
+                <a:solidFill>
+                  <a:srgbClr val="999999"/>
+                </a:solidFill>
+                <a:effectLst/>
+                <a:latin typeface="Consolas" panose="020B0609020204030204" pitchFamily="49" charset="0"/>
+                <a:cs typeface="Consolas" panose="020B0609020204030204" pitchFamily="49" charset="0"/>
+              </a:rPr>
+              <a:t>"</a:t>
+            </a:r>
+            <a:r>
+              <a:rPr kumimoji="0" lang="en-US" altLang="en-US" sz="2000" b="0" i="0" u="none" strike="noStrike" cap="none" normalizeH="0" baseline="0" dirty="0" smtClean="0">
+                <a:ln>
+                  <a:noFill/>
+                </a:ln>
+                <a:solidFill>
+                  <a:srgbClr val="990055"/>
+                </a:solidFill>
+                <a:effectLst/>
+                <a:latin typeface="Consolas" panose="020B0609020204030204" pitchFamily="49" charset="0"/>
+                <a:cs typeface="Consolas" panose="020B0609020204030204" pitchFamily="49" charset="0"/>
+              </a:rPr>
+              <a:t> </a:t>
+            </a:r>
+            <a:r>
+              <a:rPr kumimoji="0" lang="en-US" altLang="en-US" sz="2000" b="0" i="0" u="none" strike="noStrike" cap="none" normalizeH="0" baseline="0" dirty="0" smtClean="0">
+                <a:ln>
+                  <a:noFill/>
+                </a:ln>
+                <a:solidFill>
+                  <a:srgbClr val="669900"/>
+                </a:solidFill>
+                <a:effectLst/>
+                <a:latin typeface="Consolas" panose="020B0609020204030204" pitchFamily="49" charset="0"/>
+                <a:cs typeface="Consolas" panose="020B0609020204030204" pitchFamily="49" charset="0"/>
+              </a:rPr>
+              <a:t>scores</a:t>
+            </a:r>
+            <a:r>
+              <a:rPr kumimoji="0" lang="en-US" altLang="en-US" sz="2000" b="0" i="0" u="none" strike="noStrike" cap="none" normalizeH="0" baseline="0" dirty="0" smtClean="0">
+                <a:ln>
+                  <a:noFill/>
+                </a:ln>
+                <a:solidFill>
+                  <a:srgbClr val="999999"/>
+                </a:solidFill>
+                <a:effectLst/>
+                <a:latin typeface="Consolas" panose="020B0609020204030204" pitchFamily="49" charset="0"/>
+                <a:cs typeface="Consolas" panose="020B0609020204030204" pitchFamily="49" charset="0"/>
+              </a:rPr>
+              <a:t>={</a:t>
+            </a:r>
+            <a:r>
+              <a:rPr kumimoji="0" lang="en-US" altLang="en-US" sz="2000" b="0" i="0" u="none" strike="noStrike" cap="none" normalizeH="0" baseline="0" dirty="0" err="1" smtClean="0">
+                <a:ln>
+                  <a:noFill/>
+                </a:ln>
+                <a:solidFill>
+                  <a:srgbClr val="990055"/>
+                </a:solidFill>
+                <a:effectLst/>
+                <a:latin typeface="Consolas" panose="020B0609020204030204" pitchFamily="49" charset="0"/>
+                <a:cs typeface="Consolas" panose="020B0609020204030204" pitchFamily="49" charset="0"/>
+              </a:rPr>
+              <a:t>gameScores</a:t>
+            </a:r>
+            <a:r>
+              <a:rPr kumimoji="0" lang="en-US" altLang="en-US" sz="2000" b="0" i="0" u="none" strike="noStrike" cap="none" normalizeH="0" baseline="0" dirty="0" smtClean="0">
+                <a:ln>
+                  <a:noFill/>
+                </a:ln>
+                <a:solidFill>
+                  <a:srgbClr val="999999"/>
+                </a:solidFill>
+                <a:effectLst/>
+                <a:latin typeface="Consolas" panose="020B0609020204030204" pitchFamily="49" charset="0"/>
+                <a:cs typeface="Consolas" panose="020B0609020204030204" pitchFamily="49" charset="0"/>
+              </a:rPr>
+              <a:t>}</a:t>
+            </a:r>
+            <a:r>
+              <a:rPr kumimoji="0" lang="en-US" altLang="en-US" sz="2000" b="0" i="0" u="none" strike="noStrike" cap="none" normalizeH="0" baseline="0" dirty="0" smtClean="0">
+                <a:ln>
+                  <a:noFill/>
+                </a:ln>
+                <a:solidFill>
+                  <a:srgbClr val="990055"/>
+                </a:solidFill>
+                <a:effectLst/>
+                <a:latin typeface="Consolas" panose="020B0609020204030204" pitchFamily="49" charset="0"/>
+                <a:cs typeface="Consolas" panose="020B0609020204030204" pitchFamily="49" charset="0"/>
+              </a:rPr>
+              <a:t> </a:t>
+            </a:r>
+            <a:r>
+              <a:rPr kumimoji="0" lang="en-US" altLang="en-US" sz="2000" b="0" i="0" u="none" strike="noStrike" cap="none" normalizeH="0" baseline="0" dirty="0" smtClean="0">
+                <a:ln>
+                  <a:noFill/>
+                </a:ln>
+                <a:solidFill>
+                  <a:srgbClr val="999999"/>
+                </a:solidFill>
+                <a:effectLst/>
+                <a:latin typeface="Consolas" panose="020B0609020204030204" pitchFamily="49" charset="0"/>
+                <a:cs typeface="Consolas" panose="020B0609020204030204" pitchFamily="49" charset="0"/>
+              </a:rPr>
+              <a:t>/&gt;</a:t>
+            </a:r>
+            <a:r>
+              <a:rPr kumimoji="0" lang="en-US" altLang="en-US" sz="2000" b="0" i="0" u="none" strike="noStrike" cap="none" normalizeH="0" baseline="0" dirty="0" smtClean="0">
+                <a:ln>
+                  <a:noFill/>
+                </a:ln>
+                <a:solidFill>
+                  <a:srgbClr val="000000"/>
+                </a:solidFill>
+                <a:effectLst/>
+                <a:latin typeface="Consolas" panose="020B0609020204030204" pitchFamily="49" charset="0"/>
+                <a:cs typeface="Consolas" panose="020B0609020204030204" pitchFamily="49" charset="0"/>
+              </a:rPr>
+              <a:t> </a:t>
+            </a:r>
+          </a:p>
+          <a:p>
+            <a:pPr marL="0" marR="0" lvl="0" indent="0" algn="l" defTabSz="914400" rtl="0" eaLnBrk="0" fontAlgn="base" latinLnBrk="0" hangingPunct="0">
+              <a:lnSpc>
+                <a:spcPct val="100000"/>
+              </a:lnSpc>
+              <a:spcBef>
+                <a:spcPct val="0"/>
+              </a:spcBef>
+              <a:spcAft>
+                <a:spcPct val="0"/>
+              </a:spcAft>
+              <a:buClrTx/>
+              <a:buSzTx/>
+              <a:buFontTx/>
+              <a:buNone/>
+              <a:tabLst/>
+            </a:pPr>
+            <a:r>
+              <a:rPr kumimoji="0" lang="en-US" altLang="en-US" sz="2000" b="0" i="0" u="none" strike="noStrike" cap="none" normalizeH="0" baseline="0" dirty="0" smtClean="0">
+                <a:ln>
+                  <a:noFill/>
+                </a:ln>
+                <a:solidFill>
+                  <a:srgbClr val="999999"/>
+                </a:solidFill>
+                <a:effectLst/>
+                <a:latin typeface="Consolas" panose="020B0609020204030204" pitchFamily="49" charset="0"/>
+                <a:cs typeface="Consolas" panose="020B0609020204030204" pitchFamily="49" charset="0"/>
+              </a:rPr>
+              <a:t>&lt;/</a:t>
+            </a:r>
+            <a:r>
+              <a:rPr kumimoji="0" lang="en-US" altLang="en-US" sz="2000" b="0" i="0" u="none" strike="noStrike" cap="none" normalizeH="0" baseline="0" dirty="0" err="1" smtClean="0">
+                <a:ln>
+                  <a:noFill/>
+                </a:ln>
+                <a:solidFill>
+                  <a:srgbClr val="990055"/>
+                </a:solidFill>
+                <a:effectLst/>
+                <a:latin typeface="Consolas" panose="020B0609020204030204" pitchFamily="49" charset="0"/>
+                <a:cs typeface="Consolas" panose="020B0609020204030204" pitchFamily="49" charset="0"/>
+              </a:rPr>
+              <a:t>DashboardUnit</a:t>
+            </a:r>
+            <a:r>
+              <a:rPr kumimoji="0" lang="en-US" altLang="en-US" sz="2000" b="0" i="0" u="none" strike="noStrike" cap="none" normalizeH="0" baseline="0" dirty="0" smtClean="0">
+                <a:ln>
+                  <a:noFill/>
+                </a:ln>
+                <a:solidFill>
+                  <a:srgbClr val="999999"/>
+                </a:solidFill>
+                <a:effectLst/>
+                <a:latin typeface="Consolas" panose="020B0609020204030204" pitchFamily="49" charset="0"/>
+                <a:cs typeface="Consolas" panose="020B0609020204030204" pitchFamily="49" charset="0"/>
+              </a:rPr>
+              <a:t>&gt;;</a:t>
+            </a:r>
+            <a:r>
+              <a:rPr kumimoji="0" lang="en-US" altLang="en-US" sz="2000" b="0" i="0" u="none" strike="noStrike" cap="none" normalizeH="0" baseline="0" dirty="0" smtClean="0">
+                <a:ln>
+                  <a:noFill/>
+                </a:ln>
+                <a:solidFill>
+                  <a:schemeClr val="tx1"/>
+                </a:solidFill>
+                <a:effectLst/>
+              </a:rPr>
+              <a:t> </a:t>
+            </a:r>
+            <a:endParaRPr kumimoji="0" lang="en-US" altLang="en-US" sz="2000" b="0" i="0" u="none" strike="noStrike" cap="none" normalizeH="0" baseline="0" dirty="0" smtClean="0">
+              <a:ln>
+                <a:noFill/>
+              </a:ln>
+              <a:solidFill>
+                <a:schemeClr val="tx1"/>
+              </a:solidFill>
+              <a:effectLst/>
+              <a:latin typeface="Arial" panose="020B0604020202020204" pitchFamily="34" charset="0"/>
+            </a:endParaRPr>
+          </a:p>
+        </p:txBody>
+      </p:sp>
+    </p:spTree>
+    <p:extLst>
+      <p:ext uri="{BB962C8B-B14F-4D97-AF65-F5344CB8AC3E}">
+        <p14:creationId xmlns:p14="http://schemas.microsoft.com/office/powerpoint/2010/main" val="1215274290"/>
+      </p:ext>
+    </p:extLst>
+  </p:cSld>
+  <p:clrMapOvr>
+    <a:masterClrMapping/>
+  </p:clrMapOvr>
+</p:sld>
+</file>
+
+<file path=ppt/slides/slide12.xml><?xml version="1.0" encoding="utf-8"?>
+<p:sld xmlns:a="http://schemas.openxmlformats.org/drawingml/2006/main" xmlns:r="http://schemas.openxmlformats.org/officeDocument/2006/relationships" xmlns:p="http://schemas.openxmlformats.org/presentationml/2006/main">
+  <p:cSld>
+    <p:spTree>
+      <p:nvGrpSpPr>
+        <p:cNvPr id="1" name=""/>
+        <p:cNvGrpSpPr/>
+        <p:nvPr/>
+      </p:nvGrpSpPr>
+      <p:grpSpPr>
+        <a:xfrm>
+          <a:off x="0" y="0"/>
+          <a:ext cx="0" cy="0"/>
+          <a:chOff x="0" y="0"/>
+          <a:chExt cx="0" cy="0"/>
+        </a:xfrm>
+      </p:grpSpPr>
+      <p:sp>
+        <p:nvSpPr>
+          <p:cNvPr id="4" name="Rectangle 1"/>
+          <p:cNvSpPr>
+            <a:spLocks noChangeArrowheads="1"/>
+          </p:cNvSpPr>
+          <p:nvPr/>
+        </p:nvSpPr>
+        <p:spPr bwMode="auto">
+          <a:xfrm>
+            <a:off x="399245" y="1780942"/>
+            <a:ext cx="11500834" cy="3798890"/>
+          </a:xfrm>
+          <a:prstGeom prst="rect">
+            <a:avLst/>
+          </a:prstGeom>
+          <a:solidFill>
+            <a:srgbClr val="F5F2F0"/>
+          </a:solidFill>
+          <a:ln>
+            <a:noFill/>
+          </a:ln>
+          <a:effectLst/>
+          <a:extLst>
+            <a:ext uri="{91240B29-F687-4F45-9708-019B960494DF}">
+              <a14:hiddenLine xmlns:a14="http://schemas.microsoft.com/office/drawing/2010/main" w="9525">
+                <a:solidFill>
+                  <a:schemeClr val="tx1"/>
+                </a:solidFill>
+                <a:miter lim="800000"/>
+                <a:headEnd/>
+                <a:tailEnd/>
+              </a14:hiddenLine>
+            </a:ext>
+            <a:ext uri="{AF507438-7753-43E0-B8FC-AC1667EBCBE1}">
+              <a14:hiddenEffects xmlns:a14="http://schemas.microsoft.com/office/drawing/2010/main">
+                <a:effectLst>
+                  <a:outerShdw dist="35921" dir="2700000" algn="ctr" rotWithShape="0">
+                    <a:schemeClr val="bg2"/>
+                  </a:outerShdw>
+                </a:effectLst>
+              </a14:hiddenEffects>
+            </a:ext>
+          </a:extLst>
+        </p:spPr>
+        <p:txBody>
+          <a:bodyPr vert="horz" wrap="square" lIns="0" tIns="357075" rIns="0" bIns="357075" numCol="1" anchor="ctr" anchorCtr="0" compatLnSpc="1">
+            <a:prstTxWarp prst="textNoShape">
+              <a:avLst/>
+            </a:prstTxWarp>
+            <a:spAutoFit/>
+          </a:bodyPr>
+          <a:lstStyle/>
+          <a:p>
+            <a:pPr marL="0" marR="0" lvl="0" indent="0" algn="l" defTabSz="914400" rtl="0" eaLnBrk="0" fontAlgn="base" latinLnBrk="0" hangingPunct="0">
+              <a:lnSpc>
+                <a:spcPct val="100000"/>
+              </a:lnSpc>
+              <a:spcBef>
+                <a:spcPct val="0"/>
+              </a:spcBef>
+              <a:spcAft>
+                <a:spcPct val="0"/>
+              </a:spcAft>
+              <a:buClrTx/>
+              <a:buSzTx/>
+              <a:buFontTx/>
+              <a:buNone/>
+              <a:tabLst/>
+            </a:pPr>
+            <a:r>
+              <a:rPr kumimoji="0" lang="en-US" altLang="en-US" sz="2000" b="0" i="0" u="none" strike="noStrike" cap="none" normalizeH="0" baseline="0" dirty="0" smtClean="0">
+                <a:ln>
+                  <a:noFill/>
+                </a:ln>
+                <a:solidFill>
+                  <a:schemeClr val="bg1">
+                    <a:lumMod val="75000"/>
+                  </a:schemeClr>
+                </a:solidFill>
+                <a:effectLst/>
+                <a:latin typeface="Consolas" panose="020B0609020204030204" pitchFamily="49" charset="0"/>
+                <a:cs typeface="Consolas" panose="020B0609020204030204" pitchFamily="49" charset="0"/>
+              </a:rPr>
+              <a:t>//With JSX</a:t>
+            </a:r>
+          </a:p>
+          <a:p>
+            <a:pPr marL="0" marR="0" lvl="0" indent="0" algn="l" defTabSz="914400" rtl="0" eaLnBrk="0" fontAlgn="base" latinLnBrk="0" hangingPunct="0">
+              <a:lnSpc>
+                <a:spcPct val="100000"/>
+              </a:lnSpc>
+              <a:spcBef>
+                <a:spcPct val="0"/>
+              </a:spcBef>
+              <a:spcAft>
+                <a:spcPct val="0"/>
+              </a:spcAft>
+              <a:buClrTx/>
+              <a:buSzTx/>
+              <a:buFontTx/>
+              <a:buNone/>
+              <a:tabLst/>
+            </a:pPr>
+            <a:r>
+              <a:rPr kumimoji="0" lang="en-US" altLang="en-US" sz="2000" b="0" i="0" u="none" strike="noStrike" cap="none" normalizeH="0" baseline="0" dirty="0" err="1" smtClean="0">
+                <a:ln>
+                  <a:noFill/>
+                </a:ln>
+                <a:solidFill>
+                  <a:srgbClr val="000000"/>
+                </a:solidFill>
+                <a:effectLst/>
+                <a:latin typeface="Consolas" panose="020B0609020204030204" pitchFamily="49" charset="0"/>
+                <a:cs typeface="Consolas" panose="020B0609020204030204" pitchFamily="49" charset="0"/>
+              </a:rPr>
+              <a:t>React</a:t>
+            </a:r>
+            <a:r>
+              <a:rPr kumimoji="0" lang="en-US" altLang="en-US" sz="2000" b="0" i="0" u="none" strike="noStrike" cap="none" normalizeH="0" baseline="0" dirty="0" err="1" smtClean="0">
+                <a:ln>
+                  <a:noFill/>
+                </a:ln>
+                <a:solidFill>
+                  <a:srgbClr val="999999"/>
+                </a:solidFill>
+                <a:effectLst/>
+                <a:latin typeface="Consolas" panose="020B0609020204030204" pitchFamily="49" charset="0"/>
+                <a:cs typeface="Consolas" panose="020B0609020204030204" pitchFamily="49" charset="0"/>
+              </a:rPr>
+              <a:t>.</a:t>
+            </a:r>
+            <a:r>
+              <a:rPr kumimoji="0" lang="en-US" altLang="en-US" sz="2000" b="0" i="0" u="none" strike="noStrike" cap="none" normalizeH="0" baseline="0" dirty="0" err="1" smtClean="0">
+                <a:ln>
+                  <a:noFill/>
+                </a:ln>
+                <a:solidFill>
+                  <a:srgbClr val="DD4A68"/>
+                </a:solidFill>
+                <a:effectLst/>
+                <a:latin typeface="Consolas" panose="020B0609020204030204" pitchFamily="49" charset="0"/>
+                <a:cs typeface="Consolas" panose="020B0609020204030204" pitchFamily="49" charset="0"/>
+              </a:rPr>
+              <a:t>createElement</a:t>
+            </a:r>
+            <a:r>
+              <a:rPr kumimoji="0" lang="en-US" altLang="en-US" sz="2000" b="0" i="0" u="none" strike="noStrike" cap="none" normalizeH="0" baseline="0" dirty="0" smtClean="0">
+                <a:ln>
+                  <a:noFill/>
+                </a:ln>
+                <a:solidFill>
+                  <a:srgbClr val="999999"/>
+                </a:solidFill>
+                <a:effectLst/>
+                <a:latin typeface="Consolas" panose="020B0609020204030204" pitchFamily="49" charset="0"/>
+                <a:cs typeface="Consolas" panose="020B0609020204030204" pitchFamily="49" charset="0"/>
+              </a:rPr>
+              <a:t>(</a:t>
+            </a:r>
+            <a:r>
+              <a:rPr kumimoji="0" lang="en-US" altLang="en-US" sz="2000" b="0" i="0" u="none" strike="noStrike" cap="none" normalizeH="0" baseline="0" dirty="0" smtClean="0">
+                <a:ln>
+                  <a:noFill/>
+                </a:ln>
+                <a:solidFill>
+                  <a:srgbClr val="669900"/>
+                </a:solidFill>
+                <a:effectLst/>
+                <a:latin typeface="Consolas" panose="020B0609020204030204" pitchFamily="49" charset="0"/>
+                <a:cs typeface="Consolas" panose="020B0609020204030204" pitchFamily="49" charset="0"/>
+              </a:rPr>
+              <a:t>"div"</a:t>
+            </a:r>
+            <a:r>
+              <a:rPr kumimoji="0" lang="en-US" altLang="en-US" sz="2000" b="0" i="0" u="none" strike="noStrike" cap="none" normalizeH="0" baseline="0" dirty="0" smtClean="0">
+                <a:ln>
+                  <a:noFill/>
+                </a:ln>
+                <a:solidFill>
+                  <a:srgbClr val="999999"/>
+                </a:solidFill>
+                <a:effectLst/>
+                <a:latin typeface="Consolas" panose="020B0609020204030204" pitchFamily="49" charset="0"/>
+                <a:cs typeface="Consolas" panose="020B0609020204030204" pitchFamily="49" charset="0"/>
+              </a:rPr>
+              <a:t>,</a:t>
+            </a:r>
+            <a:r>
+              <a:rPr kumimoji="0" lang="en-US" altLang="en-US" sz="2000" b="0" i="0" u="none" strike="noStrike" cap="none" normalizeH="0" baseline="0" dirty="0" smtClean="0">
+                <a:ln>
+                  <a:noFill/>
+                </a:ln>
+                <a:solidFill>
+                  <a:srgbClr val="000000"/>
+                </a:solidFill>
+                <a:effectLst/>
+                <a:latin typeface="Consolas" panose="020B0609020204030204" pitchFamily="49" charset="0"/>
+                <a:cs typeface="Consolas" panose="020B0609020204030204" pitchFamily="49" charset="0"/>
+              </a:rPr>
+              <a:t> </a:t>
+            </a:r>
+            <a:r>
+              <a:rPr kumimoji="0" lang="en-US" altLang="en-US" sz="2000" b="0" i="0" u="none" strike="noStrike" cap="none" normalizeH="0" baseline="0" dirty="0" smtClean="0">
+                <a:ln>
+                  <a:noFill/>
+                </a:ln>
+                <a:solidFill>
+                  <a:srgbClr val="999999"/>
+                </a:solidFill>
+                <a:effectLst/>
+                <a:latin typeface="Consolas" panose="020B0609020204030204" pitchFamily="49" charset="0"/>
+                <a:cs typeface="Consolas" panose="020B0609020204030204" pitchFamily="49" charset="0"/>
+              </a:rPr>
+              <a:t>{</a:t>
+            </a:r>
+            <a:r>
+              <a:rPr kumimoji="0" lang="en-US" altLang="en-US" sz="2000" b="0" i="0" u="none" strike="noStrike" cap="none" normalizeH="0" baseline="0" dirty="0" smtClean="0">
+                <a:ln>
+                  <a:noFill/>
+                </a:ln>
+                <a:solidFill>
+                  <a:srgbClr val="000000"/>
+                </a:solidFill>
+                <a:effectLst/>
+                <a:latin typeface="Consolas" panose="020B0609020204030204" pitchFamily="49" charset="0"/>
+                <a:cs typeface="Consolas" panose="020B0609020204030204" pitchFamily="49" charset="0"/>
+              </a:rPr>
+              <a:t> </a:t>
+            </a:r>
+            <a:r>
+              <a:rPr kumimoji="0" lang="en-US" altLang="en-US" sz="2000" b="0" i="0" u="none" strike="noStrike" cap="none" normalizeH="0" baseline="0" dirty="0" err="1" smtClean="0">
+                <a:ln>
+                  <a:noFill/>
+                </a:ln>
+                <a:solidFill>
+                  <a:srgbClr val="000000"/>
+                </a:solidFill>
+                <a:effectLst/>
+                <a:latin typeface="Consolas" panose="020B0609020204030204" pitchFamily="49" charset="0"/>
+                <a:cs typeface="Consolas" panose="020B0609020204030204" pitchFamily="49" charset="0"/>
+              </a:rPr>
+              <a:t>className</a:t>
+            </a:r>
+            <a:r>
+              <a:rPr kumimoji="0" lang="en-US" altLang="en-US" sz="2000" b="0" i="0" u="none" strike="noStrike" cap="none" normalizeH="0" baseline="0" dirty="0" smtClean="0">
+                <a:ln>
+                  <a:noFill/>
+                </a:ln>
+                <a:solidFill>
+                  <a:srgbClr val="999999"/>
+                </a:solidFill>
+                <a:effectLst/>
+                <a:latin typeface="Consolas" panose="020B0609020204030204" pitchFamily="49" charset="0"/>
+                <a:cs typeface="Consolas" panose="020B0609020204030204" pitchFamily="49" charset="0"/>
+              </a:rPr>
+              <a:t>:</a:t>
+            </a:r>
+            <a:r>
+              <a:rPr kumimoji="0" lang="en-US" altLang="en-US" sz="2000" b="0" i="0" u="none" strike="noStrike" cap="none" normalizeH="0" baseline="0" dirty="0" smtClean="0">
+                <a:ln>
+                  <a:noFill/>
+                </a:ln>
+                <a:solidFill>
+                  <a:srgbClr val="000000"/>
+                </a:solidFill>
+                <a:effectLst/>
+                <a:latin typeface="Consolas" panose="020B0609020204030204" pitchFamily="49" charset="0"/>
+                <a:cs typeface="Consolas" panose="020B0609020204030204" pitchFamily="49" charset="0"/>
+              </a:rPr>
+              <a:t> </a:t>
+            </a:r>
+            <a:r>
+              <a:rPr kumimoji="0" lang="en-US" altLang="en-US" sz="2000" b="0" i="0" u="none" strike="noStrike" cap="none" normalizeH="0" baseline="0" dirty="0" smtClean="0">
+                <a:ln>
+                  <a:noFill/>
+                </a:ln>
+                <a:solidFill>
+                  <a:srgbClr val="669900"/>
+                </a:solidFill>
+                <a:effectLst/>
+                <a:latin typeface="Consolas" panose="020B0609020204030204" pitchFamily="49" charset="0"/>
+                <a:cs typeface="Consolas" panose="020B0609020204030204" pitchFamily="49" charset="0"/>
+              </a:rPr>
+              <a:t>"red"</a:t>
+            </a:r>
+            <a:r>
+              <a:rPr kumimoji="0" lang="en-US" altLang="en-US" sz="2000" b="0" i="0" u="none" strike="noStrike" cap="none" normalizeH="0" baseline="0" dirty="0" smtClean="0">
+                <a:ln>
+                  <a:noFill/>
+                </a:ln>
+                <a:solidFill>
+                  <a:srgbClr val="000000"/>
+                </a:solidFill>
+                <a:effectLst/>
+                <a:latin typeface="Consolas" panose="020B0609020204030204" pitchFamily="49" charset="0"/>
+                <a:cs typeface="Consolas" panose="020B0609020204030204" pitchFamily="49" charset="0"/>
+              </a:rPr>
+              <a:t> </a:t>
+            </a:r>
+            <a:r>
+              <a:rPr kumimoji="0" lang="en-US" altLang="en-US" sz="2000" b="0" i="0" u="none" strike="noStrike" cap="none" normalizeH="0" baseline="0" dirty="0" smtClean="0">
+                <a:ln>
+                  <a:noFill/>
+                </a:ln>
+                <a:solidFill>
+                  <a:srgbClr val="999999"/>
+                </a:solidFill>
+                <a:effectLst/>
+                <a:latin typeface="Consolas" panose="020B0609020204030204" pitchFamily="49" charset="0"/>
+                <a:cs typeface="Consolas" panose="020B0609020204030204" pitchFamily="49" charset="0"/>
+              </a:rPr>
+              <a:t>},</a:t>
+            </a:r>
+            <a:r>
+              <a:rPr kumimoji="0" lang="en-US" altLang="en-US" sz="2000" b="0" i="0" u="none" strike="noStrike" cap="none" normalizeH="0" baseline="0" dirty="0" smtClean="0">
+                <a:ln>
+                  <a:noFill/>
+                </a:ln>
+                <a:solidFill>
+                  <a:srgbClr val="000000"/>
+                </a:solidFill>
+                <a:effectLst/>
+                <a:latin typeface="Consolas" panose="020B0609020204030204" pitchFamily="49" charset="0"/>
+                <a:cs typeface="Consolas" panose="020B0609020204030204" pitchFamily="49" charset="0"/>
+              </a:rPr>
+              <a:t> </a:t>
+            </a:r>
+            <a:r>
+              <a:rPr kumimoji="0" lang="en-US" altLang="en-US" sz="2000" b="0" i="0" u="none" strike="noStrike" cap="none" normalizeH="0" baseline="0" dirty="0" smtClean="0">
+                <a:ln>
+                  <a:noFill/>
+                </a:ln>
+                <a:solidFill>
+                  <a:srgbClr val="669900"/>
+                </a:solidFill>
+                <a:effectLst/>
+                <a:latin typeface="Consolas" panose="020B0609020204030204" pitchFamily="49" charset="0"/>
+                <a:cs typeface="Consolas" panose="020B0609020204030204" pitchFamily="49" charset="0"/>
+              </a:rPr>
+              <a:t>"Children Text"</a:t>
+            </a:r>
+            <a:r>
+              <a:rPr kumimoji="0" lang="en-US" altLang="en-US" sz="2000" b="0" i="0" u="none" strike="noStrike" cap="none" normalizeH="0" baseline="0" dirty="0" smtClean="0">
+                <a:ln>
+                  <a:noFill/>
+                </a:ln>
+                <a:solidFill>
+                  <a:srgbClr val="999999"/>
+                </a:solidFill>
+                <a:effectLst/>
+                <a:latin typeface="Consolas" panose="020B0609020204030204" pitchFamily="49" charset="0"/>
+                <a:cs typeface="Consolas" panose="020B0609020204030204" pitchFamily="49" charset="0"/>
+              </a:rPr>
+              <a:t>);</a:t>
+            </a:r>
+            <a:r>
+              <a:rPr kumimoji="0" lang="en-US" altLang="en-US" sz="2000" b="0" i="0" u="none" strike="noStrike" cap="none" normalizeH="0" baseline="0" dirty="0" smtClean="0">
+                <a:ln>
+                  <a:noFill/>
+                </a:ln>
+                <a:solidFill>
+                  <a:srgbClr val="000000"/>
+                </a:solidFill>
+                <a:effectLst/>
+                <a:latin typeface="Consolas" panose="020B0609020204030204" pitchFamily="49" charset="0"/>
+                <a:cs typeface="Consolas" panose="020B0609020204030204" pitchFamily="49" charset="0"/>
+              </a:rPr>
+              <a:t> </a:t>
+            </a:r>
+          </a:p>
+          <a:p>
+            <a:pPr marL="0" marR="0" lvl="0" indent="0" algn="l" defTabSz="914400" rtl="0" eaLnBrk="0" fontAlgn="base" latinLnBrk="0" hangingPunct="0">
+              <a:lnSpc>
+                <a:spcPct val="100000"/>
+              </a:lnSpc>
+              <a:spcBef>
+                <a:spcPct val="0"/>
+              </a:spcBef>
+              <a:spcAft>
+                <a:spcPct val="0"/>
+              </a:spcAft>
+              <a:buClrTx/>
+              <a:buSzTx/>
+              <a:buFontTx/>
+              <a:buNone/>
+              <a:tabLst/>
+            </a:pPr>
+            <a:endParaRPr lang="en-US" altLang="en-US" sz="2000" dirty="0">
+              <a:solidFill>
+                <a:srgbClr val="000000"/>
+              </a:solidFill>
+              <a:latin typeface="Consolas" panose="020B0609020204030204" pitchFamily="49" charset="0"/>
+              <a:cs typeface="Consolas" panose="020B0609020204030204" pitchFamily="49" charset="0"/>
+            </a:endParaRPr>
+          </a:p>
+          <a:p>
+            <a:pPr marL="0" marR="0" lvl="0" indent="0" algn="l" defTabSz="914400" rtl="0" eaLnBrk="0" fontAlgn="base" latinLnBrk="0" hangingPunct="0">
+              <a:lnSpc>
+                <a:spcPct val="100000"/>
+              </a:lnSpc>
+              <a:spcBef>
+                <a:spcPct val="0"/>
+              </a:spcBef>
+              <a:spcAft>
+                <a:spcPct val="0"/>
+              </a:spcAft>
+              <a:buClrTx/>
+              <a:buSzTx/>
+              <a:buFontTx/>
+              <a:buNone/>
+              <a:tabLst/>
+            </a:pPr>
+            <a:r>
+              <a:rPr kumimoji="0" lang="en-US" altLang="en-US" sz="2000" b="0" i="0" u="none" strike="noStrike" cap="none" normalizeH="0" baseline="0" dirty="0" err="1" smtClean="0">
+                <a:ln>
+                  <a:noFill/>
+                </a:ln>
+                <a:solidFill>
+                  <a:srgbClr val="000000"/>
+                </a:solidFill>
+                <a:effectLst/>
+                <a:latin typeface="Consolas" panose="020B0609020204030204" pitchFamily="49" charset="0"/>
+                <a:cs typeface="Consolas" panose="020B0609020204030204" pitchFamily="49" charset="0"/>
+              </a:rPr>
+              <a:t>React</a:t>
+            </a:r>
+            <a:r>
+              <a:rPr kumimoji="0" lang="en-US" altLang="en-US" sz="2000" b="0" i="0" u="none" strike="noStrike" cap="none" normalizeH="0" baseline="0" dirty="0" err="1" smtClean="0">
+                <a:ln>
+                  <a:noFill/>
+                </a:ln>
+                <a:solidFill>
+                  <a:srgbClr val="999999"/>
+                </a:solidFill>
+                <a:effectLst/>
+                <a:latin typeface="Consolas" panose="020B0609020204030204" pitchFamily="49" charset="0"/>
+                <a:cs typeface="Consolas" panose="020B0609020204030204" pitchFamily="49" charset="0"/>
+              </a:rPr>
+              <a:t>.</a:t>
+            </a:r>
+            <a:r>
+              <a:rPr kumimoji="0" lang="en-US" altLang="en-US" sz="2000" b="0" i="0" u="none" strike="noStrike" cap="none" normalizeH="0" baseline="0" dirty="0" err="1" smtClean="0">
+                <a:ln>
+                  <a:noFill/>
+                </a:ln>
+                <a:solidFill>
+                  <a:srgbClr val="DD4A68"/>
+                </a:solidFill>
+                <a:effectLst/>
+                <a:latin typeface="Consolas" panose="020B0609020204030204" pitchFamily="49" charset="0"/>
+                <a:cs typeface="Consolas" panose="020B0609020204030204" pitchFamily="49" charset="0"/>
+              </a:rPr>
+              <a:t>createElement</a:t>
+            </a:r>
+            <a:r>
+              <a:rPr kumimoji="0" lang="en-US" altLang="en-US" sz="2000" b="0" i="0" u="none" strike="noStrike" cap="none" normalizeH="0" baseline="0" dirty="0" smtClean="0">
+                <a:ln>
+                  <a:noFill/>
+                </a:ln>
+                <a:solidFill>
+                  <a:srgbClr val="999999"/>
+                </a:solidFill>
+                <a:effectLst/>
+                <a:latin typeface="Consolas" panose="020B0609020204030204" pitchFamily="49" charset="0"/>
+                <a:cs typeface="Consolas" panose="020B0609020204030204" pitchFamily="49" charset="0"/>
+              </a:rPr>
+              <a:t>(</a:t>
+            </a:r>
+            <a:r>
+              <a:rPr kumimoji="0" lang="en-US" altLang="en-US" sz="2000" b="0" i="0" u="none" strike="noStrike" cap="none" normalizeH="0" baseline="0" dirty="0" err="1" smtClean="0">
+                <a:ln>
+                  <a:noFill/>
+                </a:ln>
+                <a:solidFill>
+                  <a:srgbClr val="000000"/>
+                </a:solidFill>
+                <a:effectLst/>
+                <a:latin typeface="Consolas" panose="020B0609020204030204" pitchFamily="49" charset="0"/>
+                <a:cs typeface="Consolas" panose="020B0609020204030204" pitchFamily="49" charset="0"/>
+              </a:rPr>
+              <a:t>MyCounter</a:t>
+            </a:r>
+            <a:r>
+              <a:rPr kumimoji="0" lang="en-US" altLang="en-US" sz="2000" b="0" i="0" u="none" strike="noStrike" cap="none" normalizeH="0" baseline="0" dirty="0" smtClean="0">
+                <a:ln>
+                  <a:noFill/>
+                </a:ln>
+                <a:solidFill>
+                  <a:srgbClr val="999999"/>
+                </a:solidFill>
+                <a:effectLst/>
+                <a:latin typeface="Consolas" panose="020B0609020204030204" pitchFamily="49" charset="0"/>
+                <a:cs typeface="Consolas" panose="020B0609020204030204" pitchFamily="49" charset="0"/>
+              </a:rPr>
+              <a:t>,</a:t>
+            </a:r>
+            <a:r>
+              <a:rPr kumimoji="0" lang="en-US" altLang="en-US" sz="2000" b="0" i="0" u="none" strike="noStrike" cap="none" normalizeH="0" baseline="0" dirty="0" smtClean="0">
+                <a:ln>
+                  <a:noFill/>
+                </a:ln>
+                <a:solidFill>
+                  <a:srgbClr val="000000"/>
+                </a:solidFill>
+                <a:effectLst/>
+                <a:latin typeface="Consolas" panose="020B0609020204030204" pitchFamily="49" charset="0"/>
+                <a:cs typeface="Consolas" panose="020B0609020204030204" pitchFamily="49" charset="0"/>
+              </a:rPr>
+              <a:t> </a:t>
+            </a:r>
+            <a:r>
+              <a:rPr kumimoji="0" lang="en-US" altLang="en-US" sz="2000" b="0" i="0" u="none" strike="noStrike" cap="none" normalizeH="0" baseline="0" dirty="0" smtClean="0">
+                <a:ln>
+                  <a:noFill/>
+                </a:ln>
+                <a:solidFill>
+                  <a:srgbClr val="999999"/>
+                </a:solidFill>
+                <a:effectLst/>
+                <a:latin typeface="Consolas" panose="020B0609020204030204" pitchFamily="49" charset="0"/>
+                <a:cs typeface="Consolas" panose="020B0609020204030204" pitchFamily="49" charset="0"/>
+              </a:rPr>
+              <a:t>{</a:t>
+            </a:r>
+            <a:r>
+              <a:rPr kumimoji="0" lang="en-US" altLang="en-US" sz="2000" b="0" i="0" u="none" strike="noStrike" cap="none" normalizeH="0" baseline="0" dirty="0" smtClean="0">
+                <a:ln>
+                  <a:noFill/>
+                </a:ln>
+                <a:solidFill>
+                  <a:srgbClr val="000000"/>
+                </a:solidFill>
+                <a:effectLst/>
+                <a:latin typeface="Consolas" panose="020B0609020204030204" pitchFamily="49" charset="0"/>
+                <a:cs typeface="Consolas" panose="020B0609020204030204" pitchFamily="49" charset="0"/>
+              </a:rPr>
+              <a:t> count</a:t>
+            </a:r>
+            <a:r>
+              <a:rPr kumimoji="0" lang="en-US" altLang="en-US" sz="2000" b="0" i="0" u="none" strike="noStrike" cap="none" normalizeH="0" baseline="0" dirty="0" smtClean="0">
+                <a:ln>
+                  <a:noFill/>
+                </a:ln>
+                <a:solidFill>
+                  <a:srgbClr val="999999"/>
+                </a:solidFill>
+                <a:effectLst/>
+                <a:latin typeface="Consolas" panose="020B0609020204030204" pitchFamily="49" charset="0"/>
+                <a:cs typeface="Consolas" panose="020B0609020204030204" pitchFamily="49" charset="0"/>
+              </a:rPr>
+              <a:t>:</a:t>
+            </a:r>
+            <a:r>
+              <a:rPr kumimoji="0" lang="en-US" altLang="en-US" sz="2000" b="0" i="0" u="none" strike="noStrike" cap="none" normalizeH="0" baseline="0" dirty="0" smtClean="0">
+                <a:ln>
+                  <a:noFill/>
+                </a:ln>
+                <a:solidFill>
+                  <a:srgbClr val="000000"/>
+                </a:solidFill>
+                <a:effectLst/>
+                <a:latin typeface="Consolas" panose="020B0609020204030204" pitchFamily="49" charset="0"/>
+                <a:cs typeface="Consolas" panose="020B0609020204030204" pitchFamily="49" charset="0"/>
+              </a:rPr>
+              <a:t> </a:t>
+            </a:r>
+            <a:r>
+              <a:rPr kumimoji="0" lang="en-US" altLang="en-US" sz="2000" b="0" i="0" u="none" strike="noStrike" cap="none" normalizeH="0" baseline="0" dirty="0" smtClean="0">
+                <a:ln>
+                  <a:noFill/>
+                </a:ln>
+                <a:solidFill>
+                  <a:srgbClr val="990055"/>
+                </a:solidFill>
+                <a:effectLst/>
+                <a:latin typeface="Consolas" panose="020B0609020204030204" pitchFamily="49" charset="0"/>
+                <a:cs typeface="Consolas" panose="020B0609020204030204" pitchFamily="49" charset="0"/>
+              </a:rPr>
+              <a:t>3</a:t>
+            </a:r>
+            <a:r>
+              <a:rPr kumimoji="0" lang="en-US" altLang="en-US" sz="2000" b="0" i="0" u="none" strike="noStrike" cap="none" normalizeH="0" baseline="0" dirty="0" smtClean="0">
+                <a:ln>
+                  <a:noFill/>
+                </a:ln>
+                <a:solidFill>
+                  <a:srgbClr val="000000"/>
+                </a:solidFill>
+                <a:effectLst/>
+                <a:latin typeface="Consolas" panose="020B0609020204030204" pitchFamily="49" charset="0"/>
+                <a:cs typeface="Consolas" panose="020B0609020204030204" pitchFamily="49" charset="0"/>
+              </a:rPr>
+              <a:t> </a:t>
+            </a:r>
+            <a:r>
+              <a:rPr kumimoji="0" lang="en-US" altLang="en-US" sz="2000" b="0" i="0" u="none" strike="noStrike" cap="none" normalizeH="0" baseline="0" dirty="0" smtClean="0">
+                <a:ln>
+                  <a:noFill/>
+                </a:ln>
+                <a:solidFill>
+                  <a:srgbClr val="A67F59"/>
+                </a:solidFill>
+                <a:effectLst/>
+                <a:latin typeface="Consolas" panose="020B0609020204030204" pitchFamily="49" charset="0"/>
+                <a:cs typeface="Consolas" panose="020B0609020204030204" pitchFamily="49" charset="0"/>
+              </a:rPr>
+              <a:t>+</a:t>
+            </a:r>
+            <a:r>
+              <a:rPr kumimoji="0" lang="en-US" altLang="en-US" sz="2000" b="0" i="0" u="none" strike="noStrike" cap="none" normalizeH="0" baseline="0" dirty="0" smtClean="0">
+                <a:ln>
+                  <a:noFill/>
+                </a:ln>
+                <a:solidFill>
+                  <a:srgbClr val="000000"/>
+                </a:solidFill>
+                <a:effectLst/>
+                <a:latin typeface="Consolas" panose="020B0609020204030204" pitchFamily="49" charset="0"/>
+                <a:cs typeface="Consolas" panose="020B0609020204030204" pitchFamily="49" charset="0"/>
+              </a:rPr>
+              <a:t> </a:t>
+            </a:r>
+            <a:r>
+              <a:rPr kumimoji="0" lang="en-US" altLang="en-US" sz="2000" b="0" i="0" u="none" strike="noStrike" cap="none" normalizeH="0" baseline="0" dirty="0" smtClean="0">
+                <a:ln>
+                  <a:noFill/>
+                </a:ln>
+                <a:solidFill>
+                  <a:srgbClr val="990055"/>
+                </a:solidFill>
+                <a:effectLst/>
+                <a:latin typeface="Consolas" panose="020B0609020204030204" pitchFamily="49" charset="0"/>
+                <a:cs typeface="Consolas" panose="020B0609020204030204" pitchFamily="49" charset="0"/>
+              </a:rPr>
+              <a:t>5</a:t>
+            </a:r>
+            <a:r>
+              <a:rPr kumimoji="0" lang="en-US" altLang="en-US" sz="2000" b="0" i="0" u="none" strike="noStrike" cap="none" normalizeH="0" baseline="0" dirty="0" smtClean="0">
+                <a:ln>
+                  <a:noFill/>
+                </a:ln>
+                <a:solidFill>
+                  <a:srgbClr val="000000"/>
+                </a:solidFill>
+                <a:effectLst/>
+                <a:latin typeface="Consolas" panose="020B0609020204030204" pitchFamily="49" charset="0"/>
+                <a:cs typeface="Consolas" panose="020B0609020204030204" pitchFamily="49" charset="0"/>
+              </a:rPr>
+              <a:t> </a:t>
+            </a:r>
+            <a:r>
+              <a:rPr kumimoji="0" lang="en-US" altLang="en-US" sz="2000" b="0" i="0" u="none" strike="noStrike" cap="none" normalizeH="0" baseline="0" dirty="0" smtClean="0">
+                <a:ln>
+                  <a:noFill/>
+                </a:ln>
+                <a:solidFill>
+                  <a:srgbClr val="999999"/>
+                </a:solidFill>
+                <a:effectLst/>
+                <a:latin typeface="Consolas" panose="020B0609020204030204" pitchFamily="49" charset="0"/>
+                <a:cs typeface="Consolas" panose="020B0609020204030204" pitchFamily="49" charset="0"/>
+              </a:rPr>
+              <a:t>});</a:t>
+            </a:r>
+            <a:r>
+              <a:rPr kumimoji="0" lang="en-US" altLang="en-US" sz="2000" b="0" i="0" u="none" strike="noStrike" cap="none" normalizeH="0" baseline="0" dirty="0" smtClean="0">
+                <a:ln>
+                  <a:noFill/>
+                </a:ln>
+                <a:solidFill>
+                  <a:srgbClr val="000000"/>
+                </a:solidFill>
+                <a:effectLst/>
+                <a:latin typeface="Consolas" panose="020B0609020204030204" pitchFamily="49" charset="0"/>
+                <a:cs typeface="Consolas" panose="020B0609020204030204" pitchFamily="49" charset="0"/>
+              </a:rPr>
+              <a:t> </a:t>
+            </a:r>
+          </a:p>
+          <a:p>
+            <a:pPr marL="0" marR="0" lvl="0" indent="0" algn="l" defTabSz="914400" rtl="0" eaLnBrk="0" fontAlgn="base" latinLnBrk="0" hangingPunct="0">
+              <a:lnSpc>
+                <a:spcPct val="100000"/>
+              </a:lnSpc>
+              <a:spcBef>
+                <a:spcPct val="0"/>
+              </a:spcBef>
+              <a:spcAft>
+                <a:spcPct val="0"/>
+              </a:spcAft>
+              <a:buClrTx/>
+              <a:buSzTx/>
+              <a:buFontTx/>
+              <a:buNone/>
+              <a:tabLst/>
+            </a:pPr>
+            <a:endParaRPr kumimoji="0" lang="en-US" altLang="en-US" sz="2000" b="0" i="0" u="none" strike="noStrike" cap="none" normalizeH="0" baseline="0" dirty="0" smtClean="0">
+              <a:ln>
+                <a:noFill/>
+              </a:ln>
+              <a:solidFill>
+                <a:srgbClr val="000000"/>
+              </a:solidFill>
+              <a:effectLst/>
+              <a:latin typeface="Consolas" panose="020B0609020204030204" pitchFamily="49" charset="0"/>
+              <a:cs typeface="Consolas" panose="020B0609020204030204" pitchFamily="49" charset="0"/>
+            </a:endParaRPr>
+          </a:p>
+          <a:p>
+            <a:pPr marL="0" marR="0" lvl="0" indent="0" algn="l" defTabSz="914400" rtl="0" eaLnBrk="0" fontAlgn="base" latinLnBrk="0" hangingPunct="0">
+              <a:lnSpc>
+                <a:spcPct val="100000"/>
+              </a:lnSpc>
+              <a:spcBef>
+                <a:spcPct val="0"/>
+              </a:spcBef>
+              <a:spcAft>
+                <a:spcPct val="0"/>
+              </a:spcAft>
+              <a:buClrTx/>
+              <a:buSzTx/>
+              <a:buFontTx/>
+              <a:buNone/>
+              <a:tabLst/>
+            </a:pPr>
+            <a:r>
+              <a:rPr kumimoji="0" lang="en-US" altLang="en-US" sz="2000" b="0" i="0" u="none" strike="noStrike" cap="none" normalizeH="0" baseline="0" dirty="0" err="1" smtClean="0">
+                <a:ln>
+                  <a:noFill/>
+                </a:ln>
+                <a:solidFill>
+                  <a:srgbClr val="000000"/>
+                </a:solidFill>
+                <a:effectLst/>
+                <a:latin typeface="Consolas" panose="020B0609020204030204" pitchFamily="49" charset="0"/>
+                <a:cs typeface="Consolas" panose="020B0609020204030204" pitchFamily="49" charset="0"/>
+              </a:rPr>
+              <a:t>React</a:t>
+            </a:r>
+            <a:r>
+              <a:rPr kumimoji="0" lang="en-US" altLang="en-US" sz="2000" b="0" i="0" u="none" strike="noStrike" cap="none" normalizeH="0" baseline="0" dirty="0" err="1" smtClean="0">
+                <a:ln>
+                  <a:noFill/>
+                </a:ln>
+                <a:solidFill>
+                  <a:srgbClr val="999999"/>
+                </a:solidFill>
+                <a:effectLst/>
+                <a:latin typeface="Consolas" panose="020B0609020204030204" pitchFamily="49" charset="0"/>
+                <a:cs typeface="Consolas" panose="020B0609020204030204" pitchFamily="49" charset="0"/>
+              </a:rPr>
+              <a:t>.</a:t>
+            </a:r>
+            <a:r>
+              <a:rPr kumimoji="0" lang="en-US" altLang="en-US" sz="2000" b="0" i="0" u="none" strike="noStrike" cap="none" normalizeH="0" baseline="0" dirty="0" err="1" smtClean="0">
+                <a:ln>
+                  <a:noFill/>
+                </a:ln>
+                <a:solidFill>
+                  <a:srgbClr val="DD4A68"/>
+                </a:solidFill>
+                <a:effectLst/>
+                <a:latin typeface="Consolas" panose="020B0609020204030204" pitchFamily="49" charset="0"/>
+                <a:cs typeface="Consolas" panose="020B0609020204030204" pitchFamily="49" charset="0"/>
+              </a:rPr>
+              <a:t>createElement</a:t>
+            </a:r>
+            <a:r>
+              <a:rPr kumimoji="0" lang="en-US" altLang="en-US" sz="2000" b="0" i="0" u="none" strike="noStrike" cap="none" normalizeH="0" baseline="0" dirty="0" smtClean="0">
+                <a:ln>
+                  <a:noFill/>
+                </a:ln>
+                <a:solidFill>
+                  <a:srgbClr val="999999"/>
+                </a:solidFill>
+                <a:effectLst/>
+                <a:latin typeface="Consolas" panose="020B0609020204030204" pitchFamily="49" charset="0"/>
+                <a:cs typeface="Consolas" panose="020B0609020204030204" pitchFamily="49" charset="0"/>
+              </a:rPr>
+              <a:t>(</a:t>
+            </a:r>
+            <a:r>
+              <a:rPr kumimoji="0" lang="en-US" altLang="en-US" sz="2000" b="0" i="0" u="none" strike="noStrike" cap="none" normalizeH="0" baseline="0" dirty="0" smtClean="0">
+                <a:ln>
+                  <a:noFill/>
+                </a:ln>
+                <a:solidFill>
+                  <a:srgbClr val="000000"/>
+                </a:solidFill>
+                <a:effectLst/>
+                <a:latin typeface="Consolas" panose="020B0609020204030204" pitchFamily="49" charset="0"/>
+                <a:cs typeface="Consolas" panose="020B0609020204030204" pitchFamily="49" charset="0"/>
+              </a:rPr>
+              <a:t> </a:t>
+            </a:r>
+            <a:r>
+              <a:rPr kumimoji="0" lang="en-US" altLang="en-US" sz="2000" b="0" i="0" u="none" strike="noStrike" cap="none" normalizeH="0" baseline="0" dirty="0" err="1" smtClean="0">
+                <a:ln>
+                  <a:noFill/>
+                </a:ln>
+                <a:solidFill>
+                  <a:srgbClr val="000000"/>
+                </a:solidFill>
+                <a:effectLst/>
+                <a:latin typeface="Consolas" panose="020B0609020204030204" pitchFamily="49" charset="0"/>
+                <a:cs typeface="Consolas" panose="020B0609020204030204" pitchFamily="49" charset="0"/>
+              </a:rPr>
+              <a:t>DashboardUnit</a:t>
+            </a:r>
+            <a:r>
+              <a:rPr kumimoji="0" lang="en-US" altLang="en-US" sz="2000" b="0" i="0" u="none" strike="noStrike" cap="none" normalizeH="0" baseline="0" dirty="0" smtClean="0">
+                <a:ln>
+                  <a:noFill/>
+                </a:ln>
+                <a:solidFill>
+                  <a:srgbClr val="999999"/>
+                </a:solidFill>
+                <a:effectLst/>
+                <a:latin typeface="Consolas" panose="020B0609020204030204" pitchFamily="49" charset="0"/>
+                <a:cs typeface="Consolas" panose="020B0609020204030204" pitchFamily="49" charset="0"/>
+              </a:rPr>
+              <a:t>,</a:t>
+            </a:r>
+            <a:r>
+              <a:rPr kumimoji="0" lang="en-US" altLang="en-US" sz="2000" b="0" i="0" u="none" strike="noStrike" cap="none" normalizeH="0" baseline="0" dirty="0" smtClean="0">
+                <a:ln>
+                  <a:noFill/>
+                </a:ln>
+                <a:solidFill>
+                  <a:srgbClr val="000000"/>
+                </a:solidFill>
+                <a:effectLst/>
+                <a:latin typeface="Consolas" panose="020B0609020204030204" pitchFamily="49" charset="0"/>
+                <a:cs typeface="Consolas" panose="020B0609020204030204" pitchFamily="49" charset="0"/>
+              </a:rPr>
+              <a:t> </a:t>
+            </a:r>
+          </a:p>
+          <a:p>
+            <a:pPr marL="0" marR="0" lvl="0" indent="0" algn="l" defTabSz="914400" rtl="0" eaLnBrk="0" fontAlgn="base" latinLnBrk="0" hangingPunct="0">
+              <a:lnSpc>
+                <a:spcPct val="100000"/>
+              </a:lnSpc>
+              <a:spcBef>
+                <a:spcPct val="0"/>
+              </a:spcBef>
+              <a:spcAft>
+                <a:spcPct val="0"/>
+              </a:spcAft>
+              <a:buClrTx/>
+              <a:buSzTx/>
+              <a:buFontTx/>
+              <a:buNone/>
+              <a:tabLst/>
+            </a:pPr>
+            <a:r>
+              <a:rPr lang="en-US" altLang="en-US" sz="2000" dirty="0">
+                <a:solidFill>
+                  <a:srgbClr val="000000"/>
+                </a:solidFill>
+                <a:latin typeface="Consolas" panose="020B0609020204030204" pitchFamily="49" charset="0"/>
+                <a:cs typeface="Consolas" panose="020B0609020204030204" pitchFamily="49" charset="0"/>
+              </a:rPr>
+              <a:t>	</a:t>
+            </a:r>
+            <a:r>
+              <a:rPr kumimoji="0" lang="en-US" altLang="en-US" sz="2000" b="0" i="0" u="none" strike="noStrike" cap="none" normalizeH="0" baseline="0" dirty="0" smtClean="0">
+                <a:ln>
+                  <a:noFill/>
+                </a:ln>
+                <a:solidFill>
+                  <a:srgbClr val="999999"/>
+                </a:solidFill>
+                <a:effectLst/>
+                <a:latin typeface="Consolas" panose="020B0609020204030204" pitchFamily="49" charset="0"/>
+                <a:cs typeface="Consolas" panose="020B0609020204030204" pitchFamily="49" charset="0"/>
+              </a:rPr>
+              <a:t>{</a:t>
+            </a:r>
+            <a:r>
+              <a:rPr kumimoji="0" lang="en-US" altLang="en-US" sz="2000" b="0" i="0" u="none" strike="noStrike" cap="none" normalizeH="0" baseline="0" dirty="0" smtClean="0">
+                <a:ln>
+                  <a:noFill/>
+                </a:ln>
+                <a:solidFill>
+                  <a:srgbClr val="000000"/>
+                </a:solidFill>
+                <a:effectLst/>
+                <a:latin typeface="Consolas" panose="020B0609020204030204" pitchFamily="49" charset="0"/>
+                <a:cs typeface="Consolas" panose="020B0609020204030204" pitchFamily="49" charset="0"/>
+              </a:rPr>
+              <a:t> </a:t>
+            </a:r>
+            <a:r>
+              <a:rPr kumimoji="0" lang="en-US" altLang="en-US" sz="2000" b="0" i="0" u="none" strike="noStrike" cap="none" normalizeH="0" baseline="0" dirty="0" smtClean="0">
+                <a:ln>
+                  <a:noFill/>
+                </a:ln>
+                <a:solidFill>
+                  <a:srgbClr val="669900"/>
+                </a:solidFill>
+                <a:effectLst/>
+                <a:latin typeface="Consolas" panose="020B0609020204030204" pitchFamily="49" charset="0"/>
+                <a:cs typeface="Consolas" panose="020B0609020204030204" pitchFamily="49" charset="0"/>
+              </a:rPr>
+              <a:t>"data-index"</a:t>
+            </a:r>
+            <a:r>
+              <a:rPr kumimoji="0" lang="en-US" altLang="en-US" sz="2000" b="0" i="0" u="none" strike="noStrike" cap="none" normalizeH="0" baseline="0" dirty="0" smtClean="0">
+                <a:ln>
+                  <a:noFill/>
+                </a:ln>
+                <a:solidFill>
+                  <a:srgbClr val="999999"/>
+                </a:solidFill>
+                <a:effectLst/>
+                <a:latin typeface="Consolas" panose="020B0609020204030204" pitchFamily="49" charset="0"/>
+                <a:cs typeface="Consolas" panose="020B0609020204030204" pitchFamily="49" charset="0"/>
+              </a:rPr>
+              <a:t>:</a:t>
+            </a:r>
+            <a:r>
+              <a:rPr kumimoji="0" lang="en-US" altLang="en-US" sz="2000" b="0" i="0" u="none" strike="noStrike" cap="none" normalizeH="0" baseline="0" dirty="0" smtClean="0">
+                <a:ln>
+                  <a:noFill/>
+                </a:ln>
+                <a:solidFill>
+                  <a:srgbClr val="000000"/>
+                </a:solidFill>
+                <a:effectLst/>
+                <a:latin typeface="Consolas" panose="020B0609020204030204" pitchFamily="49" charset="0"/>
+                <a:cs typeface="Consolas" panose="020B0609020204030204" pitchFamily="49" charset="0"/>
+              </a:rPr>
+              <a:t> </a:t>
+            </a:r>
+            <a:r>
+              <a:rPr kumimoji="0" lang="en-US" altLang="en-US" sz="2000" b="0" i="0" u="none" strike="noStrike" cap="none" normalizeH="0" baseline="0" dirty="0" smtClean="0">
+                <a:ln>
+                  <a:noFill/>
+                </a:ln>
+                <a:solidFill>
+                  <a:srgbClr val="669900"/>
+                </a:solidFill>
+                <a:effectLst/>
+                <a:latin typeface="Consolas" panose="020B0609020204030204" pitchFamily="49" charset="0"/>
+                <a:cs typeface="Consolas" panose="020B0609020204030204" pitchFamily="49" charset="0"/>
+              </a:rPr>
+              <a:t>"2"</a:t>
+            </a:r>
+            <a:r>
+              <a:rPr kumimoji="0" lang="en-US" altLang="en-US" sz="2000" b="0" i="0" u="none" strike="noStrike" cap="none" normalizeH="0" baseline="0" dirty="0" smtClean="0">
+                <a:ln>
+                  <a:noFill/>
+                </a:ln>
+                <a:solidFill>
+                  <a:srgbClr val="000000"/>
+                </a:solidFill>
+                <a:effectLst/>
+                <a:latin typeface="Consolas" panose="020B0609020204030204" pitchFamily="49" charset="0"/>
+                <a:cs typeface="Consolas" panose="020B0609020204030204" pitchFamily="49" charset="0"/>
+              </a:rPr>
+              <a:t> </a:t>
+            </a:r>
+            <a:r>
+              <a:rPr kumimoji="0" lang="en-US" altLang="en-US" sz="2000" b="0" i="0" u="none" strike="noStrike" cap="none" normalizeH="0" baseline="0" dirty="0" smtClean="0">
+                <a:ln>
+                  <a:noFill/>
+                </a:ln>
+                <a:solidFill>
+                  <a:srgbClr val="999999"/>
+                </a:solidFill>
+                <a:effectLst/>
+                <a:latin typeface="Consolas" panose="020B0609020204030204" pitchFamily="49" charset="0"/>
+                <a:cs typeface="Consolas" panose="020B0609020204030204" pitchFamily="49" charset="0"/>
+              </a:rPr>
+              <a:t>},</a:t>
+            </a:r>
+            <a:r>
+              <a:rPr kumimoji="0" lang="en-US" altLang="en-US" sz="2000" b="0" i="0" u="none" strike="noStrike" cap="none" normalizeH="0" baseline="0" dirty="0" smtClean="0">
+                <a:ln>
+                  <a:noFill/>
+                </a:ln>
+                <a:solidFill>
+                  <a:srgbClr val="000000"/>
+                </a:solidFill>
+                <a:effectLst/>
+                <a:latin typeface="Consolas" panose="020B0609020204030204" pitchFamily="49" charset="0"/>
+                <a:cs typeface="Consolas" panose="020B0609020204030204" pitchFamily="49" charset="0"/>
+              </a:rPr>
+              <a:t> 	</a:t>
+            </a:r>
+          </a:p>
+          <a:p>
+            <a:pPr marL="0" marR="0" lvl="0" indent="0" algn="l" defTabSz="914400" rtl="0" eaLnBrk="0" fontAlgn="base" latinLnBrk="0" hangingPunct="0">
+              <a:lnSpc>
+                <a:spcPct val="100000"/>
+              </a:lnSpc>
+              <a:spcBef>
+                <a:spcPct val="0"/>
+              </a:spcBef>
+              <a:spcAft>
+                <a:spcPct val="0"/>
+              </a:spcAft>
+              <a:buClrTx/>
+              <a:buSzTx/>
+              <a:buFontTx/>
+              <a:buNone/>
+              <a:tabLst/>
+            </a:pPr>
+            <a:r>
+              <a:rPr lang="en-US" altLang="en-US" sz="2000" dirty="0">
+                <a:solidFill>
+                  <a:srgbClr val="000000"/>
+                </a:solidFill>
+                <a:latin typeface="Consolas" panose="020B0609020204030204" pitchFamily="49" charset="0"/>
+                <a:cs typeface="Consolas" panose="020B0609020204030204" pitchFamily="49" charset="0"/>
+              </a:rPr>
+              <a:t>	</a:t>
+            </a:r>
+            <a:r>
+              <a:rPr kumimoji="0" lang="en-US" altLang="en-US" sz="2000" b="0" i="0" u="none" strike="noStrike" cap="none" normalizeH="0" baseline="0" dirty="0" err="1" smtClean="0">
+                <a:ln>
+                  <a:noFill/>
+                </a:ln>
+                <a:solidFill>
+                  <a:srgbClr val="000000"/>
+                </a:solidFill>
+                <a:effectLst/>
+                <a:latin typeface="Consolas" panose="020B0609020204030204" pitchFamily="49" charset="0"/>
+                <a:cs typeface="Consolas" panose="020B0609020204030204" pitchFamily="49" charset="0"/>
+              </a:rPr>
+              <a:t>React</a:t>
+            </a:r>
+            <a:r>
+              <a:rPr kumimoji="0" lang="en-US" altLang="en-US" sz="2000" b="0" i="0" u="none" strike="noStrike" cap="none" normalizeH="0" baseline="0" dirty="0" err="1" smtClean="0">
+                <a:ln>
+                  <a:noFill/>
+                </a:ln>
+                <a:solidFill>
+                  <a:srgbClr val="999999"/>
+                </a:solidFill>
+                <a:effectLst/>
+                <a:latin typeface="Consolas" panose="020B0609020204030204" pitchFamily="49" charset="0"/>
+                <a:cs typeface="Consolas" panose="020B0609020204030204" pitchFamily="49" charset="0"/>
+              </a:rPr>
+              <a:t>.</a:t>
+            </a:r>
+            <a:r>
+              <a:rPr kumimoji="0" lang="en-US" altLang="en-US" sz="2000" b="0" i="0" u="none" strike="noStrike" cap="none" normalizeH="0" baseline="0" dirty="0" err="1" smtClean="0">
+                <a:ln>
+                  <a:noFill/>
+                </a:ln>
+                <a:solidFill>
+                  <a:srgbClr val="DD4A68"/>
+                </a:solidFill>
+                <a:effectLst/>
+                <a:latin typeface="Consolas" panose="020B0609020204030204" pitchFamily="49" charset="0"/>
+                <a:cs typeface="Consolas" panose="020B0609020204030204" pitchFamily="49" charset="0"/>
+              </a:rPr>
+              <a:t>createElement</a:t>
+            </a:r>
+            <a:r>
+              <a:rPr kumimoji="0" lang="en-US" altLang="en-US" sz="2000" b="0" i="0" u="none" strike="noStrike" cap="none" normalizeH="0" baseline="0" dirty="0" smtClean="0">
+                <a:ln>
+                  <a:noFill/>
+                </a:ln>
+                <a:solidFill>
+                  <a:srgbClr val="999999"/>
+                </a:solidFill>
+                <a:effectLst/>
+                <a:latin typeface="Consolas" panose="020B0609020204030204" pitchFamily="49" charset="0"/>
+                <a:cs typeface="Consolas" panose="020B0609020204030204" pitchFamily="49" charset="0"/>
+              </a:rPr>
+              <a:t>(</a:t>
+            </a:r>
+            <a:r>
+              <a:rPr kumimoji="0" lang="en-US" altLang="en-US" sz="2000" b="0" i="0" u="none" strike="noStrike" cap="none" normalizeH="0" baseline="0" dirty="0" smtClean="0">
+                <a:ln>
+                  <a:noFill/>
+                </a:ln>
+                <a:solidFill>
+                  <a:srgbClr val="669900"/>
+                </a:solidFill>
+                <a:effectLst/>
+                <a:latin typeface="Consolas" panose="020B0609020204030204" pitchFamily="49" charset="0"/>
+                <a:cs typeface="Consolas" panose="020B0609020204030204" pitchFamily="49" charset="0"/>
+              </a:rPr>
+              <a:t>"h1"</a:t>
+            </a:r>
+            <a:r>
+              <a:rPr kumimoji="0" lang="en-US" altLang="en-US" sz="2000" b="0" i="0" u="none" strike="noStrike" cap="none" normalizeH="0" baseline="0" dirty="0" smtClean="0">
+                <a:ln>
+                  <a:noFill/>
+                </a:ln>
+                <a:solidFill>
+                  <a:srgbClr val="999999"/>
+                </a:solidFill>
+                <a:effectLst/>
+                <a:latin typeface="Consolas" panose="020B0609020204030204" pitchFamily="49" charset="0"/>
+                <a:cs typeface="Consolas" panose="020B0609020204030204" pitchFamily="49" charset="0"/>
+              </a:rPr>
+              <a:t>,</a:t>
+            </a:r>
+            <a:r>
+              <a:rPr kumimoji="0" lang="en-US" altLang="en-US" sz="2000" b="0" i="0" u="none" strike="noStrike" cap="none" normalizeH="0" baseline="0" dirty="0" smtClean="0">
+                <a:ln>
+                  <a:noFill/>
+                </a:ln>
+                <a:solidFill>
+                  <a:srgbClr val="000000"/>
+                </a:solidFill>
+                <a:effectLst/>
+                <a:latin typeface="Consolas" panose="020B0609020204030204" pitchFamily="49" charset="0"/>
+                <a:cs typeface="Consolas" panose="020B0609020204030204" pitchFamily="49" charset="0"/>
+              </a:rPr>
+              <a:t> </a:t>
+            </a:r>
+            <a:r>
+              <a:rPr kumimoji="0" lang="en-US" altLang="en-US" sz="2000" b="0" i="0" u="none" strike="noStrike" cap="none" normalizeH="0" baseline="0" dirty="0" smtClean="0">
+                <a:ln>
+                  <a:noFill/>
+                </a:ln>
+                <a:solidFill>
+                  <a:srgbClr val="0077AA"/>
+                </a:solidFill>
+                <a:effectLst/>
+                <a:latin typeface="Consolas" panose="020B0609020204030204" pitchFamily="49" charset="0"/>
+                <a:cs typeface="Consolas" panose="020B0609020204030204" pitchFamily="49" charset="0"/>
+              </a:rPr>
+              <a:t>null</a:t>
+            </a:r>
+            <a:r>
+              <a:rPr kumimoji="0" lang="en-US" altLang="en-US" sz="2000" b="0" i="0" u="none" strike="noStrike" cap="none" normalizeH="0" baseline="0" dirty="0" smtClean="0">
+                <a:ln>
+                  <a:noFill/>
+                </a:ln>
+                <a:solidFill>
+                  <a:srgbClr val="999999"/>
+                </a:solidFill>
+                <a:effectLst/>
+                <a:latin typeface="Consolas" panose="020B0609020204030204" pitchFamily="49" charset="0"/>
+                <a:cs typeface="Consolas" panose="020B0609020204030204" pitchFamily="49" charset="0"/>
+              </a:rPr>
+              <a:t>,</a:t>
+            </a:r>
+            <a:r>
+              <a:rPr kumimoji="0" lang="en-US" altLang="en-US" sz="2000" b="0" i="0" u="none" strike="noStrike" cap="none" normalizeH="0" baseline="0" dirty="0" smtClean="0">
+                <a:ln>
+                  <a:noFill/>
+                </a:ln>
+                <a:solidFill>
+                  <a:srgbClr val="000000"/>
+                </a:solidFill>
+                <a:effectLst/>
+                <a:latin typeface="Consolas" panose="020B0609020204030204" pitchFamily="49" charset="0"/>
+                <a:cs typeface="Consolas" panose="020B0609020204030204" pitchFamily="49" charset="0"/>
+              </a:rPr>
+              <a:t> </a:t>
+            </a:r>
+            <a:r>
+              <a:rPr kumimoji="0" lang="en-US" altLang="en-US" sz="2000" b="0" i="0" u="none" strike="noStrike" cap="none" normalizeH="0" baseline="0" dirty="0" smtClean="0">
+                <a:ln>
+                  <a:noFill/>
+                </a:ln>
+                <a:solidFill>
+                  <a:srgbClr val="669900"/>
+                </a:solidFill>
+                <a:effectLst/>
+                <a:latin typeface="Consolas" panose="020B0609020204030204" pitchFamily="49" charset="0"/>
+                <a:cs typeface="Consolas" panose="020B0609020204030204" pitchFamily="49" charset="0"/>
+              </a:rPr>
+              <a:t>"Scores"</a:t>
+            </a:r>
+            <a:r>
+              <a:rPr kumimoji="0" lang="en-US" altLang="en-US" sz="2000" b="0" i="0" u="none" strike="noStrike" cap="none" normalizeH="0" baseline="0" dirty="0" smtClean="0">
+                <a:ln>
+                  <a:noFill/>
+                </a:ln>
+                <a:solidFill>
+                  <a:srgbClr val="999999"/>
+                </a:solidFill>
+                <a:effectLst/>
+                <a:latin typeface="Consolas" panose="020B0609020204030204" pitchFamily="49" charset="0"/>
+                <a:cs typeface="Consolas" panose="020B0609020204030204" pitchFamily="49" charset="0"/>
+              </a:rPr>
+              <a:t>),</a:t>
+            </a:r>
+            <a:r>
+              <a:rPr kumimoji="0" lang="en-US" altLang="en-US" sz="2000" b="0" i="0" u="none" strike="noStrike" cap="none" normalizeH="0" baseline="0" dirty="0" smtClean="0">
+                <a:ln>
+                  <a:noFill/>
+                </a:ln>
+                <a:solidFill>
+                  <a:srgbClr val="000000"/>
+                </a:solidFill>
+                <a:effectLst/>
+                <a:latin typeface="Consolas" panose="020B0609020204030204" pitchFamily="49" charset="0"/>
+                <a:cs typeface="Consolas" panose="020B0609020204030204" pitchFamily="49" charset="0"/>
+              </a:rPr>
+              <a:t> 	</a:t>
+            </a:r>
+            <a:r>
+              <a:rPr kumimoji="0" lang="en-US" altLang="en-US" sz="2000" b="0" i="0" u="none" strike="noStrike" cap="none" normalizeH="0" baseline="0" dirty="0" err="1" smtClean="0">
+                <a:ln>
+                  <a:noFill/>
+                </a:ln>
+                <a:solidFill>
+                  <a:srgbClr val="000000"/>
+                </a:solidFill>
+                <a:effectLst/>
+                <a:latin typeface="Consolas" panose="020B0609020204030204" pitchFamily="49" charset="0"/>
+                <a:cs typeface="Consolas" panose="020B0609020204030204" pitchFamily="49" charset="0"/>
+              </a:rPr>
+              <a:t>React</a:t>
+            </a:r>
+            <a:r>
+              <a:rPr kumimoji="0" lang="en-US" altLang="en-US" sz="2000" b="0" i="0" u="none" strike="noStrike" cap="none" normalizeH="0" baseline="0" dirty="0" err="1" smtClean="0">
+                <a:ln>
+                  <a:noFill/>
+                </a:ln>
+                <a:solidFill>
+                  <a:srgbClr val="999999"/>
+                </a:solidFill>
+                <a:effectLst/>
+                <a:latin typeface="Consolas" panose="020B0609020204030204" pitchFamily="49" charset="0"/>
+                <a:cs typeface="Consolas" panose="020B0609020204030204" pitchFamily="49" charset="0"/>
+              </a:rPr>
+              <a:t>.</a:t>
+            </a:r>
+            <a:r>
+              <a:rPr kumimoji="0" lang="en-US" altLang="en-US" sz="2000" b="0" i="0" u="none" strike="noStrike" cap="none" normalizeH="0" baseline="0" dirty="0" err="1" smtClean="0">
+                <a:ln>
+                  <a:noFill/>
+                </a:ln>
+                <a:solidFill>
+                  <a:srgbClr val="DD4A68"/>
+                </a:solidFill>
+                <a:effectLst/>
+                <a:latin typeface="Consolas" panose="020B0609020204030204" pitchFamily="49" charset="0"/>
+                <a:cs typeface="Consolas" panose="020B0609020204030204" pitchFamily="49" charset="0"/>
+              </a:rPr>
+              <a:t>createElement</a:t>
+            </a:r>
+            <a:r>
+              <a:rPr kumimoji="0" lang="en-US" altLang="en-US" sz="2000" b="0" i="0" u="none" strike="noStrike" cap="none" normalizeH="0" baseline="0" dirty="0" smtClean="0">
+                <a:ln>
+                  <a:noFill/>
+                </a:ln>
+                <a:solidFill>
+                  <a:srgbClr val="999999"/>
+                </a:solidFill>
+                <a:effectLst/>
+                <a:latin typeface="Consolas" panose="020B0609020204030204" pitchFamily="49" charset="0"/>
+                <a:cs typeface="Consolas" panose="020B0609020204030204" pitchFamily="49" charset="0"/>
+              </a:rPr>
+              <a:t>(</a:t>
+            </a:r>
+            <a:r>
+              <a:rPr kumimoji="0" lang="en-US" altLang="en-US" sz="2000" b="0" i="0" u="none" strike="noStrike" cap="none" normalizeH="0" baseline="0" dirty="0" smtClean="0">
+                <a:ln>
+                  <a:noFill/>
+                </a:ln>
+                <a:solidFill>
+                  <a:srgbClr val="000000"/>
+                </a:solidFill>
+                <a:effectLst/>
+                <a:latin typeface="Consolas" panose="020B0609020204030204" pitchFamily="49" charset="0"/>
+                <a:cs typeface="Consolas" panose="020B0609020204030204" pitchFamily="49" charset="0"/>
+              </a:rPr>
+              <a:t>Scoreboard</a:t>
+            </a:r>
+            <a:r>
+              <a:rPr kumimoji="0" lang="en-US" altLang="en-US" sz="2000" b="0" i="0" u="none" strike="noStrike" cap="none" normalizeH="0" baseline="0" dirty="0" smtClean="0">
+                <a:ln>
+                  <a:noFill/>
+                </a:ln>
+                <a:solidFill>
+                  <a:srgbClr val="999999"/>
+                </a:solidFill>
+                <a:effectLst/>
+                <a:latin typeface="Consolas" panose="020B0609020204030204" pitchFamily="49" charset="0"/>
+                <a:cs typeface="Consolas" panose="020B0609020204030204" pitchFamily="49" charset="0"/>
+              </a:rPr>
+              <a:t>,</a:t>
+            </a:r>
+            <a:r>
+              <a:rPr kumimoji="0" lang="en-US" altLang="en-US" sz="2000" b="0" i="0" u="none" strike="noStrike" cap="none" normalizeH="0" baseline="0" dirty="0" smtClean="0">
+                <a:ln>
+                  <a:noFill/>
+                </a:ln>
+                <a:solidFill>
+                  <a:srgbClr val="000000"/>
+                </a:solidFill>
+                <a:effectLst/>
+                <a:latin typeface="Consolas" panose="020B0609020204030204" pitchFamily="49" charset="0"/>
+                <a:cs typeface="Consolas" panose="020B0609020204030204" pitchFamily="49" charset="0"/>
+              </a:rPr>
+              <a:t> </a:t>
+            </a:r>
+            <a:r>
+              <a:rPr kumimoji="0" lang="en-US" altLang="en-US" sz="2000" b="0" i="0" u="none" strike="noStrike" cap="none" normalizeH="0" baseline="0" dirty="0" smtClean="0">
+                <a:ln>
+                  <a:noFill/>
+                </a:ln>
+                <a:solidFill>
+                  <a:srgbClr val="999999"/>
+                </a:solidFill>
+                <a:effectLst/>
+                <a:latin typeface="Consolas" panose="020B0609020204030204" pitchFamily="49" charset="0"/>
+                <a:cs typeface="Consolas" panose="020B0609020204030204" pitchFamily="49" charset="0"/>
+              </a:rPr>
+              <a:t>{</a:t>
+            </a:r>
+            <a:r>
+              <a:rPr kumimoji="0" lang="en-US" altLang="en-US" sz="2000" b="0" i="0" u="none" strike="noStrike" cap="none" normalizeH="0" baseline="0" dirty="0" smtClean="0">
+                <a:ln>
+                  <a:noFill/>
+                </a:ln>
+                <a:solidFill>
+                  <a:srgbClr val="000000"/>
+                </a:solidFill>
+                <a:effectLst/>
+                <a:latin typeface="Consolas" panose="020B0609020204030204" pitchFamily="49" charset="0"/>
+                <a:cs typeface="Consolas" panose="020B0609020204030204" pitchFamily="49" charset="0"/>
+              </a:rPr>
+              <a:t> </a:t>
+            </a:r>
+            <a:r>
+              <a:rPr kumimoji="0" lang="en-US" altLang="en-US" sz="2000" b="0" i="0" u="none" strike="noStrike" cap="none" normalizeH="0" baseline="0" dirty="0" err="1" smtClean="0">
+                <a:ln>
+                  <a:noFill/>
+                </a:ln>
+                <a:solidFill>
+                  <a:srgbClr val="000000"/>
+                </a:solidFill>
+                <a:effectLst/>
+                <a:latin typeface="Consolas" panose="020B0609020204030204" pitchFamily="49" charset="0"/>
+                <a:cs typeface="Consolas" panose="020B0609020204030204" pitchFamily="49" charset="0"/>
+              </a:rPr>
+              <a:t>className</a:t>
+            </a:r>
+            <a:r>
+              <a:rPr kumimoji="0" lang="en-US" altLang="en-US" sz="2000" b="0" i="0" u="none" strike="noStrike" cap="none" normalizeH="0" baseline="0" dirty="0" smtClean="0">
+                <a:ln>
+                  <a:noFill/>
+                </a:ln>
+                <a:solidFill>
+                  <a:srgbClr val="999999"/>
+                </a:solidFill>
+                <a:effectLst/>
+                <a:latin typeface="Consolas" panose="020B0609020204030204" pitchFamily="49" charset="0"/>
+                <a:cs typeface="Consolas" panose="020B0609020204030204" pitchFamily="49" charset="0"/>
+              </a:rPr>
+              <a:t>:</a:t>
+            </a:r>
+            <a:r>
+              <a:rPr kumimoji="0" lang="en-US" altLang="en-US" sz="2000" b="0" i="0" u="none" strike="noStrike" cap="none" normalizeH="0" baseline="0" dirty="0" smtClean="0">
+                <a:ln>
+                  <a:noFill/>
+                </a:ln>
+                <a:solidFill>
+                  <a:srgbClr val="669900"/>
+                </a:solidFill>
+                <a:effectLst/>
+                <a:latin typeface="Consolas" panose="020B0609020204030204" pitchFamily="49" charset="0"/>
+                <a:cs typeface="Consolas" panose="020B0609020204030204" pitchFamily="49" charset="0"/>
+              </a:rPr>
+              <a:t>"results"</a:t>
+            </a:r>
+            <a:r>
+              <a:rPr kumimoji="0" lang="en-US" altLang="en-US" sz="2000" b="0" i="0" u="none" strike="noStrike" cap="none" normalizeH="0" baseline="0" dirty="0" smtClean="0">
+                <a:ln>
+                  <a:noFill/>
+                </a:ln>
+                <a:solidFill>
+                  <a:srgbClr val="999999"/>
+                </a:solidFill>
+                <a:effectLst/>
+                <a:latin typeface="Consolas" panose="020B0609020204030204" pitchFamily="49" charset="0"/>
+                <a:cs typeface="Consolas" panose="020B0609020204030204" pitchFamily="49" charset="0"/>
+              </a:rPr>
+              <a:t>,</a:t>
+            </a:r>
+            <a:r>
+              <a:rPr kumimoji="0" lang="en-US" altLang="en-US" sz="2000" b="0" i="0" u="none" strike="noStrike" cap="none" normalizeH="0" baseline="0" dirty="0" smtClean="0">
+                <a:ln>
+                  <a:noFill/>
+                </a:ln>
+                <a:solidFill>
+                  <a:srgbClr val="000000"/>
+                </a:solidFill>
+                <a:effectLst/>
+                <a:latin typeface="Consolas" panose="020B0609020204030204" pitchFamily="49" charset="0"/>
+                <a:cs typeface="Consolas" panose="020B0609020204030204" pitchFamily="49" charset="0"/>
+              </a:rPr>
+              <a:t> </a:t>
+            </a:r>
+            <a:r>
+              <a:rPr kumimoji="0" lang="en-US" altLang="en-US" sz="2000" b="0" i="0" u="none" strike="noStrike" cap="none" normalizeH="0" baseline="0" dirty="0" err="1" smtClean="0">
+                <a:ln>
+                  <a:noFill/>
+                </a:ln>
+                <a:solidFill>
+                  <a:srgbClr val="000000"/>
+                </a:solidFill>
+                <a:effectLst/>
+                <a:latin typeface="Consolas" panose="020B0609020204030204" pitchFamily="49" charset="0"/>
+                <a:cs typeface="Consolas" panose="020B0609020204030204" pitchFamily="49" charset="0"/>
+              </a:rPr>
+              <a:t>scores</a:t>
+            </a:r>
+            <a:r>
+              <a:rPr kumimoji="0" lang="en-US" altLang="en-US" sz="2000" b="0" i="0" u="none" strike="noStrike" cap="none" normalizeH="0" baseline="0" dirty="0" err="1" smtClean="0">
+                <a:ln>
+                  <a:noFill/>
+                </a:ln>
+                <a:solidFill>
+                  <a:srgbClr val="999999"/>
+                </a:solidFill>
+                <a:effectLst/>
+                <a:latin typeface="Consolas" panose="020B0609020204030204" pitchFamily="49" charset="0"/>
+                <a:cs typeface="Consolas" panose="020B0609020204030204" pitchFamily="49" charset="0"/>
+              </a:rPr>
+              <a:t>:</a:t>
+            </a:r>
+            <a:r>
+              <a:rPr kumimoji="0" lang="en-US" altLang="en-US" sz="2000" b="0" i="0" u="none" strike="noStrike" cap="none" normalizeH="0" baseline="0" dirty="0" err="1" smtClean="0">
+                <a:ln>
+                  <a:noFill/>
+                </a:ln>
+                <a:solidFill>
+                  <a:srgbClr val="000000"/>
+                </a:solidFill>
+                <a:effectLst/>
+                <a:latin typeface="Consolas" panose="020B0609020204030204" pitchFamily="49" charset="0"/>
+                <a:cs typeface="Consolas" panose="020B0609020204030204" pitchFamily="49" charset="0"/>
+              </a:rPr>
+              <a:t>gameScores</a:t>
+            </a:r>
+            <a:r>
+              <a:rPr kumimoji="0" lang="en-US" altLang="en-US" sz="2000" b="0" i="0" u="none" strike="noStrike" cap="none" normalizeH="0" baseline="0" dirty="0" smtClean="0">
+                <a:ln>
+                  <a:noFill/>
+                </a:ln>
+                <a:solidFill>
+                  <a:srgbClr val="000000"/>
+                </a:solidFill>
+                <a:effectLst/>
+                <a:latin typeface="Consolas" panose="020B0609020204030204" pitchFamily="49" charset="0"/>
+                <a:cs typeface="Consolas" panose="020B0609020204030204" pitchFamily="49" charset="0"/>
+              </a:rPr>
+              <a:t> </a:t>
+            </a:r>
+            <a:r>
+              <a:rPr kumimoji="0" lang="en-US" altLang="en-US" sz="2000" b="0" i="0" u="none" strike="noStrike" cap="none" normalizeH="0" baseline="0" dirty="0" smtClean="0">
+                <a:ln>
+                  <a:noFill/>
+                </a:ln>
+                <a:solidFill>
+                  <a:srgbClr val="999999"/>
+                </a:solidFill>
+                <a:effectLst/>
+                <a:latin typeface="Consolas" panose="020B0609020204030204" pitchFamily="49" charset="0"/>
+                <a:cs typeface="Consolas" panose="020B0609020204030204" pitchFamily="49" charset="0"/>
+              </a:rPr>
+              <a:t>})</a:t>
+            </a:r>
+          </a:p>
+          <a:p>
+            <a:pPr marL="0" marR="0" lvl="0" indent="0" algn="l" defTabSz="914400" rtl="0" eaLnBrk="0" fontAlgn="base" latinLnBrk="0" hangingPunct="0">
+              <a:lnSpc>
+                <a:spcPct val="100000"/>
+              </a:lnSpc>
+              <a:spcBef>
+                <a:spcPct val="0"/>
+              </a:spcBef>
+              <a:spcAft>
+                <a:spcPct val="0"/>
+              </a:spcAft>
+              <a:buClrTx/>
+              <a:buSzTx/>
+              <a:buFontTx/>
+              <a:buNone/>
+              <a:tabLst/>
+            </a:pPr>
+            <a:r>
+              <a:rPr kumimoji="0" lang="en-US" altLang="en-US" sz="2000" b="0" i="0" u="none" strike="noStrike" cap="none" normalizeH="0" baseline="0" dirty="0" smtClean="0">
+                <a:ln>
+                  <a:noFill/>
+                </a:ln>
+                <a:solidFill>
+                  <a:srgbClr val="000000"/>
+                </a:solidFill>
+                <a:effectLst/>
+                <a:latin typeface="Consolas" panose="020B0609020204030204" pitchFamily="49" charset="0"/>
+                <a:cs typeface="Consolas" panose="020B0609020204030204" pitchFamily="49" charset="0"/>
+              </a:rPr>
+              <a:t> </a:t>
+            </a:r>
+            <a:r>
+              <a:rPr kumimoji="0" lang="en-US" altLang="en-US" sz="2000" b="0" i="0" u="none" strike="noStrike" cap="none" normalizeH="0" baseline="0" dirty="0" smtClean="0">
+                <a:ln>
+                  <a:noFill/>
+                </a:ln>
+                <a:solidFill>
+                  <a:srgbClr val="999999"/>
+                </a:solidFill>
+                <a:effectLst/>
+                <a:latin typeface="Consolas" panose="020B0609020204030204" pitchFamily="49" charset="0"/>
+                <a:cs typeface="Consolas" panose="020B0609020204030204" pitchFamily="49" charset="0"/>
+              </a:rPr>
+              <a:t>);</a:t>
+            </a:r>
+            <a:r>
+              <a:rPr kumimoji="0" lang="en-US" altLang="en-US" sz="2000" b="0" i="0" u="none" strike="noStrike" cap="none" normalizeH="0" baseline="0" dirty="0" smtClean="0">
+                <a:ln>
+                  <a:noFill/>
+                </a:ln>
+                <a:solidFill>
+                  <a:schemeClr val="tx1"/>
+                </a:solidFill>
+                <a:effectLst/>
+              </a:rPr>
+              <a:t> </a:t>
+            </a:r>
+            <a:endParaRPr kumimoji="0" lang="en-US" altLang="en-US" sz="2000" b="0" i="0" u="none" strike="noStrike" cap="none" normalizeH="0" baseline="0" dirty="0" smtClean="0">
+              <a:ln>
+                <a:noFill/>
+              </a:ln>
+              <a:solidFill>
+                <a:schemeClr val="tx1"/>
+              </a:solidFill>
+              <a:effectLst/>
+              <a:latin typeface="Arial" panose="020B0604020202020204" pitchFamily="34" charset="0"/>
+            </a:endParaRPr>
+          </a:p>
+        </p:txBody>
+      </p:sp>
+      <p:sp>
+        <p:nvSpPr>
+          <p:cNvPr id="5" name="TextBox 4"/>
+          <p:cNvSpPr txBox="1"/>
+          <p:nvPr/>
+        </p:nvSpPr>
+        <p:spPr>
+          <a:xfrm>
+            <a:off x="5068276" y="6027313"/>
+            <a:ext cx="2162772" cy="369332"/>
+          </a:xfrm>
+          <a:prstGeom prst="rect">
+            <a:avLst/>
+          </a:prstGeom>
+          <a:noFill/>
+        </p:spPr>
+        <p:txBody>
+          <a:bodyPr wrap="none" rtlCol="0">
+            <a:spAutoFit/>
+          </a:bodyPr>
+          <a:lstStyle/>
+          <a:p>
+            <a:r>
+              <a:rPr lang="en-US" dirty="0" smtClean="0"/>
+              <a:t>Why </a:t>
+            </a:r>
+            <a:r>
+              <a:rPr lang="en-US" dirty="0" err="1" smtClean="0"/>
+              <a:t>className</a:t>
+            </a:r>
+            <a:r>
+              <a:rPr lang="en-US" dirty="0" smtClean="0"/>
+              <a:t> ?</a:t>
+            </a:r>
+            <a:endParaRPr lang="en-US" dirty="0"/>
+          </a:p>
+        </p:txBody>
+      </p:sp>
+    </p:spTree>
+    <p:extLst>
+      <p:ext uri="{BB962C8B-B14F-4D97-AF65-F5344CB8AC3E}">
+        <p14:creationId xmlns:p14="http://schemas.microsoft.com/office/powerpoint/2010/main" val="700670011"/>
+      </p:ext>
+    </p:extLst>
+  </p:cSld>
+  <p:clrMapOvr>
+    <a:masterClrMapping/>
+  </p:clrMapOvr>
+</p:sld>
+</file>
+
+<file path=ppt/slides/slide13.xml><?xml version="1.0" encoding="utf-8"?>
+<p:sld xmlns:a="http://schemas.openxmlformats.org/drawingml/2006/main" xmlns:r="http://schemas.openxmlformats.org/officeDocument/2006/relationships" xmlns:p="http://schemas.openxmlformats.org/presentationml/2006/main">
+  <p:cSld>
+    <p:spTree>
+      <p:nvGrpSpPr>
+        <p:cNvPr id="1" name=""/>
+        <p:cNvGrpSpPr/>
+        <p:nvPr/>
+      </p:nvGrpSpPr>
+      <p:grpSpPr>
+        <a:xfrm>
+          <a:off x="0" y="0"/>
+          <a:ext cx="0" cy="0"/>
+          <a:chOff x="0" y="0"/>
+          <a:chExt cx="0" cy="0"/>
+        </a:xfrm>
+      </p:grpSpPr>
+      <p:sp>
+        <p:nvSpPr>
+          <p:cNvPr id="2" name="Title 1"/>
+          <p:cNvSpPr>
+            <a:spLocks noGrp="1"/>
+          </p:cNvSpPr>
+          <p:nvPr>
+            <p:ph type="title"/>
+          </p:nvPr>
+        </p:nvSpPr>
+        <p:spPr/>
+        <p:txBody>
+          <a:bodyPr/>
+          <a:lstStyle/>
+          <a:p>
+            <a:r>
+              <a:rPr lang="en-US" dirty="0" smtClean="0"/>
+              <a:t>Demo </a:t>
+            </a:r>
+            <a:r>
+              <a:rPr lang="en-US" dirty="0" err="1" smtClean="0"/>
+              <a:t>ToDo</a:t>
+            </a:r>
+            <a:endParaRPr lang="en-US" dirty="0"/>
+          </a:p>
+        </p:txBody>
+      </p:sp>
+      <p:sp>
+        <p:nvSpPr>
+          <p:cNvPr id="3" name="Content Placeholder 2"/>
+          <p:cNvSpPr>
+            <a:spLocks noGrp="1"/>
+          </p:cNvSpPr>
+          <p:nvPr>
+            <p:ph idx="1"/>
+          </p:nvPr>
+        </p:nvSpPr>
+        <p:spPr/>
+        <p:txBody>
+          <a:bodyPr/>
+          <a:lstStyle/>
+          <a:p>
+            <a:r>
+              <a:rPr lang="en-US" dirty="0"/>
+              <a:t>https://codepen.io/mfunkie/pen/BnzKx</a:t>
+            </a:r>
+          </a:p>
+        </p:txBody>
+      </p:sp>
+    </p:spTree>
+    <p:extLst>
+      <p:ext uri="{BB962C8B-B14F-4D97-AF65-F5344CB8AC3E}">
+        <p14:creationId xmlns:p14="http://schemas.microsoft.com/office/powerpoint/2010/main" val="1686176661"/>
+      </p:ext>
+    </p:extLst>
+  </p:cSld>
+  <p:clrMapOvr>
+    <a:masterClrMapping/>
+  </p:clrMapOvr>
+</p:sld>
+</file>
+
 <file path=ppt/slides/slide2.xml><?xml version="1.0" encoding="utf-8"?>
 <p:sld xmlns:a="http://schemas.openxmlformats.org/drawingml/2006/main" xmlns:r="http://schemas.openxmlformats.org/officeDocument/2006/relationships" xmlns:p="http://schemas.openxmlformats.org/presentationml/2006/main">
   <p:cSld>
@@ -8232,7 +11502,6 @@
               <a:rPr lang="en-US" dirty="0"/>
               <a:t>child components receive props from their parents, they either apply modifications (render) or pass it to another child that may use it.</a:t>
             </a:r>
-            <a:endParaRPr lang="en-US" dirty="0"/>
           </a:p>
         </p:txBody>
       </p:sp>
@@ -8428,12 +11697,433 @@
             <p:ph idx="1"/>
           </p:nvPr>
         </p:nvSpPr>
-        <p:spPr/>
+        <p:spPr>
+          <a:xfrm>
+            <a:off x="2589212" y="2133600"/>
+            <a:ext cx="8915400" cy="1755820"/>
+          </a:xfrm>
+        </p:spPr>
         <p:txBody>
           <a:bodyPr/>
           <a:lstStyle/>
           <a:p>
+            <a:r>
+              <a:rPr lang="en-US" dirty="0"/>
+              <a:t>Components let you split the UI into independent, reusable pieces, and think about each piece in isolation</a:t>
+            </a:r>
+            <a:r>
+              <a:rPr lang="en-US" dirty="0" smtClean="0"/>
+              <a:t>.</a:t>
+            </a:r>
+          </a:p>
+          <a:p>
+            <a:r>
+              <a:rPr lang="en-US" dirty="0"/>
+              <a:t>Conceptually, components are like JavaScript functions. They accept arbitrary inputs (called “props”) and return React elements describing what should appear on the screen.</a:t>
+            </a:r>
             <a:endParaRPr lang="en-US" dirty="0"/>
+          </a:p>
+        </p:txBody>
+      </p:sp>
+      <p:sp>
+        <p:nvSpPr>
+          <p:cNvPr id="6" name="Rectangle 2"/>
+          <p:cNvSpPr>
+            <a:spLocks noChangeArrowheads="1"/>
+          </p:cNvSpPr>
+          <p:nvPr/>
+        </p:nvSpPr>
+        <p:spPr bwMode="auto">
+          <a:xfrm>
+            <a:off x="2781837" y="3868755"/>
+            <a:ext cx="5473521" cy="1477328"/>
+          </a:xfrm>
+          <a:prstGeom prst="rect">
+            <a:avLst/>
+          </a:prstGeom>
+          <a:noFill/>
+          <a:ln>
+            <a:noFill/>
+          </a:ln>
+          <a:effectLst/>
+          <a:extLst>
+            <a:ext uri="{909E8E84-426E-40DD-AFC4-6F175D3DCCD1}">
+              <a14:hiddenFill xmlns:a14="http://schemas.microsoft.com/office/drawing/2010/main">
+                <a:solidFill>
+                  <a:schemeClr val="accent1"/>
+                </a:solidFill>
+              </a14:hiddenFill>
+            </a:ext>
+            <a:ext uri="{91240B29-F687-4F45-9708-019B960494DF}">
+              <a14:hiddenLine xmlns:a14="http://schemas.microsoft.com/office/drawing/2010/main" w="9525">
+                <a:solidFill>
+                  <a:schemeClr val="tx1"/>
+                </a:solidFill>
+                <a:miter lim="800000"/>
+                <a:headEnd/>
+                <a:tailEnd/>
+              </a14:hiddenLine>
+            </a:ext>
+            <a:ext uri="{AF507438-7753-43E0-B8FC-AC1667EBCBE1}">
+              <a14:hiddenEffects xmlns:a14="http://schemas.microsoft.com/office/drawing/2010/main">
+                <a:effectLst>
+                  <a:outerShdw dist="35921" dir="2700000" algn="ctr" rotWithShape="0">
+                    <a:schemeClr val="bg2"/>
+                  </a:outerShdw>
+                </a:effectLst>
+              </a14:hiddenEffects>
+            </a:ext>
+          </a:extLst>
+        </p:spPr>
+        <p:txBody>
+          <a:bodyPr vert="horz" wrap="square" lIns="0" tIns="0" rIns="0" bIns="0" numCol="1" anchor="ctr" anchorCtr="0" compatLnSpc="1">
+            <a:prstTxWarp prst="textNoShape">
+              <a:avLst/>
+            </a:prstTxWarp>
+            <a:spAutoFit/>
+          </a:bodyPr>
+          <a:lstStyle/>
+          <a:p>
+            <a:pPr marL="0" marR="0" lvl="0" indent="0" algn="l" defTabSz="914400" rtl="0" eaLnBrk="0" fontAlgn="base" latinLnBrk="0" hangingPunct="0">
+              <a:lnSpc>
+                <a:spcPct val="100000"/>
+              </a:lnSpc>
+              <a:spcBef>
+                <a:spcPct val="0"/>
+              </a:spcBef>
+              <a:spcAft>
+                <a:spcPct val="0"/>
+              </a:spcAft>
+              <a:buClrTx/>
+              <a:buSzTx/>
+              <a:buFontTx/>
+              <a:buNone/>
+              <a:tabLst/>
+            </a:pPr>
+            <a:r>
+              <a:rPr kumimoji="0" lang="en-US" altLang="en-US" sz="2400" b="0" i="0" u="none" strike="noStrike" cap="none" normalizeH="0" baseline="0" dirty="0" smtClean="0">
+                <a:ln>
+                  <a:noFill/>
+                </a:ln>
+                <a:solidFill>
+                  <a:srgbClr val="C5A5C5"/>
+                </a:solidFill>
+                <a:effectLst/>
+                <a:latin typeface="source-code-pro"/>
+              </a:rPr>
+              <a:t>function</a:t>
+            </a:r>
+            <a:r>
+              <a:rPr kumimoji="0" lang="en-US" altLang="en-US" sz="2400" b="0" i="0" u="none" strike="noStrike" cap="none" normalizeH="0" baseline="0" dirty="0" smtClean="0">
+                <a:ln>
+                  <a:noFill/>
+                </a:ln>
+                <a:solidFill>
+                  <a:srgbClr val="FFFFFF"/>
+                </a:solidFill>
+                <a:effectLst/>
+                <a:latin typeface="source-code-pro"/>
+              </a:rPr>
+              <a:t> </a:t>
+            </a:r>
+            <a:r>
+              <a:rPr kumimoji="0" lang="en-US" altLang="en-US" sz="2400" b="0" i="0" u="none" strike="noStrike" cap="none" normalizeH="0" baseline="0" dirty="0" smtClean="0">
+                <a:ln>
+                  <a:noFill/>
+                </a:ln>
+                <a:solidFill>
+                  <a:srgbClr val="79B6F2"/>
+                </a:solidFill>
+                <a:effectLst/>
+                <a:latin typeface="source-code-pro"/>
+              </a:rPr>
+              <a:t>Welcome</a:t>
+            </a:r>
+            <a:r>
+              <a:rPr kumimoji="0" lang="en-US" altLang="en-US" sz="2400" b="0" i="0" u="none" strike="noStrike" cap="none" normalizeH="0" baseline="0" dirty="0" smtClean="0">
+                <a:ln>
+                  <a:noFill/>
+                </a:ln>
+                <a:solidFill>
+                  <a:srgbClr val="5FB3B3"/>
+                </a:solidFill>
+                <a:effectLst/>
+                <a:latin typeface="source-code-pro"/>
+              </a:rPr>
+              <a:t>(</a:t>
+            </a:r>
+            <a:r>
+              <a:rPr kumimoji="0" lang="en-US" altLang="en-US" sz="2400" b="0" i="0" u="none" strike="noStrike" cap="none" normalizeH="0" baseline="0" dirty="0" smtClean="0">
+                <a:ln>
+                  <a:noFill/>
+                </a:ln>
+                <a:solidFill>
+                  <a:srgbClr val="FF0000"/>
+                </a:solidFill>
+                <a:effectLst/>
+                <a:latin typeface="source-code-pro"/>
+              </a:rPr>
+              <a:t>props</a:t>
+            </a:r>
+            <a:r>
+              <a:rPr kumimoji="0" lang="en-US" altLang="en-US" sz="2400" b="0" i="0" u="none" strike="noStrike" cap="none" normalizeH="0" baseline="0" dirty="0" smtClean="0">
+                <a:ln>
+                  <a:noFill/>
+                </a:ln>
+                <a:solidFill>
+                  <a:srgbClr val="5FB3B3"/>
+                </a:solidFill>
+                <a:effectLst/>
+                <a:latin typeface="source-code-pro"/>
+              </a:rPr>
+              <a:t>)</a:t>
+            </a:r>
+            <a:r>
+              <a:rPr kumimoji="0" lang="en-US" altLang="en-US" sz="2400" b="0" i="0" u="none" strike="noStrike" cap="none" normalizeH="0" baseline="0" dirty="0" smtClean="0">
+                <a:ln>
+                  <a:noFill/>
+                </a:ln>
+                <a:solidFill>
+                  <a:srgbClr val="FFFFFF"/>
+                </a:solidFill>
+                <a:effectLst/>
+                <a:latin typeface="source-code-pro"/>
+              </a:rPr>
+              <a:t> </a:t>
+            </a:r>
+          </a:p>
+          <a:p>
+            <a:pPr marL="0" marR="0" lvl="0" indent="0" algn="l" defTabSz="914400" rtl="0" eaLnBrk="0" fontAlgn="base" latinLnBrk="0" hangingPunct="0">
+              <a:lnSpc>
+                <a:spcPct val="100000"/>
+              </a:lnSpc>
+              <a:spcBef>
+                <a:spcPct val="0"/>
+              </a:spcBef>
+              <a:spcAft>
+                <a:spcPct val="0"/>
+              </a:spcAft>
+              <a:buClrTx/>
+              <a:buSzTx/>
+              <a:buFontTx/>
+              <a:buNone/>
+              <a:tabLst/>
+            </a:pPr>
+            <a:r>
+              <a:rPr kumimoji="0" lang="en-US" altLang="en-US" sz="2400" b="0" i="0" u="none" strike="noStrike" cap="none" normalizeH="0" baseline="0" dirty="0" smtClean="0">
+                <a:ln>
+                  <a:noFill/>
+                </a:ln>
+                <a:solidFill>
+                  <a:srgbClr val="5FB3B3"/>
+                </a:solidFill>
+                <a:effectLst/>
+                <a:latin typeface="source-code-pro"/>
+              </a:rPr>
+              <a:t>{</a:t>
+            </a:r>
+            <a:r>
+              <a:rPr kumimoji="0" lang="en-US" altLang="en-US" sz="2400" b="0" i="0" u="none" strike="noStrike" cap="none" normalizeH="0" baseline="0" dirty="0" smtClean="0">
+                <a:ln>
+                  <a:noFill/>
+                </a:ln>
+                <a:solidFill>
+                  <a:srgbClr val="FFFFFF"/>
+                </a:solidFill>
+                <a:effectLst/>
+                <a:latin typeface="source-code-pro"/>
+              </a:rPr>
+              <a:t> </a:t>
+            </a:r>
+          </a:p>
+          <a:p>
+            <a:pPr marL="0" marR="0" lvl="0" indent="0" algn="l" defTabSz="914400" rtl="0" eaLnBrk="0" fontAlgn="base" latinLnBrk="0" hangingPunct="0">
+              <a:lnSpc>
+                <a:spcPct val="100000"/>
+              </a:lnSpc>
+              <a:spcBef>
+                <a:spcPct val="0"/>
+              </a:spcBef>
+              <a:spcAft>
+                <a:spcPct val="0"/>
+              </a:spcAft>
+              <a:buClrTx/>
+              <a:buSzTx/>
+              <a:buFontTx/>
+              <a:buNone/>
+              <a:tabLst/>
+            </a:pPr>
+            <a:r>
+              <a:rPr lang="en-US" altLang="en-US" sz="2400" dirty="0" smtClean="0">
+                <a:solidFill>
+                  <a:srgbClr val="FFFFFF"/>
+                </a:solidFill>
+                <a:latin typeface="source-code-pro"/>
+              </a:rPr>
+              <a:t>	</a:t>
+            </a:r>
+            <a:r>
+              <a:rPr kumimoji="0" lang="en-US" altLang="en-US" sz="2400" b="0" i="0" u="none" strike="noStrike" cap="none" normalizeH="0" baseline="0" dirty="0" smtClean="0">
+                <a:ln>
+                  <a:noFill/>
+                </a:ln>
+                <a:solidFill>
+                  <a:srgbClr val="C5A5C5"/>
+                </a:solidFill>
+                <a:effectLst/>
+                <a:latin typeface="source-code-pro"/>
+              </a:rPr>
+              <a:t>return</a:t>
+            </a:r>
+            <a:r>
+              <a:rPr lang="en-US" altLang="en-US" sz="2400" dirty="0">
+                <a:solidFill>
+                  <a:srgbClr val="FFFFFF"/>
+                </a:solidFill>
+                <a:latin typeface="source-code-pro"/>
+              </a:rPr>
+              <a:t>&lt;</a:t>
+            </a:r>
+            <a:r>
+              <a:rPr kumimoji="0" lang="en-US" altLang="en-US" sz="2400" b="0" i="0" u="none" strike="noStrike" cap="none" normalizeH="0" baseline="0" dirty="0" smtClean="0">
+                <a:ln>
+                  <a:noFill/>
+                </a:ln>
+                <a:solidFill>
+                  <a:srgbClr val="FC929E"/>
+                </a:solidFill>
+                <a:effectLst/>
+                <a:latin typeface="source-code-pro"/>
+              </a:rPr>
+              <a:t>h1</a:t>
+            </a:r>
+            <a:r>
+              <a:rPr lang="en-US" altLang="en-US" sz="2400" dirty="0" smtClean="0">
+                <a:solidFill>
+                  <a:srgbClr val="5FB3B3"/>
+                </a:solidFill>
+                <a:latin typeface="source-code-pro"/>
+              </a:rPr>
+              <a:t>&gt;,</a:t>
+            </a:r>
+            <a:r>
+              <a:rPr kumimoji="0" lang="en-US" altLang="en-US" sz="2400" b="0" i="0" u="none" strike="noStrike" cap="none" normalizeH="0" baseline="0" dirty="0" smtClean="0">
+                <a:ln>
+                  <a:noFill/>
+                </a:ln>
+                <a:solidFill>
+                  <a:srgbClr val="5FB3B3"/>
+                </a:solidFill>
+                <a:effectLst/>
+                <a:latin typeface="source-code-pro"/>
+              </a:rPr>
+              <a:t>{</a:t>
+            </a:r>
+            <a:r>
+              <a:rPr kumimoji="0" lang="en-US" altLang="en-US" sz="2400" b="0" i="0" u="none" strike="noStrike" cap="none" normalizeH="0" baseline="0" dirty="0" smtClean="0">
+                <a:ln>
+                  <a:noFill/>
+                </a:ln>
+                <a:solidFill>
+                  <a:srgbClr val="FF0000"/>
+                </a:solidFill>
+                <a:effectLst/>
+                <a:latin typeface="source-code-pro"/>
+              </a:rPr>
+              <a:t>props</a:t>
+            </a:r>
+            <a:r>
+              <a:rPr kumimoji="0" lang="en-US" altLang="en-US" sz="2400" b="0" i="0" u="none" strike="noStrike" cap="none" normalizeH="0" baseline="0" dirty="0" smtClean="0">
+                <a:ln>
+                  <a:noFill/>
+                </a:ln>
+                <a:solidFill>
+                  <a:srgbClr val="5FB3B3"/>
+                </a:solidFill>
+                <a:effectLst/>
+                <a:latin typeface="source-code-pro"/>
+              </a:rPr>
+              <a:t>.name}&lt;/</a:t>
+            </a:r>
+            <a:r>
+              <a:rPr kumimoji="0" lang="en-US" altLang="en-US" sz="2400" b="0" i="0" u="none" strike="noStrike" cap="none" normalizeH="0" baseline="0" dirty="0" smtClean="0">
+                <a:ln>
+                  <a:noFill/>
+                </a:ln>
+                <a:solidFill>
+                  <a:srgbClr val="FC929E"/>
+                </a:solidFill>
+                <a:effectLst/>
+                <a:latin typeface="source-code-pro"/>
+              </a:rPr>
+              <a:t>h1</a:t>
+            </a:r>
+            <a:r>
+              <a:rPr kumimoji="0" lang="en-US" altLang="en-US" sz="2400" b="0" i="0" u="none" strike="noStrike" cap="none" normalizeH="0" baseline="0" dirty="0" smtClean="0">
+                <a:ln>
+                  <a:noFill/>
+                </a:ln>
+                <a:solidFill>
+                  <a:srgbClr val="5FB3B3"/>
+                </a:solidFill>
+                <a:effectLst/>
+                <a:latin typeface="source-code-pro"/>
+              </a:rPr>
+              <a:t>&gt;;</a:t>
+            </a:r>
+          </a:p>
+          <a:p>
+            <a:pPr marL="0" marR="0" lvl="0" indent="0" algn="l" defTabSz="914400" rtl="0" eaLnBrk="0" fontAlgn="base" latinLnBrk="0" hangingPunct="0">
+              <a:lnSpc>
+                <a:spcPct val="100000"/>
+              </a:lnSpc>
+              <a:spcBef>
+                <a:spcPct val="0"/>
+              </a:spcBef>
+              <a:spcAft>
+                <a:spcPct val="0"/>
+              </a:spcAft>
+              <a:buClrTx/>
+              <a:buSzTx/>
+              <a:buFontTx/>
+              <a:buNone/>
+              <a:tabLst/>
+            </a:pPr>
+            <a:r>
+              <a:rPr kumimoji="0" lang="en-US" altLang="en-US" sz="2400" b="0" i="0" u="none" strike="noStrike" cap="none" normalizeH="0" baseline="0" dirty="0" smtClean="0">
+                <a:ln>
+                  <a:noFill/>
+                </a:ln>
+                <a:solidFill>
+                  <a:srgbClr val="5FB3B3"/>
+                </a:solidFill>
+                <a:effectLst/>
+                <a:latin typeface="source-code-pro"/>
+              </a:rPr>
+              <a:t>}</a:t>
+            </a:r>
+            <a:r>
+              <a:rPr kumimoji="0" lang="en-US" altLang="en-US" sz="2400" b="0" i="0" u="none" strike="noStrike" cap="none" normalizeH="0" baseline="0" dirty="0" smtClean="0">
+                <a:ln>
+                  <a:noFill/>
+                </a:ln>
+                <a:solidFill>
+                  <a:schemeClr val="tx1"/>
+                </a:solidFill>
+                <a:effectLst/>
+              </a:rPr>
+              <a:t> </a:t>
+            </a:r>
+            <a:endParaRPr kumimoji="0" lang="en-US" altLang="en-US" sz="2400" b="0" i="0" u="none" strike="noStrike" cap="none" normalizeH="0" baseline="0" dirty="0" smtClean="0">
+              <a:ln>
+                <a:noFill/>
+              </a:ln>
+              <a:solidFill>
+                <a:schemeClr val="tx1"/>
+              </a:solidFill>
+              <a:effectLst/>
+              <a:latin typeface="Arial" panose="020B0604020202020204" pitchFamily="34" charset="0"/>
+            </a:endParaRPr>
           </a:p>
         </p:txBody>
       </p:sp>
@@ -8441,6 +12131,783 @@
     <p:extLst>
       <p:ext uri="{BB962C8B-B14F-4D97-AF65-F5344CB8AC3E}">
         <p14:creationId xmlns:p14="http://schemas.microsoft.com/office/powerpoint/2010/main" val="3971197134"/>
+      </p:ext>
+    </p:extLst>
+  </p:cSld>
+  <p:clrMapOvr>
+    <a:masterClrMapping/>
+  </p:clrMapOvr>
+</p:sld>
+</file>
+
+<file path=ppt/slides/slide9.xml><?xml version="1.0" encoding="utf-8"?>
+<p:sld xmlns:a="http://schemas.openxmlformats.org/drawingml/2006/main" xmlns:r="http://schemas.openxmlformats.org/officeDocument/2006/relationships" xmlns:p="http://schemas.openxmlformats.org/presentationml/2006/main">
+  <p:cSld>
+    <p:spTree>
+      <p:nvGrpSpPr>
+        <p:cNvPr id="1" name=""/>
+        <p:cNvGrpSpPr/>
+        <p:nvPr/>
+      </p:nvGrpSpPr>
+      <p:grpSpPr>
+        <a:xfrm>
+          <a:off x="0" y="0"/>
+          <a:ext cx="0" cy="0"/>
+          <a:chOff x="0" y="0"/>
+          <a:chExt cx="0" cy="0"/>
+        </a:xfrm>
+      </p:grpSpPr>
+      <p:sp>
+        <p:nvSpPr>
+          <p:cNvPr id="4" name="Rectangle 1"/>
+          <p:cNvSpPr>
+            <a:spLocks noChangeArrowheads="1"/>
+          </p:cNvSpPr>
+          <p:nvPr/>
+        </p:nvSpPr>
+        <p:spPr bwMode="auto">
+          <a:xfrm>
+            <a:off x="1596980" y="1793690"/>
+            <a:ext cx="9762186" cy="3447098"/>
+          </a:xfrm>
+          <a:prstGeom prst="rect">
+            <a:avLst/>
+          </a:prstGeom>
+          <a:noFill/>
+          <a:ln>
+            <a:noFill/>
+          </a:ln>
+          <a:effectLst/>
+          <a:extLst>
+            <a:ext uri="{909E8E84-426E-40DD-AFC4-6F175D3DCCD1}">
+              <a14:hiddenFill xmlns:a14="http://schemas.microsoft.com/office/drawing/2010/main">
+                <a:solidFill>
+                  <a:schemeClr val="accent1"/>
+                </a:solidFill>
+              </a14:hiddenFill>
+            </a:ext>
+            <a:ext uri="{91240B29-F687-4F45-9708-019B960494DF}">
+              <a14:hiddenLine xmlns:a14="http://schemas.microsoft.com/office/drawing/2010/main" w="9525">
+                <a:solidFill>
+                  <a:schemeClr val="tx1"/>
+                </a:solidFill>
+                <a:miter lim="800000"/>
+                <a:headEnd/>
+                <a:tailEnd/>
+              </a14:hiddenLine>
+            </a:ext>
+            <a:ext uri="{AF507438-7753-43E0-B8FC-AC1667EBCBE1}">
+              <a14:hiddenEffects xmlns:a14="http://schemas.microsoft.com/office/drawing/2010/main">
+                <a:effectLst>
+                  <a:outerShdw dist="35921" dir="2700000" algn="ctr" rotWithShape="0">
+                    <a:schemeClr val="bg2"/>
+                  </a:outerShdw>
+                </a:effectLst>
+              </a14:hiddenEffects>
+            </a:ext>
+          </a:extLst>
+        </p:spPr>
+        <p:txBody>
+          <a:bodyPr vert="horz" wrap="square" lIns="0" tIns="0" rIns="0" bIns="0" numCol="1" anchor="ctr" anchorCtr="0" compatLnSpc="1">
+            <a:prstTxWarp prst="textNoShape">
+              <a:avLst/>
+            </a:prstTxWarp>
+            <a:spAutoFit/>
+          </a:bodyPr>
+          <a:lstStyle/>
+          <a:p>
+            <a:pPr marL="0" marR="0" lvl="0" indent="0" algn="l" defTabSz="914400" rtl="0" eaLnBrk="0" fontAlgn="base" latinLnBrk="0" hangingPunct="0">
+              <a:lnSpc>
+                <a:spcPct val="100000"/>
+              </a:lnSpc>
+              <a:spcBef>
+                <a:spcPct val="0"/>
+              </a:spcBef>
+              <a:spcAft>
+                <a:spcPct val="0"/>
+              </a:spcAft>
+              <a:buClrTx/>
+              <a:buSzTx/>
+              <a:buFontTx/>
+              <a:buNone/>
+              <a:tabLst/>
+            </a:pPr>
+            <a:r>
+              <a:rPr kumimoji="0" lang="en-US" altLang="en-US" sz="3200" b="0" i="0" u="none" strike="noStrike" cap="none" normalizeH="0" baseline="0" dirty="0" smtClean="0">
+                <a:ln>
+                  <a:noFill/>
+                </a:ln>
+                <a:solidFill>
+                  <a:srgbClr val="C5A5C5"/>
+                </a:solidFill>
+                <a:effectLst/>
+                <a:latin typeface="source-code-pro"/>
+              </a:rPr>
+              <a:t>class</a:t>
+            </a:r>
+            <a:r>
+              <a:rPr kumimoji="0" lang="en-US" altLang="en-US" sz="3200" b="0" i="0" u="none" strike="noStrike" cap="none" normalizeH="0" baseline="0" dirty="0" smtClean="0">
+                <a:ln>
+                  <a:noFill/>
+                </a:ln>
+                <a:solidFill>
+                  <a:srgbClr val="FFFFFF"/>
+                </a:solidFill>
+                <a:effectLst/>
+                <a:latin typeface="source-code-pro"/>
+              </a:rPr>
+              <a:t> </a:t>
+            </a:r>
+            <a:r>
+              <a:rPr kumimoji="0" lang="en-US" altLang="en-US" sz="3200" b="0" i="0" u="none" strike="noStrike" cap="none" normalizeH="0" baseline="0" dirty="0" smtClean="0">
+                <a:ln>
+                  <a:noFill/>
+                </a:ln>
+                <a:solidFill>
+                  <a:srgbClr val="FAC863"/>
+                </a:solidFill>
+                <a:effectLst/>
+                <a:latin typeface="source-code-pro"/>
+              </a:rPr>
+              <a:t>Welcome</a:t>
+            </a:r>
+            <a:r>
+              <a:rPr kumimoji="0" lang="en-US" altLang="en-US" sz="3200" b="0" i="0" u="none" strike="noStrike" cap="none" normalizeH="0" baseline="0" dirty="0" smtClean="0">
+                <a:ln>
+                  <a:noFill/>
+                </a:ln>
+                <a:solidFill>
+                  <a:srgbClr val="FFFFFF"/>
+                </a:solidFill>
+                <a:effectLst/>
+                <a:latin typeface="source-code-pro"/>
+              </a:rPr>
+              <a:t> </a:t>
+            </a:r>
+            <a:r>
+              <a:rPr kumimoji="0" lang="en-US" altLang="en-US" sz="3200" b="0" i="0" u="none" strike="noStrike" cap="none" normalizeH="0" baseline="0" dirty="0" smtClean="0">
+                <a:ln>
+                  <a:noFill/>
+                </a:ln>
+                <a:solidFill>
+                  <a:srgbClr val="C5A5C5"/>
+                </a:solidFill>
+                <a:effectLst/>
+                <a:latin typeface="source-code-pro"/>
+              </a:rPr>
+              <a:t>extends</a:t>
+            </a:r>
+            <a:r>
+              <a:rPr kumimoji="0" lang="en-US" altLang="en-US" sz="3200" b="0" i="0" u="none" strike="noStrike" cap="none" normalizeH="0" baseline="0" dirty="0" smtClean="0">
+                <a:ln>
+                  <a:noFill/>
+                </a:ln>
+                <a:solidFill>
+                  <a:srgbClr val="FFFFFF"/>
+                </a:solidFill>
+                <a:effectLst/>
+                <a:latin typeface="source-code-pro"/>
+              </a:rPr>
+              <a:t> </a:t>
+            </a:r>
+            <a:r>
+              <a:rPr kumimoji="0" lang="en-US" altLang="en-US" sz="3200" b="0" i="0" u="none" strike="noStrike" cap="none" normalizeH="0" baseline="0" dirty="0" err="1" smtClean="0">
+                <a:ln>
+                  <a:noFill/>
+                </a:ln>
+                <a:solidFill>
+                  <a:srgbClr val="FAC863"/>
+                </a:solidFill>
+                <a:effectLst/>
+                <a:latin typeface="source-code-pro"/>
+              </a:rPr>
+              <a:t>React</a:t>
+            </a:r>
+            <a:r>
+              <a:rPr kumimoji="0" lang="en-US" altLang="en-US" sz="3200" b="0" i="0" u="none" strike="noStrike" cap="none" normalizeH="0" baseline="0" dirty="0" err="1" smtClean="0">
+                <a:ln>
+                  <a:noFill/>
+                </a:ln>
+                <a:solidFill>
+                  <a:srgbClr val="5FB3B3"/>
+                </a:solidFill>
+                <a:effectLst/>
+                <a:latin typeface="source-code-pro"/>
+              </a:rPr>
+              <a:t>.</a:t>
+            </a:r>
+            <a:r>
+              <a:rPr kumimoji="0" lang="en-US" altLang="en-US" sz="3200" b="0" i="0" u="none" strike="noStrike" cap="none" normalizeH="0" baseline="0" dirty="0" err="1" smtClean="0">
+                <a:ln>
+                  <a:noFill/>
+                </a:ln>
+                <a:solidFill>
+                  <a:srgbClr val="FAC863"/>
+                </a:solidFill>
+                <a:effectLst/>
+                <a:latin typeface="source-code-pro"/>
+              </a:rPr>
+              <a:t>Component</a:t>
+            </a:r>
+            <a:r>
+              <a:rPr kumimoji="0" lang="en-US" altLang="en-US" sz="3200" b="0" i="0" u="none" strike="noStrike" cap="none" normalizeH="0" baseline="0" dirty="0" smtClean="0">
+                <a:ln>
+                  <a:noFill/>
+                </a:ln>
+                <a:solidFill>
+                  <a:srgbClr val="FFFFFF"/>
+                </a:solidFill>
+                <a:effectLst/>
+                <a:latin typeface="source-code-pro"/>
+              </a:rPr>
+              <a:t> </a:t>
+            </a:r>
+          </a:p>
+          <a:p>
+            <a:pPr marL="0" marR="0" lvl="0" indent="0" algn="l" defTabSz="914400" rtl="0" eaLnBrk="0" fontAlgn="base" latinLnBrk="0" hangingPunct="0">
+              <a:lnSpc>
+                <a:spcPct val="100000"/>
+              </a:lnSpc>
+              <a:spcBef>
+                <a:spcPct val="0"/>
+              </a:spcBef>
+              <a:spcAft>
+                <a:spcPct val="0"/>
+              </a:spcAft>
+              <a:buClrTx/>
+              <a:buSzTx/>
+              <a:buFontTx/>
+              <a:buNone/>
+              <a:tabLst/>
+            </a:pPr>
+            <a:r>
+              <a:rPr kumimoji="0" lang="en-US" altLang="en-US" sz="3200" b="0" i="0" u="none" strike="noStrike" cap="none" normalizeH="0" baseline="0" dirty="0" smtClean="0">
+                <a:ln>
+                  <a:noFill/>
+                </a:ln>
+                <a:solidFill>
+                  <a:srgbClr val="5FB3B3"/>
+                </a:solidFill>
+                <a:effectLst/>
+                <a:latin typeface="source-code-pro"/>
+              </a:rPr>
+              <a:t>{</a:t>
+            </a:r>
+            <a:r>
+              <a:rPr kumimoji="0" lang="en-US" altLang="en-US" sz="3200" b="0" i="0" u="none" strike="noStrike" cap="none" normalizeH="0" baseline="0" dirty="0" smtClean="0">
+                <a:ln>
+                  <a:noFill/>
+                </a:ln>
+                <a:solidFill>
+                  <a:srgbClr val="FFFFFF"/>
+                </a:solidFill>
+                <a:effectLst/>
+                <a:latin typeface="source-code-pro"/>
+              </a:rPr>
+              <a:t> </a:t>
+            </a:r>
+          </a:p>
+          <a:p>
+            <a:pPr marL="0" marR="0" lvl="0" indent="0" algn="l" defTabSz="914400" rtl="0" eaLnBrk="0" fontAlgn="base" latinLnBrk="0" hangingPunct="0">
+              <a:lnSpc>
+                <a:spcPct val="100000"/>
+              </a:lnSpc>
+              <a:spcBef>
+                <a:spcPct val="0"/>
+              </a:spcBef>
+              <a:spcAft>
+                <a:spcPct val="0"/>
+              </a:spcAft>
+              <a:buClrTx/>
+              <a:buSzTx/>
+              <a:buFontTx/>
+              <a:buNone/>
+              <a:tabLst/>
+            </a:pPr>
+            <a:r>
+              <a:rPr lang="en-US" altLang="en-US" sz="3200" dirty="0">
+                <a:solidFill>
+                  <a:srgbClr val="FFFFFF"/>
+                </a:solidFill>
+                <a:latin typeface="source-code-pro"/>
+              </a:rPr>
+              <a:t>	</a:t>
+            </a:r>
+            <a:r>
+              <a:rPr kumimoji="0" lang="en-US" altLang="en-US" sz="3200" b="0" i="0" u="none" strike="noStrike" cap="none" normalizeH="0" baseline="0" dirty="0" smtClean="0">
+                <a:ln>
+                  <a:noFill/>
+                </a:ln>
+                <a:solidFill>
+                  <a:srgbClr val="79B6F2"/>
+                </a:solidFill>
+                <a:effectLst/>
+                <a:latin typeface="source-code-pro"/>
+              </a:rPr>
+              <a:t>render</a:t>
+            </a:r>
+            <a:r>
+              <a:rPr kumimoji="0" lang="en-US" altLang="en-US" sz="3200" b="0" i="0" u="none" strike="noStrike" cap="none" normalizeH="0" baseline="0" dirty="0" smtClean="0">
+                <a:ln>
+                  <a:noFill/>
+                </a:ln>
+                <a:solidFill>
+                  <a:srgbClr val="5FB3B3"/>
+                </a:solidFill>
+                <a:effectLst/>
+                <a:latin typeface="source-code-pro"/>
+              </a:rPr>
+              <a:t>()</a:t>
+            </a:r>
+            <a:r>
+              <a:rPr kumimoji="0" lang="en-US" altLang="en-US" sz="3200" b="0" i="0" u="none" strike="noStrike" cap="none" normalizeH="0" baseline="0" dirty="0" smtClean="0">
+                <a:ln>
+                  <a:noFill/>
+                </a:ln>
+                <a:solidFill>
+                  <a:srgbClr val="FFFFFF"/>
+                </a:solidFill>
+                <a:effectLst/>
+                <a:latin typeface="source-code-pro"/>
+              </a:rPr>
+              <a:t> </a:t>
+            </a:r>
+          </a:p>
+          <a:p>
+            <a:pPr marL="0" marR="0" lvl="0" indent="0" algn="l" defTabSz="914400" rtl="0" eaLnBrk="0" fontAlgn="base" latinLnBrk="0" hangingPunct="0">
+              <a:lnSpc>
+                <a:spcPct val="100000"/>
+              </a:lnSpc>
+              <a:spcBef>
+                <a:spcPct val="0"/>
+              </a:spcBef>
+              <a:spcAft>
+                <a:spcPct val="0"/>
+              </a:spcAft>
+              <a:buClrTx/>
+              <a:buSzTx/>
+              <a:buFontTx/>
+              <a:buNone/>
+              <a:tabLst/>
+            </a:pPr>
+            <a:r>
+              <a:rPr lang="en-US" altLang="en-US" sz="3200" dirty="0">
+                <a:solidFill>
+                  <a:srgbClr val="FFFFFF"/>
+                </a:solidFill>
+                <a:latin typeface="source-code-pro"/>
+              </a:rPr>
+              <a:t>	</a:t>
+            </a:r>
+            <a:r>
+              <a:rPr kumimoji="0" lang="en-US" altLang="en-US" sz="3200" b="0" i="0" u="none" strike="noStrike" cap="none" normalizeH="0" baseline="0" dirty="0" smtClean="0">
+                <a:ln>
+                  <a:noFill/>
+                </a:ln>
+                <a:solidFill>
+                  <a:srgbClr val="5FB3B3"/>
+                </a:solidFill>
+                <a:effectLst/>
+                <a:latin typeface="source-code-pro"/>
+              </a:rPr>
+              <a:t>{</a:t>
+            </a:r>
+            <a:r>
+              <a:rPr kumimoji="0" lang="en-US" altLang="en-US" sz="3200" b="0" i="0" u="none" strike="noStrike" cap="none" normalizeH="0" baseline="0" dirty="0" smtClean="0">
+                <a:ln>
+                  <a:noFill/>
+                </a:ln>
+                <a:solidFill>
+                  <a:srgbClr val="FFFFFF"/>
+                </a:solidFill>
+                <a:effectLst/>
+                <a:latin typeface="source-code-pro"/>
+              </a:rPr>
+              <a:t> </a:t>
+            </a:r>
+          </a:p>
+          <a:p>
+            <a:pPr marL="0" marR="0" lvl="0" indent="0" algn="l" defTabSz="914400" rtl="0" eaLnBrk="0" fontAlgn="base" latinLnBrk="0" hangingPunct="0">
+              <a:lnSpc>
+                <a:spcPct val="100000"/>
+              </a:lnSpc>
+              <a:spcBef>
+                <a:spcPct val="0"/>
+              </a:spcBef>
+              <a:spcAft>
+                <a:spcPct val="0"/>
+              </a:spcAft>
+              <a:buClrTx/>
+              <a:buSzTx/>
+              <a:buFontTx/>
+              <a:buNone/>
+              <a:tabLst/>
+            </a:pPr>
+            <a:r>
+              <a:rPr lang="en-US" altLang="en-US" sz="3200" dirty="0">
+                <a:solidFill>
+                  <a:srgbClr val="FFFFFF"/>
+                </a:solidFill>
+                <a:latin typeface="source-code-pro"/>
+              </a:rPr>
+              <a:t>	</a:t>
+            </a:r>
+            <a:r>
+              <a:rPr lang="en-US" altLang="en-US" sz="3200" dirty="0" smtClean="0">
+                <a:solidFill>
+                  <a:srgbClr val="FFFFFF"/>
+                </a:solidFill>
+                <a:latin typeface="source-code-pro"/>
+              </a:rPr>
+              <a:t>	</a:t>
+            </a:r>
+            <a:r>
+              <a:rPr kumimoji="0" lang="en-US" altLang="en-US" sz="3200" b="0" i="0" u="none" strike="noStrike" cap="none" normalizeH="0" baseline="0" dirty="0" smtClean="0">
+                <a:ln>
+                  <a:noFill/>
+                </a:ln>
+                <a:solidFill>
+                  <a:srgbClr val="C5A5C5"/>
+                </a:solidFill>
+                <a:effectLst/>
+                <a:latin typeface="source-code-pro"/>
+              </a:rPr>
+              <a:t>return</a:t>
+            </a:r>
+            <a:r>
+              <a:rPr kumimoji="0" lang="en-US" altLang="en-US" sz="3200" b="0" i="0" u="none" strike="noStrike" cap="none" normalizeH="0" baseline="0" dirty="0" smtClean="0">
+                <a:ln>
+                  <a:noFill/>
+                </a:ln>
+                <a:solidFill>
+                  <a:srgbClr val="FFFFFF"/>
+                </a:solidFill>
+                <a:effectLst/>
+                <a:latin typeface="source-code-pro"/>
+              </a:rPr>
+              <a:t> </a:t>
+            </a:r>
+            <a:r>
+              <a:rPr kumimoji="0" lang="en-US" altLang="en-US" sz="3200" b="0" i="0" u="none" strike="noStrike" cap="none" normalizeH="0" baseline="0" dirty="0" smtClean="0">
+                <a:ln>
+                  <a:noFill/>
+                </a:ln>
+                <a:solidFill>
+                  <a:srgbClr val="5FB3B3"/>
+                </a:solidFill>
+                <a:effectLst/>
+                <a:latin typeface="source-code-pro"/>
+              </a:rPr>
+              <a:t>&lt;</a:t>
+            </a:r>
+            <a:r>
+              <a:rPr kumimoji="0" lang="en-US" altLang="en-US" sz="3200" b="0" i="0" u="none" strike="noStrike" cap="none" normalizeH="0" baseline="0" dirty="0" smtClean="0">
+                <a:ln>
+                  <a:noFill/>
+                </a:ln>
+                <a:solidFill>
+                  <a:srgbClr val="FC929E"/>
+                </a:solidFill>
+                <a:effectLst/>
+                <a:latin typeface="source-code-pro"/>
+              </a:rPr>
+              <a:t>h1</a:t>
+            </a:r>
+            <a:r>
+              <a:rPr kumimoji="0" lang="en-US" altLang="en-US" sz="3200" b="0" i="0" u="none" strike="noStrike" cap="none" normalizeH="0" baseline="0" dirty="0" smtClean="0">
+                <a:ln>
+                  <a:noFill/>
+                </a:ln>
+                <a:solidFill>
+                  <a:srgbClr val="5FB3B3"/>
+                </a:solidFill>
+                <a:effectLst/>
+                <a:latin typeface="source-code-pro"/>
+              </a:rPr>
+              <a:t>&gt;</a:t>
+            </a:r>
+            <a:r>
+              <a:rPr kumimoji="0" lang="en-US" altLang="en-US" sz="3200" b="0" i="0" u="none" strike="noStrike" cap="none" normalizeH="0" baseline="0" dirty="0" smtClean="0">
+                <a:ln>
+                  <a:noFill/>
+                </a:ln>
+                <a:solidFill>
+                  <a:srgbClr val="FF0000"/>
+                </a:solidFill>
+                <a:effectLst/>
+                <a:latin typeface="source-code-pro"/>
+              </a:rPr>
+              <a:t>Hello</a:t>
+            </a:r>
+            <a:r>
+              <a:rPr kumimoji="0" lang="en-US" altLang="en-US" sz="3200" b="0" i="0" u="none" strike="noStrike" cap="none" normalizeH="0" baseline="0" dirty="0" smtClean="0">
+                <a:ln>
+                  <a:noFill/>
+                </a:ln>
+                <a:solidFill>
+                  <a:srgbClr val="5FB3B3"/>
+                </a:solidFill>
+                <a:effectLst/>
+                <a:latin typeface="source-code-pro"/>
+              </a:rPr>
+              <a:t>,</a:t>
+            </a:r>
+            <a:r>
+              <a:rPr kumimoji="0" lang="en-US" altLang="en-US" sz="3200" b="0" i="0" u="none" strike="noStrike" cap="none" normalizeH="0" baseline="0" dirty="0" smtClean="0">
+                <a:ln>
+                  <a:noFill/>
+                </a:ln>
+                <a:solidFill>
+                  <a:srgbClr val="FFFFFF"/>
+                </a:solidFill>
+                <a:effectLst/>
+                <a:latin typeface="source-code-pro"/>
+              </a:rPr>
+              <a:t> </a:t>
+            </a:r>
+            <a:r>
+              <a:rPr kumimoji="0" lang="en-US" altLang="en-US" sz="3200" b="0" i="0" u="none" strike="noStrike" cap="none" normalizeH="0" baseline="0" dirty="0" smtClean="0">
+                <a:ln>
+                  <a:noFill/>
+                </a:ln>
+                <a:solidFill>
+                  <a:srgbClr val="5FB3B3"/>
+                </a:solidFill>
+                <a:effectLst/>
+                <a:latin typeface="source-code-pro"/>
+              </a:rPr>
+              <a:t>{</a:t>
+            </a:r>
+            <a:r>
+              <a:rPr kumimoji="0" lang="en-US" altLang="en-US" sz="3200" b="0" i="0" u="none" strike="noStrike" cap="none" normalizeH="0" baseline="0" dirty="0" smtClean="0">
+                <a:ln>
+                  <a:noFill/>
+                </a:ln>
+                <a:solidFill>
+                  <a:srgbClr val="C5A5C5"/>
+                </a:solidFill>
+                <a:effectLst/>
+                <a:latin typeface="source-code-pro"/>
+              </a:rPr>
+              <a:t>this</a:t>
+            </a:r>
+            <a:r>
+              <a:rPr kumimoji="0" lang="en-US" altLang="en-US" sz="3200" b="0" i="0" u="none" strike="noStrike" cap="none" normalizeH="0" baseline="0" dirty="0" smtClean="0">
+                <a:ln>
+                  <a:noFill/>
+                </a:ln>
+                <a:solidFill>
+                  <a:srgbClr val="5FB3B3"/>
+                </a:solidFill>
+                <a:effectLst/>
+                <a:latin typeface="source-code-pro"/>
+              </a:rPr>
+              <a:t>.</a:t>
+            </a:r>
+            <a:r>
+              <a:rPr kumimoji="0" lang="en-US" altLang="en-US" sz="3200" b="0" i="0" u="none" strike="noStrike" cap="none" normalizeH="0" baseline="0" dirty="0" smtClean="0">
+                <a:ln>
+                  <a:noFill/>
+                </a:ln>
+                <a:solidFill>
+                  <a:srgbClr val="FF0000"/>
+                </a:solidFill>
+                <a:effectLst/>
+                <a:latin typeface="source-code-pro"/>
+              </a:rPr>
+              <a:t>props</a:t>
+            </a:r>
+            <a:r>
+              <a:rPr kumimoji="0" lang="en-US" altLang="en-US" sz="3200" b="0" i="0" u="none" strike="noStrike" cap="none" normalizeH="0" baseline="0" dirty="0" smtClean="0">
+                <a:ln>
+                  <a:noFill/>
+                </a:ln>
+                <a:solidFill>
+                  <a:srgbClr val="5FB3B3"/>
+                </a:solidFill>
+                <a:effectLst/>
+                <a:latin typeface="source-code-pro"/>
+              </a:rPr>
+              <a:t>.</a:t>
+            </a:r>
+            <a:r>
+              <a:rPr kumimoji="0" lang="en-US" altLang="en-US" sz="3200" b="0" i="0" u="none" strike="noStrike" cap="none" normalizeH="0" baseline="0" dirty="0" smtClean="0">
+                <a:ln>
+                  <a:noFill/>
+                </a:ln>
+                <a:solidFill>
+                  <a:srgbClr val="FF0000"/>
+                </a:solidFill>
+                <a:effectLst/>
+                <a:latin typeface="source-code-pro"/>
+              </a:rPr>
+              <a:t>name</a:t>
+            </a:r>
+            <a:r>
+              <a:rPr kumimoji="0" lang="en-US" altLang="en-US" sz="3200" b="0" i="0" u="none" strike="noStrike" cap="none" normalizeH="0" baseline="0" dirty="0" smtClean="0">
+                <a:ln>
+                  <a:noFill/>
+                </a:ln>
+                <a:solidFill>
+                  <a:srgbClr val="5FB3B3"/>
+                </a:solidFill>
+                <a:effectLst/>
+                <a:latin typeface="source-code-pro"/>
+              </a:rPr>
+              <a:t>}&lt;/</a:t>
+            </a:r>
+            <a:r>
+              <a:rPr kumimoji="0" lang="en-US" altLang="en-US" sz="3200" b="0" i="0" u="none" strike="noStrike" cap="none" normalizeH="0" baseline="0" dirty="0" smtClean="0">
+                <a:ln>
+                  <a:noFill/>
+                </a:ln>
+                <a:solidFill>
+                  <a:srgbClr val="FC929E"/>
+                </a:solidFill>
+                <a:effectLst/>
+                <a:latin typeface="source-code-pro"/>
+              </a:rPr>
+              <a:t>h1</a:t>
+            </a:r>
+            <a:r>
+              <a:rPr kumimoji="0" lang="en-US" altLang="en-US" sz="3200" b="0" i="0" u="none" strike="noStrike" cap="none" normalizeH="0" baseline="0" dirty="0" smtClean="0">
+                <a:ln>
+                  <a:noFill/>
+                </a:ln>
+                <a:solidFill>
+                  <a:srgbClr val="5FB3B3"/>
+                </a:solidFill>
+                <a:effectLst/>
+                <a:latin typeface="source-code-pro"/>
+              </a:rPr>
+              <a:t>&gt;;</a:t>
+            </a:r>
+            <a:r>
+              <a:rPr kumimoji="0" lang="en-US" altLang="en-US" sz="3200" b="0" i="0" u="none" strike="noStrike" cap="none" normalizeH="0" baseline="0" dirty="0" smtClean="0">
+                <a:ln>
+                  <a:noFill/>
+                </a:ln>
+                <a:solidFill>
+                  <a:srgbClr val="FFFFFF"/>
+                </a:solidFill>
+                <a:effectLst/>
+                <a:latin typeface="source-code-pro"/>
+              </a:rPr>
+              <a:t> </a:t>
+            </a:r>
+          </a:p>
+          <a:p>
+            <a:pPr marL="0" marR="0" lvl="0" indent="0" algn="l" defTabSz="914400" rtl="0" eaLnBrk="0" fontAlgn="base" latinLnBrk="0" hangingPunct="0">
+              <a:lnSpc>
+                <a:spcPct val="100000"/>
+              </a:lnSpc>
+              <a:spcBef>
+                <a:spcPct val="0"/>
+              </a:spcBef>
+              <a:spcAft>
+                <a:spcPct val="0"/>
+              </a:spcAft>
+              <a:buClrTx/>
+              <a:buSzTx/>
+              <a:buFontTx/>
+              <a:buNone/>
+              <a:tabLst/>
+            </a:pPr>
+            <a:r>
+              <a:rPr lang="en-US" altLang="en-US" sz="3200" dirty="0">
+                <a:solidFill>
+                  <a:srgbClr val="FFFFFF"/>
+                </a:solidFill>
+                <a:latin typeface="source-code-pro"/>
+              </a:rPr>
+              <a:t>	</a:t>
+            </a:r>
+            <a:r>
+              <a:rPr kumimoji="0" lang="en-US" altLang="en-US" sz="3200" b="0" i="0" u="none" strike="noStrike" cap="none" normalizeH="0" baseline="0" dirty="0" smtClean="0">
+                <a:ln>
+                  <a:noFill/>
+                </a:ln>
+                <a:solidFill>
+                  <a:srgbClr val="5FB3B3"/>
+                </a:solidFill>
+                <a:effectLst/>
+                <a:latin typeface="source-code-pro"/>
+              </a:rPr>
+              <a:t>}</a:t>
+            </a:r>
+            <a:r>
+              <a:rPr kumimoji="0" lang="en-US" altLang="en-US" sz="3200" b="0" i="0" u="none" strike="noStrike" cap="none" normalizeH="0" baseline="0" dirty="0" smtClean="0">
+                <a:ln>
+                  <a:noFill/>
+                </a:ln>
+                <a:solidFill>
+                  <a:srgbClr val="FFFFFF"/>
+                </a:solidFill>
+                <a:effectLst/>
+                <a:latin typeface="source-code-pro"/>
+              </a:rPr>
+              <a:t> </a:t>
+            </a:r>
+          </a:p>
+          <a:p>
+            <a:pPr marL="0" marR="0" lvl="0" indent="0" algn="l" defTabSz="914400" rtl="0" eaLnBrk="0" fontAlgn="base" latinLnBrk="0" hangingPunct="0">
+              <a:lnSpc>
+                <a:spcPct val="100000"/>
+              </a:lnSpc>
+              <a:spcBef>
+                <a:spcPct val="0"/>
+              </a:spcBef>
+              <a:spcAft>
+                <a:spcPct val="0"/>
+              </a:spcAft>
+              <a:buClrTx/>
+              <a:buSzTx/>
+              <a:buFontTx/>
+              <a:buNone/>
+              <a:tabLst/>
+            </a:pPr>
+            <a:r>
+              <a:rPr kumimoji="0" lang="en-US" altLang="en-US" sz="3200" b="0" i="0" u="none" strike="noStrike" cap="none" normalizeH="0" baseline="0" dirty="0" smtClean="0">
+                <a:ln>
+                  <a:noFill/>
+                </a:ln>
+                <a:solidFill>
+                  <a:srgbClr val="5FB3B3"/>
+                </a:solidFill>
+                <a:effectLst/>
+                <a:latin typeface="source-code-pro"/>
+              </a:rPr>
+              <a:t>}</a:t>
+            </a:r>
+            <a:r>
+              <a:rPr kumimoji="0" lang="en-US" altLang="en-US" sz="3200" b="0" i="0" u="none" strike="noStrike" cap="none" normalizeH="0" baseline="0" dirty="0" smtClean="0">
+                <a:ln>
+                  <a:noFill/>
+                </a:ln>
+                <a:solidFill>
+                  <a:schemeClr val="tx1"/>
+                </a:solidFill>
+                <a:effectLst/>
+              </a:rPr>
+              <a:t> </a:t>
+            </a:r>
+            <a:endParaRPr kumimoji="0" lang="en-US" altLang="en-US" sz="3200" b="0" i="0" u="none" strike="noStrike" cap="none" normalizeH="0" baseline="0" dirty="0" smtClean="0">
+              <a:ln>
+                <a:noFill/>
+              </a:ln>
+              <a:solidFill>
+                <a:schemeClr val="tx1"/>
+              </a:solidFill>
+              <a:effectLst/>
+              <a:latin typeface="Arial" panose="020B0604020202020204" pitchFamily="34" charset="0"/>
+            </a:endParaRPr>
+          </a:p>
+        </p:txBody>
+      </p:sp>
+    </p:spTree>
+    <p:extLst>
+      <p:ext uri="{BB962C8B-B14F-4D97-AF65-F5344CB8AC3E}">
+        <p14:creationId xmlns:p14="http://schemas.microsoft.com/office/powerpoint/2010/main" val="3388522145"/>
       </p:ext>
     </p:extLst>
   </p:cSld>

</xml_diff>